<commit_message>
Finalized willow and powerpoint
</commit_message>
<xml_diff>
--- a/PLFinal.pptx
+++ b/PLFinal.pptx
@@ -1,12 +1,12 @@
 
 <file path=ppt/presentation.xml><?xml version="1.0" encoding="utf-8"?>
-<p:presentation xmlns:a="http://schemas.openxmlformats.org/drawingml/2006/main" xmlns:r="http://schemas.openxmlformats.org/officeDocument/2006/relationships" xmlns:p="http://schemas.openxmlformats.org/presentationml/2006/main" strictFirstAndLastChars="0" saveSubsetFonts="1">
+<p:presentation xmlns:a="http://schemas.openxmlformats.org/drawingml/2006/main" xmlns:r="http://schemas.openxmlformats.org/officeDocument/2006/relationships" xmlns:mc="http://schemas.openxmlformats.org/markup-compatibility/2006" xmlns:mv="urn:schemas-microsoft-com:mac:vml" xmlns:p="http://schemas.openxmlformats.org/presentationml/2006/main" mc:Ignorable="mv" mc:PreserveAttributes="mv:*" strictFirstAndLastChars="0" saveSubsetFonts="1">
   <p:sldMasterIdLst>
     <p:sldMasterId id="2147483659" r:id="rId1"/>
     <p:sldMasterId id="2147483669" r:id="rId2"/>
   </p:sldMasterIdLst>
   <p:notesMasterIdLst>
-    <p:notesMasterId r:id="rId16"/>
+    <p:notesMasterId r:id="rId22"/>
   </p:notesMasterIdLst>
   <p:sldIdLst>
     <p:sldId id="709" r:id="rId3"/>
@@ -22,6 +22,12 @@
     <p:sldId id="714" r:id="rId13"/>
     <p:sldId id="715" r:id="rId14"/>
     <p:sldId id="716" r:id="rId15"/>
+    <p:sldId id="731" r:id="rId16"/>
+    <p:sldId id="732" r:id="rId17"/>
+    <p:sldId id="733" r:id="rId18"/>
+    <p:sldId id="734" r:id="rId19"/>
+    <p:sldId id="735" r:id="rId20"/>
+    <p:sldId id="736" r:id="rId21"/>
   </p:sldIdLst>
   <p:sldSz cx="9144000" cy="6858000" type="screen4x3"/>
   <p:notesSz cx="6858000" cy="9313863"/>
@@ -152,7 +158,7 @@
   </p:defaultTextStyle>
   <p:extLst>
     <p:ext uri="{EFAFB233-063F-42B5-8137-9DF3F51BA10A}">
-      <p15:sldGuideLst xmlns:p15="http://schemas.microsoft.com/office/powerpoint/2012/main">
+      <p15:sldGuideLst xmlns:p15="http://schemas.microsoft.com/office/powerpoint/2012/main" xmlns:p="http://schemas.openxmlformats.org/presentationml/2006/main" xmlns:r="http://schemas.openxmlformats.org/officeDocument/2006/relationships" xmlns:a="http://schemas.openxmlformats.org/drawingml/2006/main" xmlns="">
         <p15:guide id="1" orient="horz" pos="2160">
           <p15:clr>
             <a:srgbClr val="A4A3A4"/>
@@ -170,7 +176,7 @@
 </file>
 
 <file path=ppt/notesMasters/notesMaster1.xml><?xml version="1.0" encoding="utf-8"?>
-<p:notesMaster xmlns:a="http://schemas.openxmlformats.org/drawingml/2006/main" xmlns:r="http://schemas.openxmlformats.org/officeDocument/2006/relationships" xmlns:p="http://schemas.openxmlformats.org/presentationml/2006/main">
+<p:notesMaster xmlns:a="http://schemas.openxmlformats.org/drawingml/2006/main" xmlns:r="http://schemas.openxmlformats.org/officeDocument/2006/relationships" xmlns:mc="http://schemas.openxmlformats.org/markup-compatibility/2006" xmlns:mv="urn:schemas-microsoft-com:mac:vml" xmlns:p="http://schemas.openxmlformats.org/presentationml/2006/main" mc:Ignorable="mv" mc:PreserveAttributes="mv:*">
   <p:cSld>
     <p:bg>
       <p:bgPr>
@@ -503,7 +509,7 @@
     </p:spTree>
     <p:extLst>
       <p:ext uri="{BB962C8B-B14F-4D97-AF65-F5344CB8AC3E}">
-        <p14:creationId xmlns:p14="http://schemas.microsoft.com/office/powerpoint/2010/main" val="1509097956"/>
+        <p14:creationId xmlns:p14="http://schemas.microsoft.com/office/powerpoint/2010/main" xmlns:p="http://schemas.openxmlformats.org/presentationml/2006/main" xmlns:r="http://schemas.openxmlformats.org/officeDocument/2006/relationships" xmlns:a="http://schemas.openxmlformats.org/drawingml/2006/main" xmlns="" val="1509097956"/>
       </p:ext>
     </p:extLst>
   </p:cSld>
@@ -634,7 +640,7 @@
 </file>
 
 <file path=ppt/slideLayouts/slideLayout1.xml><?xml version="1.0" encoding="utf-8"?>
-<p:sldLayout xmlns:a="http://schemas.openxmlformats.org/drawingml/2006/main" xmlns:r="http://schemas.openxmlformats.org/officeDocument/2006/relationships" xmlns:p="http://schemas.openxmlformats.org/presentationml/2006/main" type="title" preserve="1">
+<p:sldLayout xmlns:a="http://schemas.openxmlformats.org/drawingml/2006/main" xmlns:r="http://schemas.openxmlformats.org/officeDocument/2006/relationships" xmlns:mc="http://schemas.openxmlformats.org/markup-compatibility/2006" xmlns:mv="urn:schemas-microsoft-com:mac:vml" xmlns:p="http://schemas.openxmlformats.org/presentationml/2006/main" mc:Ignorable="mv" mc:PreserveAttributes="mv:*" type="title" preserve="1">
   <p:cSld name="Title Slide">
     <p:spTree>
       <p:nvGrpSpPr>
@@ -811,7 +817,7 @@
     </p:spTree>
     <p:extLst>
       <p:ext uri="{BB962C8B-B14F-4D97-AF65-F5344CB8AC3E}">
-        <p14:creationId xmlns:p14="http://schemas.microsoft.com/office/powerpoint/2010/main" val="1561331072"/>
+        <p14:creationId xmlns:p14="http://schemas.microsoft.com/office/powerpoint/2010/main" xmlns:p="http://schemas.openxmlformats.org/presentationml/2006/main" xmlns:r="http://schemas.openxmlformats.org/officeDocument/2006/relationships" xmlns:a="http://schemas.openxmlformats.org/drawingml/2006/main" xmlns="" val="1561331072"/>
       </p:ext>
     </p:extLst>
   </p:cSld>
@@ -822,7 +828,7 @@
 </file>
 
 <file path=ppt/slideLayouts/slideLayout10.xml><?xml version="1.0" encoding="utf-8"?>
-<p:sldLayout xmlns:a="http://schemas.openxmlformats.org/drawingml/2006/main" xmlns:r="http://schemas.openxmlformats.org/officeDocument/2006/relationships" xmlns:p="http://schemas.openxmlformats.org/presentationml/2006/main" type="twoObj" preserve="1">
+<p:sldLayout xmlns:a="http://schemas.openxmlformats.org/drawingml/2006/main" xmlns:r="http://schemas.openxmlformats.org/officeDocument/2006/relationships" xmlns:mc="http://schemas.openxmlformats.org/markup-compatibility/2006" xmlns:mv="urn:schemas-microsoft-com:mac:vml" xmlns:p="http://schemas.openxmlformats.org/presentationml/2006/main" mc:Ignorable="mv" mc:PreserveAttributes="mv:*" type="twoObj" preserve="1">
   <p:cSld name="Two Content">
     <p:spTree>
       <p:nvGrpSpPr>
@@ -1031,7 +1037,7 @@
     </p:spTree>
     <p:extLst>
       <p:ext uri="{BB962C8B-B14F-4D97-AF65-F5344CB8AC3E}">
-        <p14:creationId xmlns:p14="http://schemas.microsoft.com/office/powerpoint/2010/main" val="354043779"/>
+        <p14:creationId xmlns:p14="http://schemas.microsoft.com/office/powerpoint/2010/main" xmlns:p="http://schemas.openxmlformats.org/presentationml/2006/main" xmlns:r="http://schemas.openxmlformats.org/officeDocument/2006/relationships" xmlns:a="http://schemas.openxmlformats.org/drawingml/2006/main" xmlns="" val="354043779"/>
       </p:ext>
     </p:extLst>
   </p:cSld>
@@ -1042,7 +1048,7 @@
 </file>
 
 <file path=ppt/slideLayouts/slideLayout11.xml><?xml version="1.0" encoding="utf-8"?>
-<p:sldLayout xmlns:a="http://schemas.openxmlformats.org/drawingml/2006/main" xmlns:r="http://schemas.openxmlformats.org/officeDocument/2006/relationships" xmlns:p="http://schemas.openxmlformats.org/presentationml/2006/main" preserve="1" userDrawn="1">
+<p:sldLayout xmlns:a="http://schemas.openxmlformats.org/drawingml/2006/main" xmlns:r="http://schemas.openxmlformats.org/officeDocument/2006/relationships" xmlns:mc="http://schemas.openxmlformats.org/markup-compatibility/2006" xmlns:mv="urn:schemas-microsoft-com:mac:vml" xmlns:p="http://schemas.openxmlformats.org/presentationml/2006/main" mc:Ignorable="mv" mc:PreserveAttributes="mv:*" preserve="1" userDrawn="1">
   <p:cSld name="Content with Caption">
     <p:spTree>
       <p:nvGrpSpPr>
@@ -1241,7 +1247,7 @@
     </p:spTree>
     <p:extLst>
       <p:ext uri="{BB962C8B-B14F-4D97-AF65-F5344CB8AC3E}">
-        <p14:creationId xmlns:p14="http://schemas.microsoft.com/office/powerpoint/2010/main" val="2349021776"/>
+        <p14:creationId xmlns:p14="http://schemas.microsoft.com/office/powerpoint/2010/main" xmlns:p="http://schemas.openxmlformats.org/presentationml/2006/main" xmlns:r="http://schemas.openxmlformats.org/officeDocument/2006/relationships" xmlns:a="http://schemas.openxmlformats.org/drawingml/2006/main" xmlns="" val="2349021776"/>
       </p:ext>
     </p:extLst>
   </p:cSld>
@@ -1252,7 +1258,7 @@
 </file>
 
 <file path=ppt/slideLayouts/slideLayout12.xml><?xml version="1.0" encoding="utf-8"?>
-<p:sldLayout xmlns:a="http://schemas.openxmlformats.org/drawingml/2006/main" xmlns:r="http://schemas.openxmlformats.org/officeDocument/2006/relationships" xmlns:p="http://schemas.openxmlformats.org/presentationml/2006/main" preserve="1" userDrawn="1">
+<p:sldLayout xmlns:a="http://schemas.openxmlformats.org/drawingml/2006/main" xmlns:r="http://schemas.openxmlformats.org/officeDocument/2006/relationships" xmlns:mc="http://schemas.openxmlformats.org/markup-compatibility/2006" xmlns:mv="urn:schemas-microsoft-com:mac:vml" xmlns:p="http://schemas.openxmlformats.org/presentationml/2006/main" mc:Ignorable="mv" mc:PreserveAttributes="mv:*" preserve="1" userDrawn="1">
   <p:cSld name="Picture with Caption">
     <p:spTree>
       <p:nvGrpSpPr>
@@ -1428,7 +1434,7 @@
     </p:spTree>
     <p:extLst>
       <p:ext uri="{BB962C8B-B14F-4D97-AF65-F5344CB8AC3E}">
-        <p14:creationId xmlns:p14="http://schemas.microsoft.com/office/powerpoint/2010/main" val="4026708166"/>
+        <p14:creationId xmlns:p14="http://schemas.microsoft.com/office/powerpoint/2010/main" xmlns:p="http://schemas.openxmlformats.org/presentationml/2006/main" xmlns:r="http://schemas.openxmlformats.org/officeDocument/2006/relationships" xmlns:a="http://schemas.openxmlformats.org/drawingml/2006/main" xmlns="" val="4026708166"/>
       </p:ext>
     </p:extLst>
   </p:cSld>
@@ -1439,7 +1445,7 @@
 </file>
 
 <file path=ppt/slideLayouts/slideLayout2.xml><?xml version="1.0" encoding="utf-8"?>
-<p:sldLayout xmlns:a="http://schemas.openxmlformats.org/drawingml/2006/main" xmlns:r="http://schemas.openxmlformats.org/officeDocument/2006/relationships" xmlns:p="http://schemas.openxmlformats.org/presentationml/2006/main" type="obj" preserve="1">
+<p:sldLayout xmlns:a="http://schemas.openxmlformats.org/drawingml/2006/main" xmlns:r="http://schemas.openxmlformats.org/officeDocument/2006/relationships" xmlns:mc="http://schemas.openxmlformats.org/markup-compatibility/2006" xmlns:mv="urn:schemas-microsoft-com:mac:vml" xmlns:p="http://schemas.openxmlformats.org/presentationml/2006/main" mc:Ignorable="mv" mc:PreserveAttributes="mv:*" type="obj" preserve="1">
   <p:cSld name="Title and Content">
     <p:spTree>
       <p:nvGrpSpPr>
@@ -1541,7 +1547,7 @@
     </p:spTree>
     <p:extLst>
       <p:ext uri="{BB962C8B-B14F-4D97-AF65-F5344CB8AC3E}">
-        <p14:creationId xmlns:p14="http://schemas.microsoft.com/office/powerpoint/2010/main" val="3930783467"/>
+        <p14:creationId xmlns:p14="http://schemas.microsoft.com/office/powerpoint/2010/main" xmlns:p="http://schemas.openxmlformats.org/presentationml/2006/main" xmlns:r="http://schemas.openxmlformats.org/officeDocument/2006/relationships" xmlns:a="http://schemas.openxmlformats.org/drawingml/2006/main" xmlns="" val="3930783467"/>
       </p:ext>
     </p:extLst>
   </p:cSld>
@@ -1552,7 +1558,7 @@
 </file>
 
 <file path=ppt/slideLayouts/slideLayout3.xml><?xml version="1.0" encoding="utf-8"?>
-<p:sldLayout xmlns:a="http://schemas.openxmlformats.org/drawingml/2006/main" xmlns:r="http://schemas.openxmlformats.org/officeDocument/2006/relationships" xmlns:p="http://schemas.openxmlformats.org/presentationml/2006/main" preserve="1" userDrawn="1">
+<p:sldLayout xmlns:a="http://schemas.openxmlformats.org/drawingml/2006/main" xmlns:r="http://schemas.openxmlformats.org/officeDocument/2006/relationships" xmlns:mc="http://schemas.openxmlformats.org/markup-compatibility/2006" xmlns:mv="urn:schemas-microsoft-com:mac:vml" xmlns:p="http://schemas.openxmlformats.org/presentationml/2006/main" mc:Ignorable="mv" mc:PreserveAttributes="mv:*" preserve="1" userDrawn="1">
   <p:cSld name="Section Header">
     <p:spTree>
       <p:nvGrpSpPr>
@@ -1725,7 +1731,7 @@
     </p:spTree>
     <p:extLst>
       <p:ext uri="{BB962C8B-B14F-4D97-AF65-F5344CB8AC3E}">
-        <p14:creationId xmlns:p14="http://schemas.microsoft.com/office/powerpoint/2010/main" val="1685988487"/>
+        <p14:creationId xmlns:p14="http://schemas.microsoft.com/office/powerpoint/2010/main" xmlns:p="http://schemas.openxmlformats.org/presentationml/2006/main" xmlns:r="http://schemas.openxmlformats.org/officeDocument/2006/relationships" xmlns:a="http://schemas.openxmlformats.org/drawingml/2006/main" xmlns="" val="1685988487"/>
       </p:ext>
     </p:extLst>
   </p:cSld>
@@ -1736,7 +1742,7 @@
 </file>
 
 <file path=ppt/slideLayouts/slideLayout4.xml><?xml version="1.0" encoding="utf-8"?>
-<p:sldLayout xmlns:a="http://schemas.openxmlformats.org/drawingml/2006/main" xmlns:r="http://schemas.openxmlformats.org/officeDocument/2006/relationships" xmlns:p="http://schemas.openxmlformats.org/presentationml/2006/main" type="twoObj" preserve="1">
+<p:sldLayout xmlns:a="http://schemas.openxmlformats.org/drawingml/2006/main" xmlns:r="http://schemas.openxmlformats.org/officeDocument/2006/relationships" xmlns:mc="http://schemas.openxmlformats.org/markup-compatibility/2006" xmlns:mv="urn:schemas-microsoft-com:mac:vml" xmlns:p="http://schemas.openxmlformats.org/presentationml/2006/main" mc:Ignorable="mv" mc:PreserveAttributes="mv:*" type="twoObj" preserve="1">
   <p:cSld name="Two Content">
     <p:spTree>
       <p:nvGrpSpPr>
@@ -1945,7 +1951,7 @@
     </p:spTree>
     <p:extLst>
       <p:ext uri="{BB962C8B-B14F-4D97-AF65-F5344CB8AC3E}">
-        <p14:creationId xmlns:p14="http://schemas.microsoft.com/office/powerpoint/2010/main" val="1606750907"/>
+        <p14:creationId xmlns:p14="http://schemas.microsoft.com/office/powerpoint/2010/main" xmlns:p="http://schemas.openxmlformats.org/presentationml/2006/main" xmlns:r="http://schemas.openxmlformats.org/officeDocument/2006/relationships" xmlns:a="http://schemas.openxmlformats.org/drawingml/2006/main" xmlns="" val="1606750907"/>
       </p:ext>
     </p:extLst>
   </p:cSld>
@@ -1956,7 +1962,7 @@
 </file>
 
 <file path=ppt/slideLayouts/slideLayout5.xml><?xml version="1.0" encoding="utf-8"?>
-<p:sldLayout xmlns:a="http://schemas.openxmlformats.org/drawingml/2006/main" xmlns:r="http://schemas.openxmlformats.org/officeDocument/2006/relationships" xmlns:p="http://schemas.openxmlformats.org/presentationml/2006/main" type="objTx" preserve="1">
+<p:sldLayout xmlns:a="http://schemas.openxmlformats.org/drawingml/2006/main" xmlns:r="http://schemas.openxmlformats.org/officeDocument/2006/relationships" xmlns:mc="http://schemas.openxmlformats.org/markup-compatibility/2006" xmlns:mv="urn:schemas-microsoft-com:mac:vml" xmlns:p="http://schemas.openxmlformats.org/presentationml/2006/main" mc:Ignorable="mv" mc:PreserveAttributes="mv:*" type="objTx" preserve="1">
   <p:cSld name="Content with Caption">
     <p:spTree>
       <p:nvGrpSpPr>
@@ -2155,7 +2161,7 @@
     </p:spTree>
     <p:extLst>
       <p:ext uri="{BB962C8B-B14F-4D97-AF65-F5344CB8AC3E}">
-        <p14:creationId xmlns:p14="http://schemas.microsoft.com/office/powerpoint/2010/main" val="2436964475"/>
+        <p14:creationId xmlns:p14="http://schemas.microsoft.com/office/powerpoint/2010/main" xmlns:p="http://schemas.openxmlformats.org/presentationml/2006/main" xmlns:r="http://schemas.openxmlformats.org/officeDocument/2006/relationships" xmlns:a="http://schemas.openxmlformats.org/drawingml/2006/main" xmlns="" val="2436964475"/>
       </p:ext>
     </p:extLst>
   </p:cSld>
@@ -2166,7 +2172,7 @@
 </file>
 
 <file path=ppt/slideLayouts/slideLayout6.xml><?xml version="1.0" encoding="utf-8"?>
-<p:sldLayout xmlns:a="http://schemas.openxmlformats.org/drawingml/2006/main" xmlns:r="http://schemas.openxmlformats.org/officeDocument/2006/relationships" xmlns:p="http://schemas.openxmlformats.org/presentationml/2006/main" type="picTx" preserve="1">
+<p:sldLayout xmlns:a="http://schemas.openxmlformats.org/drawingml/2006/main" xmlns:r="http://schemas.openxmlformats.org/officeDocument/2006/relationships" xmlns:mc="http://schemas.openxmlformats.org/markup-compatibility/2006" xmlns:mv="urn:schemas-microsoft-com:mac:vml" xmlns:p="http://schemas.openxmlformats.org/presentationml/2006/main" mc:Ignorable="mv" mc:PreserveAttributes="mv:*" type="picTx" preserve="1">
   <p:cSld name="Picture with Caption">
     <p:spTree>
       <p:nvGrpSpPr>
@@ -2342,7 +2348,7 @@
     </p:spTree>
     <p:extLst>
       <p:ext uri="{BB962C8B-B14F-4D97-AF65-F5344CB8AC3E}">
-        <p14:creationId xmlns:p14="http://schemas.microsoft.com/office/powerpoint/2010/main" val="436138400"/>
+        <p14:creationId xmlns:p14="http://schemas.microsoft.com/office/powerpoint/2010/main" xmlns:p="http://schemas.openxmlformats.org/presentationml/2006/main" xmlns:r="http://schemas.openxmlformats.org/officeDocument/2006/relationships" xmlns:a="http://schemas.openxmlformats.org/drawingml/2006/main" xmlns="" val="436138400"/>
       </p:ext>
     </p:extLst>
   </p:cSld>
@@ -2353,7 +2359,7 @@
 </file>
 
 <file path=ppt/slideLayouts/slideLayout7.xml><?xml version="1.0" encoding="utf-8"?>
-<p:sldLayout xmlns:a="http://schemas.openxmlformats.org/drawingml/2006/main" xmlns:r="http://schemas.openxmlformats.org/officeDocument/2006/relationships" xmlns:p="http://schemas.openxmlformats.org/presentationml/2006/main" type="title" preserve="1">
+<p:sldLayout xmlns:a="http://schemas.openxmlformats.org/drawingml/2006/main" xmlns:r="http://schemas.openxmlformats.org/officeDocument/2006/relationships" xmlns:mc="http://schemas.openxmlformats.org/markup-compatibility/2006" xmlns:mv="urn:schemas-microsoft-com:mac:vml" xmlns:p="http://schemas.openxmlformats.org/presentationml/2006/main" mc:Ignorable="mv" mc:PreserveAttributes="mv:*" type="title" preserve="1">
   <p:cSld name="Title Slide">
     <p:spTree>
       <p:nvGrpSpPr>
@@ -2517,7 +2523,7 @@
     </p:spTree>
     <p:extLst>
       <p:ext uri="{BB962C8B-B14F-4D97-AF65-F5344CB8AC3E}">
-        <p14:creationId xmlns:p14="http://schemas.microsoft.com/office/powerpoint/2010/main" val="1969085806"/>
+        <p14:creationId xmlns:p14="http://schemas.microsoft.com/office/powerpoint/2010/main" xmlns:p="http://schemas.openxmlformats.org/presentationml/2006/main" xmlns:r="http://schemas.openxmlformats.org/officeDocument/2006/relationships" xmlns:a="http://schemas.openxmlformats.org/drawingml/2006/main" xmlns="" val="1969085806"/>
       </p:ext>
     </p:extLst>
   </p:cSld>
@@ -2528,7 +2534,7 @@
 </file>
 
 <file path=ppt/slideLayouts/slideLayout8.xml><?xml version="1.0" encoding="utf-8"?>
-<p:sldLayout xmlns:a="http://schemas.openxmlformats.org/drawingml/2006/main" xmlns:r="http://schemas.openxmlformats.org/officeDocument/2006/relationships" xmlns:p="http://schemas.openxmlformats.org/presentationml/2006/main" type="obj" preserve="1">
+<p:sldLayout xmlns:a="http://schemas.openxmlformats.org/drawingml/2006/main" xmlns:r="http://schemas.openxmlformats.org/officeDocument/2006/relationships" xmlns:mc="http://schemas.openxmlformats.org/markup-compatibility/2006" xmlns:mv="urn:schemas-microsoft-com:mac:vml" xmlns:p="http://schemas.openxmlformats.org/presentationml/2006/main" mc:Ignorable="mv" mc:PreserveAttributes="mv:*" type="obj" preserve="1">
   <p:cSld name="Title and Content">
     <p:spTree>
       <p:nvGrpSpPr>
@@ -2630,7 +2636,7 @@
     </p:spTree>
     <p:extLst>
       <p:ext uri="{BB962C8B-B14F-4D97-AF65-F5344CB8AC3E}">
-        <p14:creationId xmlns:p14="http://schemas.microsoft.com/office/powerpoint/2010/main" val="3577501537"/>
+        <p14:creationId xmlns:p14="http://schemas.microsoft.com/office/powerpoint/2010/main" xmlns:p="http://schemas.openxmlformats.org/presentationml/2006/main" xmlns:r="http://schemas.openxmlformats.org/officeDocument/2006/relationships" xmlns:a="http://schemas.openxmlformats.org/drawingml/2006/main" xmlns="" val="3577501537"/>
       </p:ext>
     </p:extLst>
   </p:cSld>
@@ -2641,7 +2647,7 @@
 </file>
 
 <file path=ppt/slideLayouts/slideLayout9.xml><?xml version="1.0" encoding="utf-8"?>
-<p:sldLayout xmlns:a="http://schemas.openxmlformats.org/drawingml/2006/main" xmlns:r="http://schemas.openxmlformats.org/officeDocument/2006/relationships" xmlns:p="http://schemas.openxmlformats.org/presentationml/2006/main" type="secHead" preserve="1">
+<p:sldLayout xmlns:a="http://schemas.openxmlformats.org/drawingml/2006/main" xmlns:r="http://schemas.openxmlformats.org/officeDocument/2006/relationships" xmlns:mc="http://schemas.openxmlformats.org/markup-compatibility/2006" xmlns:mv="urn:schemas-microsoft-com:mac:vml" xmlns:p="http://schemas.openxmlformats.org/presentationml/2006/main" mc:Ignorable="mv" mc:PreserveAttributes="mv:*" type="secHead" preserve="1">
   <p:cSld name="Section Header">
     <p:spTree>
       <p:nvGrpSpPr>
@@ -2813,7 +2819,7 @@
     </p:spTree>
     <p:extLst>
       <p:ext uri="{BB962C8B-B14F-4D97-AF65-F5344CB8AC3E}">
-        <p14:creationId xmlns:p14="http://schemas.microsoft.com/office/powerpoint/2010/main" val="1679158844"/>
+        <p14:creationId xmlns:p14="http://schemas.microsoft.com/office/powerpoint/2010/main" xmlns:p="http://schemas.openxmlformats.org/presentationml/2006/main" xmlns:r="http://schemas.openxmlformats.org/officeDocument/2006/relationships" xmlns:a="http://schemas.openxmlformats.org/drawingml/2006/main" xmlns="" val="1679158844"/>
       </p:ext>
     </p:extLst>
   </p:cSld>
@@ -2824,7 +2830,7 @@
 </file>
 
 <file path=ppt/slideMasters/slideMaster1.xml><?xml version="1.0" encoding="utf-8"?>
-<p:sldMaster xmlns:a="http://schemas.openxmlformats.org/drawingml/2006/main" xmlns:r="http://schemas.openxmlformats.org/officeDocument/2006/relationships" xmlns:p="http://schemas.openxmlformats.org/presentationml/2006/main" preserve="1">
+<p:sldMaster xmlns:a="http://schemas.openxmlformats.org/drawingml/2006/main" xmlns:r="http://schemas.openxmlformats.org/officeDocument/2006/relationships" xmlns:mc="http://schemas.openxmlformats.org/markup-compatibility/2006" xmlns:mv="urn:schemas-microsoft-com:mac:vml" xmlns:p="http://schemas.openxmlformats.org/presentationml/2006/main" mc:Ignorable="mv" mc:PreserveAttributes="mv:*" preserve="1">
   <p:cSld>
     <p:bg>
       <p:bgPr>
@@ -2947,7 +2953,7 @@
     </p:spTree>
     <p:extLst>
       <p:ext uri="{BB962C8B-B14F-4D97-AF65-F5344CB8AC3E}">
-        <p14:creationId xmlns:p14="http://schemas.microsoft.com/office/powerpoint/2010/main" val="781823911"/>
+        <p14:creationId xmlns:p14="http://schemas.microsoft.com/office/powerpoint/2010/main" xmlns:p="http://schemas.openxmlformats.org/presentationml/2006/main" xmlns:r="http://schemas.openxmlformats.org/officeDocument/2006/relationships" xmlns:a="http://schemas.openxmlformats.org/drawingml/2006/main" xmlns="" val="781823911"/>
       </p:ext>
     </p:extLst>
   </p:cSld>
@@ -3232,7 +3238,7 @@
 </file>
 
 <file path=ppt/slideMasters/slideMaster2.xml><?xml version="1.0" encoding="utf-8"?>
-<p:sldMaster xmlns:a="http://schemas.openxmlformats.org/drawingml/2006/main" xmlns:r="http://schemas.openxmlformats.org/officeDocument/2006/relationships" xmlns:p="http://schemas.openxmlformats.org/presentationml/2006/main" preserve="1">
+<p:sldMaster xmlns:a="http://schemas.openxmlformats.org/drawingml/2006/main" xmlns:r="http://schemas.openxmlformats.org/officeDocument/2006/relationships" xmlns:mc="http://schemas.openxmlformats.org/markup-compatibility/2006" xmlns:mv="urn:schemas-microsoft-com:mac:vml" xmlns:p="http://schemas.openxmlformats.org/presentationml/2006/main" mc:Ignorable="mv" mc:PreserveAttributes="mv:*" preserve="1">
   <p:cSld>
     <p:bg>
       <p:bgPr>
@@ -3355,7 +3361,7 @@
     </p:spTree>
     <p:extLst>
       <p:ext uri="{BB962C8B-B14F-4D97-AF65-F5344CB8AC3E}">
-        <p14:creationId xmlns:p14="http://schemas.microsoft.com/office/powerpoint/2010/main" val="3791638655"/>
+        <p14:creationId xmlns:p14="http://schemas.microsoft.com/office/powerpoint/2010/main" xmlns:p="http://schemas.openxmlformats.org/presentationml/2006/main" xmlns:r="http://schemas.openxmlformats.org/officeDocument/2006/relationships" xmlns:a="http://schemas.openxmlformats.org/drawingml/2006/main" xmlns="" val="3791638655"/>
       </p:ext>
     </p:extLst>
   </p:cSld>
@@ -3640,7 +3646,7 @@
 </file>
 
 <file path=ppt/slides/slide1.xml><?xml version="1.0" encoding="utf-8"?>
-<p:sld xmlns:a="http://schemas.openxmlformats.org/drawingml/2006/main" xmlns:r="http://schemas.openxmlformats.org/officeDocument/2006/relationships" xmlns:p="http://schemas.openxmlformats.org/presentationml/2006/main">
+<p:sld xmlns:a="http://schemas.openxmlformats.org/drawingml/2006/main" xmlns:r="http://schemas.openxmlformats.org/officeDocument/2006/relationships" xmlns:mc="http://schemas.openxmlformats.org/markup-compatibility/2006" xmlns:mv="urn:schemas-microsoft-com:mac:vml" xmlns:p="http://schemas.openxmlformats.org/presentationml/2006/main" mc:Ignorable="mv" mc:PreserveAttributes="mv:*">
   <p:cSld>
     <p:spTree>
       <p:nvGrpSpPr>
@@ -3707,7 +3713,7 @@
     </p:spTree>
     <p:extLst>
       <p:ext uri="{BB962C8B-B14F-4D97-AF65-F5344CB8AC3E}">
-        <p14:creationId xmlns:p14="http://schemas.microsoft.com/office/powerpoint/2010/main" val="86700209"/>
+        <p14:creationId xmlns:p14="http://schemas.microsoft.com/office/powerpoint/2010/main" xmlns:p="http://schemas.openxmlformats.org/presentationml/2006/main" xmlns:r="http://schemas.openxmlformats.org/officeDocument/2006/relationships" xmlns:a="http://schemas.openxmlformats.org/drawingml/2006/main" xmlns="" val="86700209"/>
       </p:ext>
     </p:extLst>
   </p:cSld>
@@ -3718,7 +3724,7 @@
 </file>
 
 <file path=ppt/slides/slide10.xml><?xml version="1.0" encoding="utf-8"?>
-<p:sld xmlns:a="http://schemas.openxmlformats.org/drawingml/2006/main" xmlns:r="http://schemas.openxmlformats.org/officeDocument/2006/relationships" xmlns:p="http://schemas.openxmlformats.org/presentationml/2006/main">
+<p:sld xmlns:a="http://schemas.openxmlformats.org/drawingml/2006/main" xmlns:r="http://schemas.openxmlformats.org/officeDocument/2006/relationships" xmlns:mc="http://schemas.openxmlformats.org/markup-compatibility/2006" xmlns:mv="urn:schemas-microsoft-com:mac:vml" xmlns:p="http://schemas.openxmlformats.org/presentationml/2006/main" mc:Ignorable="mv" mc:PreserveAttributes="mv:*">
   <p:cSld>
     <p:spTree>
       <p:nvGrpSpPr>
@@ -3786,7 +3792,12 @@
             <p:ph type="subTitle" idx="1"/>
           </p:nvPr>
         </p:nvSpPr>
-        <p:spPr/>
+        <p:spPr>
+          <a:xfrm>
+            <a:off x="1371600" y="4724400"/>
+            <a:ext cx="6400800" cy="1752600"/>
+          </a:xfrm>
+        </p:spPr>
         <p:txBody>
           <a:bodyPr/>
           <a:lstStyle/>
@@ -3801,18 +3812,25 @@
     </p:spTree>
     <p:extLst>
       <p:ext uri="{BB962C8B-B14F-4D97-AF65-F5344CB8AC3E}">
-        <p14:creationId xmlns:p14="http://schemas.microsoft.com/office/powerpoint/2010/main" val="1430956557"/>
+        <p14:creationId xmlns:p14="http://schemas.microsoft.com/office/powerpoint/2010/main" xmlns:p="http://schemas.openxmlformats.org/presentationml/2006/main" xmlns:r="http://schemas.openxmlformats.org/officeDocument/2006/relationships" xmlns:a="http://schemas.openxmlformats.org/drawingml/2006/main" xmlns="" val="1430956557"/>
       </p:ext>
     </p:extLst>
   </p:cSld>
   <p:clrMapOvr>
     <a:masterClrMapping/>
   </p:clrMapOvr>
+  <p:timing>
+    <p:tnLst>
+      <p:par>
+        <p:cTn id="1" dur="indefinite" restart="never" nodeType="tmRoot"/>
+      </p:par>
+    </p:tnLst>
+  </p:timing>
 </p:sld>
 </file>
 
 <file path=ppt/slides/slide11.xml><?xml version="1.0" encoding="utf-8"?>
-<p:sld xmlns:a="http://schemas.openxmlformats.org/drawingml/2006/main" xmlns:r="http://schemas.openxmlformats.org/officeDocument/2006/relationships" xmlns:p="http://schemas.openxmlformats.org/presentationml/2006/main">
+<p:sld xmlns:a="http://schemas.openxmlformats.org/drawingml/2006/main" xmlns:r="http://schemas.openxmlformats.org/officeDocument/2006/relationships" xmlns:mc="http://schemas.openxmlformats.org/markup-compatibility/2006" xmlns:mv="urn:schemas-microsoft-com:mac:vml" xmlns:p="http://schemas.openxmlformats.org/presentationml/2006/main" mc:Ignorable="mv" mc:PreserveAttributes="mv:*">
   <p:cSld>
     <p:spTree>
       <p:nvGrpSpPr>
@@ -3883,7 +3901,7 @@
           <a:effectLst/>
           <a:extLst>
             <a:ext uri="{91240B29-F687-4F45-9708-019B960494DF}">
-              <a14:hiddenLine xmlns:a14="http://schemas.microsoft.com/office/drawing/2010/main" w="9525">
+              <a14:hiddenLine xmlns:a14="http://schemas.microsoft.com/office/drawing/2010/main" xmlns:p="http://schemas.openxmlformats.org/presentationml/2006/main" xmlns:r="http://schemas.openxmlformats.org/officeDocument/2006/relationships" xmlns:a="http://schemas.openxmlformats.org/drawingml/2006/main" xmlns="" w="9525">
                 <a:solidFill>
                   <a:schemeClr val="tx1"/>
                 </a:solidFill>
@@ -3893,7 +3911,7 @@
               </a14:hiddenLine>
             </a:ext>
             <a:ext uri="{AF507438-7753-43E0-B8FC-AC1667EBCBE1}">
-              <a14:hiddenEffects xmlns:a14="http://schemas.microsoft.com/office/drawing/2010/main">
+              <a14:hiddenEffects xmlns:a14="http://schemas.microsoft.com/office/drawing/2010/main" xmlns:p="http://schemas.openxmlformats.org/presentationml/2006/main" xmlns:r="http://schemas.openxmlformats.org/officeDocument/2006/relationships" xmlns:a="http://schemas.openxmlformats.org/drawingml/2006/main" xmlns="">
                 <a:effectLst>
                   <a:outerShdw dist="35921" dir="2700000" algn="ctr" rotWithShape="0">
                     <a:schemeClr val="bg2"/>
@@ -7266,7 +7284,7 @@
           <a:blip r:embed="rId2">
             <a:extLst>
               <a:ext uri="{28A0092B-C50C-407E-A947-70E740481C1C}">
-                <a14:useLocalDpi xmlns:a14="http://schemas.microsoft.com/office/drawing/2010/main" val="0"/>
+                <a14:useLocalDpi xmlns:a14="http://schemas.microsoft.com/office/drawing/2010/main" xmlns:p="http://schemas.openxmlformats.org/presentationml/2006/main" xmlns:r="http://schemas.openxmlformats.org/officeDocument/2006/relationships" xmlns:a="http://schemas.openxmlformats.org/drawingml/2006/main" xmlns="" val="0"/>
               </a:ext>
             </a:extLst>
           </a:blip>
@@ -7286,7 +7304,7 @@
           <a:noFill/>
           <a:extLst>
             <a:ext uri="{909E8E84-426E-40DD-AFC4-6F175D3DCCD1}">
-              <a14:hiddenFill xmlns:a14="http://schemas.microsoft.com/office/drawing/2010/main">
+              <a14:hiddenFill xmlns:a14="http://schemas.microsoft.com/office/drawing/2010/main" xmlns:p="http://schemas.openxmlformats.org/presentationml/2006/main" xmlns:r="http://schemas.openxmlformats.org/officeDocument/2006/relationships" xmlns:a="http://schemas.openxmlformats.org/drawingml/2006/main" xmlns="">
                 <a:solidFill>
                   <a:srgbClr val="FFFFFF"/>
                 </a:solidFill>
@@ -7307,7 +7325,7 @@
           <a:blip r:embed="rId3">
             <a:extLst>
               <a:ext uri="{28A0092B-C50C-407E-A947-70E740481C1C}">
-                <a14:useLocalDpi xmlns:a14="http://schemas.microsoft.com/office/drawing/2010/main" val="0"/>
+                <a14:useLocalDpi xmlns:a14="http://schemas.microsoft.com/office/drawing/2010/main" xmlns:p="http://schemas.openxmlformats.org/presentationml/2006/main" xmlns:r="http://schemas.openxmlformats.org/officeDocument/2006/relationships" xmlns:a="http://schemas.openxmlformats.org/drawingml/2006/main" xmlns="" val="0"/>
               </a:ext>
             </a:extLst>
           </a:blip>
@@ -7327,7 +7345,7 @@
           <a:noFill/>
           <a:extLst>
             <a:ext uri="{909E8E84-426E-40DD-AFC4-6F175D3DCCD1}">
-              <a14:hiddenFill xmlns:a14="http://schemas.microsoft.com/office/drawing/2010/main">
+              <a14:hiddenFill xmlns:a14="http://schemas.microsoft.com/office/drawing/2010/main" xmlns:p="http://schemas.openxmlformats.org/presentationml/2006/main" xmlns:r="http://schemas.openxmlformats.org/officeDocument/2006/relationships" xmlns:a="http://schemas.openxmlformats.org/drawingml/2006/main" xmlns="">
                 <a:solidFill>
                   <a:srgbClr val="FFFFFF"/>
                 </a:solidFill>
@@ -7339,18 +7357,25 @@
     </p:spTree>
     <p:extLst>
       <p:ext uri="{BB962C8B-B14F-4D97-AF65-F5344CB8AC3E}">
-        <p14:creationId xmlns:p14="http://schemas.microsoft.com/office/powerpoint/2010/main" val="402163908"/>
+        <p14:creationId xmlns:p14="http://schemas.microsoft.com/office/powerpoint/2010/main" xmlns:p="http://schemas.openxmlformats.org/presentationml/2006/main" xmlns:r="http://schemas.openxmlformats.org/officeDocument/2006/relationships" xmlns:a="http://schemas.openxmlformats.org/drawingml/2006/main" xmlns="" val="402163908"/>
       </p:ext>
     </p:extLst>
   </p:cSld>
   <p:clrMapOvr>
     <a:masterClrMapping/>
   </p:clrMapOvr>
+  <p:timing>
+    <p:tnLst>
+      <p:par>
+        <p:cTn id="1" dur="indefinite" restart="never" nodeType="tmRoot"/>
+      </p:par>
+    </p:tnLst>
+  </p:timing>
 </p:sld>
 </file>
 
 <file path=ppt/slides/slide12.xml><?xml version="1.0" encoding="utf-8"?>
-<p:sld xmlns:a="http://schemas.openxmlformats.org/drawingml/2006/main" xmlns:r="http://schemas.openxmlformats.org/officeDocument/2006/relationships" xmlns:p="http://schemas.openxmlformats.org/presentationml/2006/main">
+<p:sld xmlns:a="http://schemas.openxmlformats.org/drawingml/2006/main" xmlns:r="http://schemas.openxmlformats.org/officeDocument/2006/relationships" xmlns:mc="http://schemas.openxmlformats.org/markup-compatibility/2006" xmlns:mv="urn:schemas-microsoft-com:mac:vml" xmlns:p="http://schemas.openxmlformats.org/presentationml/2006/main" mc:Ignorable="mv" mc:PreserveAttributes="mv:*">
   <p:cSld>
     <p:spTree>
       <p:nvGrpSpPr>
@@ -7423,7 +7448,7 @@
           <a:effectLst/>
           <a:extLst>
             <a:ext uri="{91240B29-F687-4F45-9708-019B960494DF}">
-              <a14:hiddenLine xmlns:a14="http://schemas.microsoft.com/office/drawing/2010/main" w="9525">
+              <a14:hiddenLine xmlns:a14="http://schemas.microsoft.com/office/drawing/2010/main" xmlns:p="http://schemas.openxmlformats.org/presentationml/2006/main" xmlns:r="http://schemas.openxmlformats.org/officeDocument/2006/relationships" xmlns:a="http://schemas.openxmlformats.org/drawingml/2006/main" xmlns="" w="9525">
                 <a:solidFill>
                   <a:schemeClr val="tx1"/>
                 </a:solidFill>
@@ -7433,7 +7458,7 @@
               </a14:hiddenLine>
             </a:ext>
             <a:ext uri="{AF507438-7753-43E0-B8FC-AC1667EBCBE1}">
-              <a14:hiddenEffects xmlns:a14="http://schemas.microsoft.com/office/drawing/2010/main">
+              <a14:hiddenEffects xmlns:a14="http://schemas.microsoft.com/office/drawing/2010/main" xmlns:p="http://schemas.openxmlformats.org/presentationml/2006/main" xmlns:r="http://schemas.openxmlformats.org/officeDocument/2006/relationships" xmlns:a="http://schemas.openxmlformats.org/drawingml/2006/main" xmlns="">
                 <a:effectLst>
                   <a:outerShdw dist="35921" dir="2700000" algn="ctr" rotWithShape="0">
                     <a:schemeClr val="bg2"/>
@@ -8054,18 +8079,25 @@
     </p:spTree>
     <p:extLst>
       <p:ext uri="{BB962C8B-B14F-4D97-AF65-F5344CB8AC3E}">
-        <p14:creationId xmlns:p14="http://schemas.microsoft.com/office/powerpoint/2010/main" val="490096587"/>
+        <p14:creationId xmlns:p14="http://schemas.microsoft.com/office/powerpoint/2010/main" xmlns:p="http://schemas.openxmlformats.org/presentationml/2006/main" xmlns:r="http://schemas.openxmlformats.org/officeDocument/2006/relationships" xmlns:a="http://schemas.openxmlformats.org/drawingml/2006/main" xmlns="" val="490096587"/>
       </p:ext>
     </p:extLst>
   </p:cSld>
   <p:clrMapOvr>
     <a:masterClrMapping/>
   </p:clrMapOvr>
+  <p:timing>
+    <p:tnLst>
+      <p:par>
+        <p:cTn id="1" dur="indefinite" restart="never" nodeType="tmRoot"/>
+      </p:par>
+    </p:tnLst>
+  </p:timing>
 </p:sld>
 </file>
 
 <file path=ppt/slides/slide13.xml><?xml version="1.0" encoding="utf-8"?>
-<p:sld xmlns:a="http://schemas.openxmlformats.org/drawingml/2006/main" xmlns:r="http://schemas.openxmlformats.org/officeDocument/2006/relationships" xmlns:p="http://schemas.openxmlformats.org/presentationml/2006/main">
+<p:sld xmlns:a="http://schemas.openxmlformats.org/drawingml/2006/main" xmlns:r="http://schemas.openxmlformats.org/officeDocument/2006/relationships" xmlns:mc="http://schemas.openxmlformats.org/markup-compatibility/2006" xmlns:mv="urn:schemas-microsoft-com:mac:vml" xmlns:p="http://schemas.openxmlformats.org/presentationml/2006/main" mc:Ignorable="mv" mc:PreserveAttributes="mv:*">
   <p:cSld>
     <p:spTree>
       <p:nvGrpSpPr>
@@ -8138,7 +8170,7 @@
           <a:effectLst/>
           <a:extLst>
             <a:ext uri="{91240B29-F687-4F45-9708-019B960494DF}">
-              <a14:hiddenLine xmlns:a14="http://schemas.microsoft.com/office/drawing/2010/main" w="9525">
+              <a14:hiddenLine xmlns:a14="http://schemas.microsoft.com/office/drawing/2010/main" xmlns:p="http://schemas.openxmlformats.org/presentationml/2006/main" xmlns:r="http://schemas.openxmlformats.org/officeDocument/2006/relationships" xmlns:a="http://schemas.openxmlformats.org/drawingml/2006/main" xmlns="" w="9525">
                 <a:solidFill>
                   <a:schemeClr val="tx1"/>
                 </a:solidFill>
@@ -8148,7 +8180,7 @@
               </a14:hiddenLine>
             </a:ext>
             <a:ext uri="{AF507438-7753-43E0-B8FC-AC1667EBCBE1}">
-              <a14:hiddenEffects xmlns:a14="http://schemas.microsoft.com/office/drawing/2010/main">
+              <a14:hiddenEffects xmlns:a14="http://schemas.microsoft.com/office/drawing/2010/main" xmlns:p="http://schemas.openxmlformats.org/presentationml/2006/main" xmlns:r="http://schemas.openxmlformats.org/officeDocument/2006/relationships" xmlns:a="http://schemas.openxmlformats.org/drawingml/2006/main" xmlns="">
                 <a:effectLst>
                   <a:outerShdw dist="35921" dir="2700000" algn="ctr" rotWithShape="0">
                     <a:schemeClr val="bg2"/>
@@ -8390,18 +8422,1048 @@
     </p:spTree>
     <p:extLst>
       <p:ext uri="{BB962C8B-B14F-4D97-AF65-F5344CB8AC3E}">
-        <p14:creationId xmlns:p14="http://schemas.microsoft.com/office/powerpoint/2010/main" val="3603926503"/>
+        <p14:creationId xmlns:p14="http://schemas.microsoft.com/office/powerpoint/2010/main" xmlns:p="http://schemas.openxmlformats.org/presentationml/2006/main" xmlns:r="http://schemas.openxmlformats.org/officeDocument/2006/relationships" xmlns:a="http://schemas.openxmlformats.org/drawingml/2006/main" xmlns="" val="3603926503"/>
       </p:ext>
     </p:extLst>
   </p:cSld>
   <p:clrMapOvr>
     <a:masterClrMapping/>
   </p:clrMapOvr>
+  <p:timing>
+    <p:tnLst>
+      <p:par>
+        <p:cTn id="1" dur="indefinite" restart="never" nodeType="tmRoot"/>
+      </p:par>
+    </p:tnLst>
+  </p:timing>
+</p:sld>
+</file>
+
+<file path=ppt/slides/slide14.xml><?xml version="1.0" encoding="utf-8"?>
+<p:sld xmlns:a="http://schemas.openxmlformats.org/drawingml/2006/main" xmlns:r="http://schemas.openxmlformats.org/officeDocument/2006/relationships" xmlns:mc="http://schemas.openxmlformats.org/markup-compatibility/2006" xmlns:mv="urn:schemas-microsoft-com:mac:vml" xmlns:p="http://schemas.openxmlformats.org/presentationml/2006/main" mc:Ignorable="mv" mc:PreserveAttributes="mv:*">
+  <p:cSld>
+    <p:spTree>
+      <p:nvGrpSpPr>
+        <p:cNvPr id="1" name=""/>
+        <p:cNvGrpSpPr/>
+        <p:nvPr/>
+      </p:nvGrpSpPr>
+      <p:grpSpPr>
+        <a:xfrm>
+          <a:off x="0" y="0"/>
+          <a:ext cx="0" cy="0"/>
+          <a:chOff x="0" y="0"/>
+          <a:chExt cx="0" cy="0"/>
+        </a:xfrm>
+      </p:grpSpPr>
+      <p:sp>
+        <p:nvSpPr>
+          <p:cNvPr id="4" name="Title 3"/>
+          <p:cNvSpPr>
+            <a:spLocks noGrp="1"/>
+          </p:cNvSpPr>
+          <p:nvPr>
+            <p:ph type="ctrTitle"/>
+          </p:nvPr>
+        </p:nvSpPr>
+        <p:spPr/>
+        <p:txBody>
+          <a:bodyPr>
+            <a:normAutofit fontScale="90000"/>
+          </a:bodyPr>
+          <a:lstStyle/>
+          <a:p>
+            <a:r>
+              <a:rPr lang="en-US" sz="6600" b="1" dirty="0" smtClean="0">
+                <a:latin typeface="Agency FB" panose="020B0503020202020204" pitchFamily="34" charset="0"/>
+              </a:rPr>
+              <a:t>Willow Programming Language</a:t>
+            </a:r>
+            <a:endParaRPr lang="en-US" sz="6600" b="1" dirty="0">
+              <a:latin typeface="Agency FB" panose="020B0503020202020204" pitchFamily="34" charset="0"/>
+            </a:endParaRPr>
+          </a:p>
+        </p:txBody>
+      </p:sp>
+      <p:sp>
+        <p:nvSpPr>
+          <p:cNvPr id="5" name="Subtitle 4"/>
+          <p:cNvSpPr>
+            <a:spLocks noGrp="1"/>
+          </p:cNvSpPr>
+          <p:nvPr>
+            <p:ph type="subTitle" idx="1"/>
+          </p:nvPr>
+        </p:nvSpPr>
+        <p:spPr/>
+        <p:txBody>
+          <a:bodyPr/>
+          <a:lstStyle/>
+          <a:p>
+            <a:r>
+              <a:rPr lang="en-US" dirty="0" smtClean="0"/>
+              <a:t>Ryan Wechter</a:t>
+            </a:r>
+            <a:endParaRPr lang="en-US" dirty="0"/>
+          </a:p>
+        </p:txBody>
+      </p:sp>
+    </p:spTree>
+    <p:extLst>
+      <p:ext uri="{BB962C8B-B14F-4D97-AF65-F5344CB8AC3E}">
+        <p14:creationId xmlns:p14="http://schemas.microsoft.com/office/powerpoint/2010/main" xmlns:p="http://schemas.openxmlformats.org/presentationml/2006/main" xmlns:r="http://schemas.openxmlformats.org/officeDocument/2006/relationships" xmlns:a="http://schemas.openxmlformats.org/drawingml/2006/main" xmlns="" val="1392206460"/>
+      </p:ext>
+    </p:extLst>
+  </p:cSld>
+  <p:clrMapOvr>
+    <a:masterClrMapping/>
+  </p:clrMapOvr>
+  <p:timing>
+    <p:tnLst>
+      <p:par>
+        <p:cTn id="1" dur="indefinite" restart="never" nodeType="tmRoot"/>
+      </p:par>
+    </p:tnLst>
+  </p:timing>
+</p:sld>
+</file>
+
+<file path=ppt/slides/slide15.xml><?xml version="1.0" encoding="utf-8"?>
+<p:sld xmlns:a="http://schemas.openxmlformats.org/drawingml/2006/main" xmlns:r="http://schemas.openxmlformats.org/officeDocument/2006/relationships" xmlns:mc="http://schemas.openxmlformats.org/markup-compatibility/2006" xmlns:mv="urn:schemas-microsoft-com:mac:vml" xmlns:p="http://schemas.openxmlformats.org/presentationml/2006/main" mc:Ignorable="mv" mc:PreserveAttributes="mv:*">
+  <p:cSld>
+    <p:spTree>
+      <p:nvGrpSpPr>
+        <p:cNvPr id="1" name=""/>
+        <p:cNvGrpSpPr/>
+        <p:nvPr/>
+      </p:nvGrpSpPr>
+      <p:grpSpPr>
+        <a:xfrm>
+          <a:off x="0" y="0"/>
+          <a:ext cx="0" cy="0"/>
+          <a:chOff x="0" y="0"/>
+          <a:chExt cx="0" cy="0"/>
+        </a:xfrm>
+      </p:grpSpPr>
+      <p:sp>
+        <p:nvSpPr>
+          <p:cNvPr id="2" name="Title 1"/>
+          <p:cNvSpPr>
+            <a:spLocks noGrp="1"/>
+          </p:cNvSpPr>
+          <p:nvPr>
+            <p:ph type="title"/>
+          </p:nvPr>
+        </p:nvSpPr>
+        <p:spPr/>
+        <p:txBody>
+          <a:bodyPr>
+            <a:normAutofit fontScale="90000"/>
+          </a:bodyPr>
+          <a:lstStyle/>
+          <a:p>
+            <a:r>
+              <a:rPr lang="en-US" dirty="0" smtClean="0"/>
+              <a:t>What goes into building a programming language?</a:t>
+            </a:r>
+            <a:endParaRPr lang="en-US" dirty="0"/>
+          </a:p>
+        </p:txBody>
+      </p:sp>
+      <p:sp>
+        <p:nvSpPr>
+          <p:cNvPr id="3" name="Content Placeholder 2"/>
+          <p:cNvSpPr>
+            <a:spLocks noGrp="1"/>
+          </p:cNvSpPr>
+          <p:nvPr>
+            <p:ph idx="1"/>
+          </p:nvPr>
+        </p:nvSpPr>
+        <p:spPr/>
+        <p:txBody>
+          <a:bodyPr/>
+          <a:lstStyle/>
+          <a:p>
+            <a:r>
+              <a:rPr lang="en-US" dirty="0" smtClean="0"/>
+              <a:t>Identify a problem to solve</a:t>
+            </a:r>
+          </a:p>
+          <a:p>
+            <a:pPr lvl="3"/>
+            <a:r>
+              <a:rPr lang="en-US" dirty="0" smtClean="0"/>
+              <a:t>General purpose or specific to problem domain</a:t>
+            </a:r>
+          </a:p>
+          <a:p>
+            <a:r>
+              <a:rPr lang="en-US" dirty="0" smtClean="0"/>
+              <a:t>Consider language semantics</a:t>
+            </a:r>
+          </a:p>
+          <a:p>
+            <a:pPr lvl="3"/>
+            <a:r>
+              <a:rPr lang="en-US" dirty="0" smtClean="0"/>
+              <a:t>Reserved words, built-in functions, data types, logical and mathematical operators, data storage, flow control</a:t>
+            </a:r>
+          </a:p>
+          <a:p>
+            <a:r>
+              <a:rPr lang="en-US" dirty="0" smtClean="0"/>
+              <a:t>Define syntax/grammar rules</a:t>
+            </a:r>
+          </a:p>
+          <a:p>
+            <a:pPr lvl="3"/>
+            <a:r>
+              <a:rPr lang="en-US" dirty="0" smtClean="0"/>
+              <a:t>Parse input to create AST.  Evaluate AST to execute program</a:t>
+            </a:r>
+          </a:p>
+          <a:p>
+            <a:endParaRPr lang="en-US" dirty="0"/>
+          </a:p>
+        </p:txBody>
+      </p:sp>
+    </p:spTree>
+  </p:cSld>
+  <p:clrMapOvr>
+    <a:masterClrMapping/>
+  </p:clrMapOvr>
+  <p:timing>
+    <p:tnLst>
+      <p:par>
+        <p:cTn id="1" dur="indefinite" restart="never" nodeType="tmRoot"/>
+      </p:par>
+    </p:tnLst>
+  </p:timing>
+</p:sld>
+</file>
+
+<file path=ppt/slides/slide16.xml><?xml version="1.0" encoding="utf-8"?>
+<p:sld xmlns:a="http://schemas.openxmlformats.org/drawingml/2006/main" xmlns:r="http://schemas.openxmlformats.org/officeDocument/2006/relationships" xmlns:mc="http://schemas.openxmlformats.org/markup-compatibility/2006" xmlns:mv="urn:schemas-microsoft-com:mac:vml" xmlns:p="http://schemas.openxmlformats.org/presentationml/2006/main" mc:Ignorable="mv" mc:PreserveAttributes="mv:*">
+  <p:cSld>
+    <p:spTree>
+      <p:nvGrpSpPr>
+        <p:cNvPr id="1" name=""/>
+        <p:cNvGrpSpPr/>
+        <p:nvPr/>
+      </p:nvGrpSpPr>
+      <p:grpSpPr>
+        <a:xfrm>
+          <a:off x="0" y="0"/>
+          <a:ext cx="0" cy="0"/>
+          <a:chOff x="0" y="0"/>
+          <a:chExt cx="0" cy="0"/>
+        </a:xfrm>
+      </p:grpSpPr>
+      <p:sp>
+        <p:nvSpPr>
+          <p:cNvPr id="2" name="Title 1"/>
+          <p:cNvSpPr>
+            <a:spLocks noGrp="1"/>
+          </p:cNvSpPr>
+          <p:nvPr>
+            <p:ph type="title"/>
+          </p:nvPr>
+        </p:nvSpPr>
+        <p:spPr/>
+        <p:txBody>
+          <a:bodyPr/>
+          <a:lstStyle/>
+          <a:p>
+            <a:r>
+              <a:rPr lang="en-US" dirty="0" smtClean="0"/>
+              <a:t>Scope of Implementation</a:t>
+            </a:r>
+            <a:endParaRPr lang="en-US" dirty="0"/>
+          </a:p>
+        </p:txBody>
+      </p:sp>
+      <p:sp>
+        <p:nvSpPr>
+          <p:cNvPr id="3" name="Content Placeholder 2"/>
+          <p:cNvSpPr>
+            <a:spLocks noGrp="1"/>
+          </p:cNvSpPr>
+          <p:nvPr>
+            <p:ph idx="1"/>
+          </p:nvPr>
+        </p:nvSpPr>
+        <p:spPr/>
+        <p:txBody>
+          <a:bodyPr>
+            <a:normAutofit/>
+          </a:bodyPr>
+          <a:lstStyle/>
+          <a:p>
+            <a:r>
+              <a:rPr lang="en-US" sz="2800" dirty="0" smtClean="0"/>
+              <a:t>Print Statements</a:t>
+            </a:r>
+          </a:p>
+          <a:p>
+            <a:r>
+              <a:rPr lang="en-US" sz="2800" dirty="0" smtClean="0"/>
+              <a:t>Comments</a:t>
+            </a:r>
+          </a:p>
+          <a:p>
+            <a:r>
+              <a:rPr lang="en-US" sz="2800" dirty="0" smtClean="0"/>
+              <a:t>Variable Instantiation, Assignment and </a:t>
+            </a:r>
+            <a:r>
+              <a:rPr lang="en-US" sz="2800" dirty="0" smtClean="0"/>
+              <a:t>Access</a:t>
+            </a:r>
+          </a:p>
+          <a:p>
+            <a:r>
+              <a:rPr lang="en-US" sz="2800" dirty="0" smtClean="0"/>
+              <a:t>If Else Statements</a:t>
+            </a:r>
+          </a:p>
+          <a:p>
+            <a:r>
+              <a:rPr lang="en-US" sz="2800" dirty="0" smtClean="0"/>
+              <a:t>Logical and Mathematical Operators</a:t>
+            </a:r>
+          </a:p>
+          <a:p>
+            <a:r>
+              <a:rPr lang="en-US" sz="2800" dirty="0" smtClean="0"/>
+              <a:t>Function Definition and Calls (without parameters)</a:t>
+            </a:r>
+          </a:p>
+          <a:p>
+            <a:r>
+              <a:rPr lang="en-US" sz="2800" dirty="0" smtClean="0"/>
+              <a:t>Casting (float to </a:t>
+            </a:r>
+            <a:r>
+              <a:rPr lang="en-US" sz="2800" dirty="0" err="1" smtClean="0"/>
+              <a:t>int</a:t>
+            </a:r>
+            <a:r>
+              <a:rPr lang="en-US" sz="2800" dirty="0" smtClean="0"/>
+              <a:t>)</a:t>
+            </a:r>
+            <a:endParaRPr lang="en-US" sz="2800" dirty="0"/>
+          </a:p>
+        </p:txBody>
+      </p:sp>
+    </p:spTree>
+  </p:cSld>
+  <p:clrMapOvr>
+    <a:masterClrMapping/>
+  </p:clrMapOvr>
+  <p:timing>
+    <p:tnLst>
+      <p:par>
+        <p:cTn id="1" dur="indefinite" restart="never" nodeType="tmRoot"/>
+      </p:par>
+    </p:tnLst>
+  </p:timing>
+</p:sld>
+</file>
+
+<file path=ppt/slides/slide17.xml><?xml version="1.0" encoding="utf-8"?>
+<p:sld xmlns:a="http://schemas.openxmlformats.org/drawingml/2006/main" xmlns:r="http://schemas.openxmlformats.org/officeDocument/2006/relationships" xmlns:mc="http://schemas.openxmlformats.org/markup-compatibility/2006" xmlns:mv="urn:schemas-microsoft-com:mac:vml" xmlns:p="http://schemas.openxmlformats.org/presentationml/2006/main" mc:Ignorable="mv" mc:PreserveAttributes="mv:*">
+  <p:cSld>
+    <p:spTree>
+      <p:nvGrpSpPr>
+        <p:cNvPr id="1" name=""/>
+        <p:cNvGrpSpPr/>
+        <p:nvPr/>
+      </p:nvGrpSpPr>
+      <p:grpSpPr>
+        <a:xfrm>
+          <a:off x="0" y="0"/>
+          <a:ext cx="0" cy="0"/>
+          <a:chOff x="0" y="0"/>
+          <a:chExt cx="0" cy="0"/>
+        </a:xfrm>
+      </p:grpSpPr>
+      <p:sp>
+        <p:nvSpPr>
+          <p:cNvPr id="2" name="Title 1"/>
+          <p:cNvSpPr>
+            <a:spLocks noGrp="1"/>
+          </p:cNvSpPr>
+          <p:nvPr>
+            <p:ph type="title"/>
+          </p:nvPr>
+        </p:nvSpPr>
+        <p:spPr/>
+        <p:txBody>
+          <a:bodyPr/>
+          <a:lstStyle/>
+          <a:p>
+            <a:r>
+              <a:rPr lang="en-US" dirty="0" smtClean="0"/>
+              <a:t>Tester Code</a:t>
+            </a:r>
+            <a:endParaRPr lang="en-US" dirty="0"/>
+          </a:p>
+        </p:txBody>
+      </p:sp>
+      <p:pic>
+        <p:nvPicPr>
+          <p:cNvPr id="6" name="Content Placeholder 5" descr="Screen Shot 2016-05-12 at 3.32.57 PM.png"/>
+          <p:cNvPicPr>
+            <a:picLocks noGrp="1" noChangeAspect="1"/>
+          </p:cNvPicPr>
+          <p:nvPr>
+            <p:ph idx="1"/>
+          </p:nvPr>
+        </p:nvPicPr>
+        <p:blipFill>
+          <a:blip r:embed="rId2"/>
+          <a:srcRect l="-15437" r="-15437"/>
+          <a:stretch>
+            <a:fillRect/>
+          </a:stretch>
+        </p:blipFill>
+        <p:spPr>
+          <a:xfrm>
+            <a:off x="457200" y="2133600"/>
+            <a:ext cx="8229600" cy="4114800"/>
+          </a:xfrm>
+        </p:spPr>
+      </p:pic>
+    </p:spTree>
+  </p:cSld>
+  <p:clrMapOvr>
+    <a:masterClrMapping/>
+  </p:clrMapOvr>
+  <p:timing>
+    <p:tnLst>
+      <p:par>
+        <p:cTn id="1" dur="indefinite" restart="never" nodeType="tmRoot"/>
+      </p:par>
+    </p:tnLst>
+  </p:timing>
+</p:sld>
+</file>
+
+<file path=ppt/slides/slide18.xml><?xml version="1.0" encoding="utf-8"?>
+<p:sld xmlns:a="http://schemas.openxmlformats.org/drawingml/2006/main" xmlns:r="http://schemas.openxmlformats.org/officeDocument/2006/relationships" xmlns:mc="http://schemas.openxmlformats.org/markup-compatibility/2006" xmlns:mv="urn:schemas-microsoft-com:mac:vml" xmlns:p="http://schemas.openxmlformats.org/presentationml/2006/main" mc:Ignorable="mv" mc:PreserveAttributes="mv:*">
+  <p:cSld>
+    <p:spTree>
+      <p:nvGrpSpPr>
+        <p:cNvPr id="1" name=""/>
+        <p:cNvGrpSpPr/>
+        <p:nvPr/>
+      </p:nvGrpSpPr>
+      <p:grpSpPr>
+        <a:xfrm>
+          <a:off x="0" y="0"/>
+          <a:ext cx="0" cy="0"/>
+          <a:chOff x="0" y="0"/>
+          <a:chExt cx="0" cy="0"/>
+        </a:xfrm>
+      </p:grpSpPr>
+      <p:sp>
+        <p:nvSpPr>
+          <p:cNvPr id="2" name="Title 1"/>
+          <p:cNvSpPr>
+            <a:spLocks noGrp="1"/>
+          </p:cNvSpPr>
+          <p:nvPr>
+            <p:ph type="title"/>
+          </p:nvPr>
+        </p:nvSpPr>
+        <p:spPr/>
+        <p:txBody>
+          <a:bodyPr>
+            <a:normAutofit/>
+          </a:bodyPr>
+          <a:lstStyle/>
+          <a:p>
+            <a:r>
+              <a:rPr lang="en-US" dirty="0" smtClean="0"/>
+              <a:t>Abstract Syntax Tree </a:t>
+            </a:r>
+            <a:endParaRPr lang="en-US" dirty="0"/>
+          </a:p>
+        </p:txBody>
+      </p:sp>
+      <p:sp>
+        <p:nvSpPr>
+          <p:cNvPr id="5" name="Content Placeholder 4"/>
+          <p:cNvSpPr>
+            <a:spLocks noGrp="1"/>
+          </p:cNvSpPr>
+          <p:nvPr>
+            <p:ph idx="1"/>
+          </p:nvPr>
+        </p:nvSpPr>
+        <p:spPr/>
+        <p:txBody>
+          <a:bodyPr>
+            <a:normAutofit/>
+          </a:bodyPr>
+          <a:lstStyle/>
+          <a:p>
+            <a:pPr>
+              <a:buNone/>
+            </a:pPr>
+            <a:r>
+              <a:rPr lang="en-US" sz="2000" dirty="0" smtClean="0"/>
+              <a:t>['Print', '</a:t>
+            </a:r>
+            <a:r>
+              <a:rPr lang="en-US" sz="2000" dirty="0" err="1" smtClean="0"/>
+              <a:t>HelloWorld</a:t>
+            </a:r>
+            <a:r>
+              <a:rPr lang="en-US" sz="2000" dirty="0" smtClean="0"/>
+              <a:t>', '</a:t>
+            </a:r>
+            <a:r>
+              <a:rPr lang="en-US" sz="2000" dirty="0" err="1" smtClean="0"/>
+              <a:t>VariableInst</a:t>
+            </a:r>
+            <a:r>
+              <a:rPr lang="en-US" sz="2000" dirty="0" smtClean="0"/>
+              <a:t>', 'a', 'Comment', '</a:t>
+            </a:r>
+            <a:r>
+              <a:rPr lang="en-US" sz="2000" dirty="0" smtClean="0"/>
+              <a:t>Print’, '</a:t>
+            </a:r>
+            <a:r>
+              <a:rPr lang="en-US" sz="2000" dirty="0" smtClean="0"/>
+              <a:t>a', 'Comment',</a:t>
+            </a:r>
+            <a:r>
+              <a:rPr lang="en-US" sz="2000" dirty="0" smtClean="0"/>
+              <a:t> </a:t>
+            </a:r>
+          </a:p>
+          <a:p>
+            <a:pPr>
+              <a:buNone/>
+            </a:pPr>
+            <a:r>
+              <a:rPr lang="en-US" sz="2000" dirty="0" smtClean="0"/>
+              <a:t>'</a:t>
+            </a:r>
+            <a:r>
+              <a:rPr lang="en-US" sz="2000" dirty="0" err="1" smtClean="0"/>
+              <a:t>VariableDeclaration</a:t>
+            </a:r>
+            <a:r>
+              <a:rPr lang="en-US" sz="2000" dirty="0" smtClean="0"/>
+              <a:t>', '</a:t>
+            </a:r>
+            <a:r>
+              <a:rPr lang="en-US" sz="2000" dirty="0" err="1" smtClean="0"/>
+              <a:t>c</a:t>
+            </a:r>
+            <a:r>
+              <a:rPr lang="en-US" sz="2000" dirty="0" smtClean="0"/>
+              <a:t>', 5, 'Comment',</a:t>
+            </a:r>
+            <a:r>
+              <a:rPr lang="en-US" sz="2000" dirty="0" smtClean="0"/>
+              <a:t> '</a:t>
+            </a:r>
+            <a:r>
+              <a:rPr lang="en-US" sz="2000" dirty="0" smtClean="0"/>
+              <a:t>Print', '</a:t>
+            </a:r>
+            <a:r>
+              <a:rPr lang="en-US" sz="2000" dirty="0" err="1" smtClean="0"/>
+              <a:t>c</a:t>
+            </a:r>
+            <a:r>
+              <a:rPr lang="en-US" sz="2000" dirty="0" smtClean="0"/>
+              <a:t>', 'Comment',</a:t>
+            </a:r>
+            <a:r>
+              <a:rPr lang="en-US" sz="2000" dirty="0" smtClean="0"/>
+              <a:t> </a:t>
+            </a:r>
+          </a:p>
+          <a:p>
+            <a:pPr>
+              <a:buNone/>
+            </a:pPr>
+            <a:r>
+              <a:rPr lang="en-US" sz="2000" dirty="0" smtClean="0"/>
+              <a:t>'</a:t>
+            </a:r>
+            <a:r>
+              <a:rPr lang="en-US" sz="2000" dirty="0" err="1" smtClean="0"/>
+              <a:t>IfElseStatement</a:t>
+            </a:r>
+            <a:r>
+              <a:rPr lang="en-US" sz="2000" dirty="0" smtClean="0"/>
+              <a:t>', False</a:t>
+            </a:r>
+            <a:r>
+              <a:rPr lang="en-US" sz="2000" dirty="0" smtClean="0"/>
+              <a:t>,</a:t>
+            </a:r>
+          </a:p>
+          <a:p>
+            <a:pPr>
+              <a:buNone/>
+            </a:pPr>
+            <a:r>
+              <a:rPr lang="en-US" sz="2000" dirty="0" smtClean="0"/>
+              <a:t>	</a:t>
+            </a:r>
+            <a:r>
+              <a:rPr lang="en-US" sz="2000" dirty="0" smtClean="0"/>
+              <a:t> [</a:t>
+            </a:r>
+            <a:r>
+              <a:rPr lang="en-US" sz="2000" dirty="0" smtClean="0"/>
+              <a:t>'</a:t>
+            </a:r>
+            <a:r>
+              <a:rPr lang="en-US" sz="2000" dirty="0" err="1" smtClean="0"/>
+              <a:t>MathAssExp</a:t>
+            </a:r>
+            <a:r>
+              <a:rPr lang="en-US" sz="2000" dirty="0" smtClean="0"/>
+              <a:t>', 5, 5, '*', 'a', 'Print', 'a'],</a:t>
+            </a:r>
+            <a:r>
+              <a:rPr lang="en-US" sz="2000" dirty="0" smtClean="0"/>
+              <a:t> </a:t>
+            </a:r>
+          </a:p>
+          <a:p>
+            <a:pPr>
+              <a:buNone/>
+            </a:pPr>
+            <a:r>
+              <a:rPr lang="en-US" sz="2000" dirty="0" smtClean="0"/>
+              <a:t>	</a:t>
+            </a:r>
+            <a:r>
+              <a:rPr lang="en-US" sz="2000" dirty="0" smtClean="0"/>
+              <a:t>[</a:t>
+            </a:r>
+            <a:r>
+              <a:rPr lang="en-US" sz="2000" dirty="0" smtClean="0"/>
+              <a:t>'</a:t>
+            </a:r>
+            <a:r>
+              <a:rPr lang="en-US" sz="2000" dirty="0" err="1" smtClean="0"/>
+              <a:t>MathAssExp</a:t>
+            </a:r>
+            <a:r>
+              <a:rPr lang="en-US" sz="2000" dirty="0" smtClean="0"/>
+              <a:t>', 5, 5,</a:t>
+            </a:r>
+            <a:r>
+              <a:rPr lang="en-US" sz="2000" dirty="0" smtClean="0"/>
+              <a:t> '</a:t>
+            </a:r>
+            <a:r>
+              <a:rPr lang="en-US" sz="2000" dirty="0" smtClean="0"/>
+              <a:t>+', 'a', 'Print', 'a'],</a:t>
+            </a:r>
+            <a:r>
+              <a:rPr lang="en-US" sz="2000" dirty="0" smtClean="0"/>
+              <a:t> </a:t>
+            </a:r>
+          </a:p>
+          <a:p>
+            <a:pPr>
+              <a:buNone/>
+            </a:pPr>
+            <a:r>
+              <a:rPr lang="en-US" sz="2000" dirty="0" smtClean="0"/>
+              <a:t>'</a:t>
+            </a:r>
+            <a:r>
+              <a:rPr lang="en-US" sz="2000" dirty="0" err="1" smtClean="0"/>
+              <a:t>MathExp</a:t>
+            </a:r>
+            <a:r>
+              <a:rPr lang="en-US" sz="2000" dirty="0" smtClean="0"/>
+              <a:t>', 5, 3, '-', 'Comment',</a:t>
+            </a:r>
+            <a:r>
+              <a:rPr lang="en-US" sz="2000" dirty="0" smtClean="0"/>
+              <a:t> </a:t>
+            </a:r>
+          </a:p>
+          <a:p>
+            <a:pPr>
+              <a:buNone/>
+            </a:pPr>
+            <a:r>
+              <a:rPr lang="en-US" sz="2000" dirty="0" smtClean="0"/>
+              <a:t>'</a:t>
+            </a:r>
+            <a:r>
+              <a:rPr lang="en-US" sz="2000" dirty="0" err="1" smtClean="0"/>
+              <a:t>DefineFunction</a:t>
+            </a:r>
+            <a:r>
+              <a:rPr lang="en-US" sz="2000" dirty="0" smtClean="0"/>
+              <a:t>', 'fun', ['Print', "'</a:t>
+            </a:r>
+            <a:r>
+              <a:rPr lang="en-US" sz="2000" dirty="0" err="1" smtClean="0"/>
+              <a:t>z</a:t>
+            </a:r>
+            <a:r>
+              <a:rPr lang="en-US" sz="2000" dirty="0" smtClean="0"/>
+              <a:t>'", '</a:t>
+            </a:r>
+            <a:r>
+              <a:rPr lang="en-US" sz="2000" dirty="0" err="1" smtClean="0"/>
+              <a:t>MathExp</a:t>
+            </a:r>
+            <a:r>
+              <a:rPr lang="en-US" sz="2000" dirty="0" smtClean="0"/>
+              <a:t>', 5, 5, '+'],</a:t>
+            </a:r>
+            <a:r>
+              <a:rPr lang="en-US" sz="2000" dirty="0" smtClean="0"/>
+              <a:t> </a:t>
+            </a:r>
+          </a:p>
+          <a:p>
+            <a:pPr>
+              <a:buNone/>
+            </a:pPr>
+            <a:r>
+              <a:rPr lang="en-US" sz="2000" dirty="0" smtClean="0"/>
+              <a:t>'</a:t>
+            </a:r>
+            <a:r>
+              <a:rPr lang="en-US" sz="2000" dirty="0" err="1" smtClean="0"/>
+              <a:t>FloatCast</a:t>
+            </a:r>
+            <a:r>
+              <a:rPr lang="en-US" sz="2000" dirty="0" smtClean="0"/>
+              <a:t>', '</a:t>
+            </a:r>
+            <a:r>
+              <a:rPr lang="en-US" sz="2000" dirty="0" err="1" smtClean="0"/>
+              <a:t>b</a:t>
+            </a:r>
+            <a:r>
+              <a:rPr lang="en-US" sz="2000" dirty="0" smtClean="0"/>
+              <a:t>', 'a', 'Print', '</a:t>
+            </a:r>
+            <a:r>
+              <a:rPr lang="en-US" sz="2000" dirty="0" err="1" smtClean="0"/>
+              <a:t>b</a:t>
+            </a:r>
+            <a:r>
+              <a:rPr lang="en-US" sz="2000" dirty="0" smtClean="0"/>
+              <a:t>', '</a:t>
+            </a:r>
+            <a:r>
+              <a:rPr lang="en-US" sz="2000" dirty="0" err="1" smtClean="0"/>
+              <a:t>FloatCast</a:t>
+            </a:r>
+            <a:r>
+              <a:rPr lang="en-US" sz="2000" dirty="0" smtClean="0"/>
+              <a:t>', '</a:t>
+            </a:r>
+            <a:r>
+              <a:rPr lang="en-US" sz="2000" dirty="0" err="1" smtClean="0"/>
+              <a:t>c</a:t>
+            </a:r>
+            <a:r>
+              <a:rPr lang="en-US" sz="2000" dirty="0" smtClean="0"/>
+              <a:t>', "'a'", 'Print', '</a:t>
+            </a:r>
+            <a:r>
+              <a:rPr lang="en-US" sz="2000" dirty="0" err="1" smtClean="0"/>
+              <a:t>c</a:t>
+            </a:r>
+            <a:r>
+              <a:rPr lang="en-US" sz="2000" dirty="0" smtClean="0"/>
+              <a:t>',</a:t>
+            </a:r>
+            <a:r>
+              <a:rPr lang="en-US" sz="2000" dirty="0" smtClean="0"/>
+              <a:t> </a:t>
+            </a:r>
+          </a:p>
+          <a:p>
+            <a:pPr>
+              <a:buNone/>
+            </a:pPr>
+            <a:r>
+              <a:rPr lang="en-US" sz="2000" dirty="0" smtClean="0"/>
+              <a:t>'</a:t>
+            </a:r>
+            <a:r>
+              <a:rPr lang="en-US" sz="2000" dirty="0" err="1" smtClean="0"/>
+              <a:t>FloatCast</a:t>
+            </a:r>
+            <a:r>
+              <a:rPr lang="en-US" sz="2000" dirty="0" smtClean="0"/>
+              <a:t>', '</a:t>
+            </a:r>
+            <a:r>
+              <a:rPr lang="en-US" sz="2000" dirty="0" err="1" smtClean="0"/>
+              <a:t>d</a:t>
+            </a:r>
+            <a:r>
+              <a:rPr lang="en-US" sz="2000" dirty="0" smtClean="0"/>
+              <a:t>', 5, 'Print', '</a:t>
+            </a:r>
+            <a:r>
+              <a:rPr lang="en-US" sz="2000" dirty="0" err="1" smtClean="0"/>
+              <a:t>d</a:t>
+            </a:r>
+            <a:r>
+              <a:rPr lang="en-US" sz="2000" dirty="0" smtClean="0"/>
+              <a:t>', '</a:t>
+            </a:r>
+            <a:r>
+              <a:rPr lang="en-US" sz="2000" dirty="0" err="1" smtClean="0"/>
+              <a:t>CallFunction</a:t>
+            </a:r>
+            <a:r>
+              <a:rPr lang="en-US" sz="2000" dirty="0" smtClean="0"/>
+              <a:t>', 'fun'</a:t>
+            </a:r>
+            <a:r>
+              <a:rPr lang="en-US" sz="2000" dirty="0" smtClean="0"/>
+              <a:t>]</a:t>
+            </a:r>
+          </a:p>
+          <a:p>
+            <a:pPr>
+              <a:buNone/>
+            </a:pPr>
+            <a:endParaRPr lang="en-US" sz="2595" dirty="0" smtClean="0"/>
+          </a:p>
+          <a:p>
+            <a:endParaRPr lang="en-US" dirty="0"/>
+          </a:p>
+        </p:txBody>
+      </p:sp>
+    </p:spTree>
+  </p:cSld>
+  <p:clrMapOvr>
+    <a:masterClrMapping/>
+  </p:clrMapOvr>
+  <p:timing>
+    <p:tnLst>
+      <p:par>
+        <p:cTn id="1" dur="indefinite" restart="never" nodeType="tmRoot"/>
+      </p:par>
+    </p:tnLst>
+  </p:timing>
+</p:sld>
+</file>
+
+<file path=ppt/slides/slide19.xml><?xml version="1.0" encoding="utf-8"?>
+<p:sld xmlns:a="http://schemas.openxmlformats.org/drawingml/2006/main" xmlns:r="http://schemas.openxmlformats.org/officeDocument/2006/relationships" xmlns:mc="http://schemas.openxmlformats.org/markup-compatibility/2006" xmlns:mv="urn:schemas-microsoft-com:mac:vml" xmlns:p="http://schemas.openxmlformats.org/presentationml/2006/main" mc:Ignorable="mv" mc:PreserveAttributes="mv:*">
+  <p:cSld>
+    <p:spTree>
+      <p:nvGrpSpPr>
+        <p:cNvPr id="1" name=""/>
+        <p:cNvGrpSpPr/>
+        <p:nvPr/>
+      </p:nvGrpSpPr>
+      <p:grpSpPr>
+        <a:xfrm>
+          <a:off x="0" y="0"/>
+          <a:ext cx="0" cy="0"/>
+          <a:chOff x="0" y="0"/>
+          <a:chExt cx="0" cy="0"/>
+        </a:xfrm>
+      </p:grpSpPr>
+      <p:sp>
+        <p:nvSpPr>
+          <p:cNvPr id="2" name="Title 1"/>
+          <p:cNvSpPr>
+            <a:spLocks noGrp="1"/>
+          </p:cNvSpPr>
+          <p:nvPr>
+            <p:ph type="title"/>
+          </p:nvPr>
+        </p:nvSpPr>
+        <p:spPr/>
+        <p:txBody>
+          <a:bodyPr/>
+          <a:lstStyle/>
+          <a:p>
+            <a:r>
+              <a:rPr lang="en-US" dirty="0" smtClean="0"/>
+              <a:t>Interpreter Output</a:t>
+            </a:r>
+            <a:endParaRPr lang="en-US" dirty="0"/>
+          </a:p>
+        </p:txBody>
+      </p:sp>
+      <p:sp>
+        <p:nvSpPr>
+          <p:cNvPr id="3" name="Content Placeholder 2"/>
+          <p:cNvSpPr>
+            <a:spLocks noGrp="1"/>
+          </p:cNvSpPr>
+          <p:nvPr>
+            <p:ph idx="1"/>
+          </p:nvPr>
+        </p:nvSpPr>
+        <p:spPr/>
+        <p:txBody>
+          <a:bodyPr>
+            <a:normAutofit fontScale="70000" lnSpcReduction="20000"/>
+          </a:bodyPr>
+          <a:lstStyle/>
+          <a:p>
+            <a:pPr>
+              <a:buNone/>
+            </a:pPr>
+            <a:r>
+              <a:rPr lang="en-US" dirty="0" err="1" smtClean="0"/>
+              <a:t>HelloWorld</a:t>
+            </a:r>
+            <a:endParaRPr lang="en-US" dirty="0" smtClean="0"/>
+          </a:p>
+          <a:p>
+            <a:pPr>
+              <a:buNone/>
+            </a:pPr>
+            <a:r>
+              <a:rPr lang="en-US" dirty="0" smtClean="0"/>
+              <a:t>0</a:t>
+            </a:r>
+          </a:p>
+          <a:p>
+            <a:pPr>
+              <a:buNone/>
+            </a:pPr>
+            <a:r>
+              <a:rPr lang="en-US" dirty="0" smtClean="0"/>
+              <a:t>5</a:t>
+            </a:r>
+          </a:p>
+          <a:p>
+            <a:pPr>
+              <a:buNone/>
+            </a:pPr>
+            <a:r>
+              <a:rPr lang="en-US" dirty="0" smtClean="0"/>
+              <a:t>10</a:t>
+            </a:r>
+          </a:p>
+          <a:p>
+            <a:pPr>
+              <a:buNone/>
+            </a:pPr>
+            <a:r>
+              <a:rPr lang="en-US" dirty="0" smtClean="0"/>
+              <a:t>2</a:t>
+            </a:r>
+          </a:p>
+          <a:p>
+            <a:pPr>
+              <a:buNone/>
+            </a:pPr>
+            <a:r>
+              <a:rPr lang="en-US" dirty="0" smtClean="0"/>
+              <a:t>10.0</a:t>
+            </a:r>
+          </a:p>
+          <a:p>
+            <a:pPr>
+              <a:buNone/>
+            </a:pPr>
+            <a:r>
+              <a:rPr lang="en-US" dirty="0" smtClean="0"/>
+              <a:t>cannot cast </a:t>
+            </a:r>
+            <a:r>
+              <a:rPr lang="en-US" dirty="0" err="1" smtClean="0"/>
+              <a:t>str</a:t>
+            </a:r>
+            <a:r>
+              <a:rPr lang="en-US" dirty="0" smtClean="0"/>
+              <a:t> to float</a:t>
+            </a:r>
+          </a:p>
+          <a:p>
+            <a:pPr>
+              <a:buNone/>
+            </a:pPr>
+            <a:r>
+              <a:rPr lang="en-US" dirty="0" smtClean="0"/>
+              <a:t>'a'</a:t>
+            </a:r>
+          </a:p>
+          <a:p>
+            <a:pPr>
+              <a:buNone/>
+            </a:pPr>
+            <a:r>
+              <a:rPr lang="en-US" dirty="0" smtClean="0"/>
+              <a:t>5.0</a:t>
+            </a:r>
+          </a:p>
+          <a:p>
+            <a:pPr>
+              <a:buNone/>
+            </a:pPr>
+            <a:r>
+              <a:rPr lang="en-US" dirty="0" smtClean="0"/>
+              <a:t>'</a:t>
+            </a:r>
+            <a:r>
+              <a:rPr lang="en-US" dirty="0" err="1" smtClean="0"/>
+              <a:t>z</a:t>
+            </a:r>
+            <a:r>
+              <a:rPr lang="en-US" dirty="0" smtClean="0"/>
+              <a:t>'</a:t>
+            </a:r>
+          </a:p>
+          <a:p>
+            <a:pPr>
+              <a:buNone/>
+            </a:pPr>
+            <a:r>
+              <a:rPr lang="en-US" dirty="0" smtClean="0"/>
+              <a:t>10</a:t>
+            </a:r>
+          </a:p>
+          <a:p>
+            <a:pPr>
+              <a:buNone/>
+            </a:pPr>
+            <a:endParaRPr lang="en-US" dirty="0"/>
+          </a:p>
+        </p:txBody>
+      </p:sp>
+    </p:spTree>
+  </p:cSld>
+  <p:clrMapOvr>
+    <a:masterClrMapping/>
+  </p:clrMapOvr>
+  <p:timing>
+    <p:tnLst>
+      <p:par>
+        <p:cTn id="1" dur="indefinite" restart="never" nodeType="tmRoot"/>
+      </p:par>
+    </p:tnLst>
+  </p:timing>
 </p:sld>
 </file>
 
 <file path=ppt/slides/slide2.xml><?xml version="1.0" encoding="utf-8"?>
-<p:sld xmlns:a="http://schemas.openxmlformats.org/drawingml/2006/main" xmlns:r="http://schemas.openxmlformats.org/officeDocument/2006/relationships" xmlns:p="http://schemas.openxmlformats.org/presentationml/2006/main">
+<p:sld xmlns:a="http://schemas.openxmlformats.org/drawingml/2006/main" xmlns:r="http://schemas.openxmlformats.org/officeDocument/2006/relationships" xmlns:mc="http://schemas.openxmlformats.org/markup-compatibility/2006" xmlns:mv="urn:schemas-microsoft-com:mac:vml" xmlns:p="http://schemas.openxmlformats.org/presentationml/2006/main" mc:Ignorable="mv" mc:PreserveAttributes="mv:*">
   <p:cSld>
     <p:spTree>
       <p:nvGrpSpPr>
@@ -8472,7 +9534,7 @@
           <a:effectLst/>
           <a:extLst>
             <a:ext uri="{91240B29-F687-4F45-9708-019B960494DF}">
-              <a14:hiddenLine xmlns:a14="http://schemas.microsoft.com/office/drawing/2010/main" w="9525">
+              <a14:hiddenLine xmlns:a14="http://schemas.microsoft.com/office/drawing/2010/main" xmlns:p="http://schemas.openxmlformats.org/presentationml/2006/main" xmlns:r="http://schemas.openxmlformats.org/officeDocument/2006/relationships" xmlns:a="http://schemas.openxmlformats.org/drawingml/2006/main" xmlns="" w="9525">
                 <a:solidFill>
                   <a:schemeClr val="tx1"/>
                 </a:solidFill>
@@ -8482,7 +9544,7 @@
               </a14:hiddenLine>
             </a:ext>
             <a:ext uri="{AF507438-7753-43E0-B8FC-AC1667EBCBE1}">
-              <a14:hiddenEffects xmlns:a14="http://schemas.microsoft.com/office/drawing/2010/main">
+              <a14:hiddenEffects xmlns:a14="http://schemas.microsoft.com/office/drawing/2010/main" xmlns:p="http://schemas.openxmlformats.org/presentationml/2006/main" xmlns:r="http://schemas.openxmlformats.org/officeDocument/2006/relationships" xmlns:a="http://schemas.openxmlformats.org/drawingml/2006/main" xmlns="">
                 <a:effectLst>
                   <a:outerShdw dist="35921" dir="2700000" algn="ctr" rotWithShape="0">
                     <a:schemeClr val="bg2"/>
@@ -10379,7 +11441,7 @@
     </p:spTree>
     <p:extLst>
       <p:ext uri="{BB962C8B-B14F-4D97-AF65-F5344CB8AC3E}">
-        <p14:creationId xmlns:p14="http://schemas.microsoft.com/office/powerpoint/2010/main" val="4246246875"/>
+        <p14:creationId xmlns:p14="http://schemas.microsoft.com/office/powerpoint/2010/main" xmlns:p="http://schemas.openxmlformats.org/presentationml/2006/main" xmlns:r="http://schemas.openxmlformats.org/officeDocument/2006/relationships" xmlns:a="http://schemas.openxmlformats.org/drawingml/2006/main" xmlns="" val="4246246875"/>
       </p:ext>
     </p:extLst>
   </p:cSld>
@@ -10390,7 +11452,7 @@
 </file>
 
 <file path=ppt/slides/slide3.xml><?xml version="1.0" encoding="utf-8"?>
-<p:sld xmlns:a="http://schemas.openxmlformats.org/drawingml/2006/main" xmlns:r="http://schemas.openxmlformats.org/officeDocument/2006/relationships" xmlns:p="http://schemas.openxmlformats.org/presentationml/2006/main">
+<p:sld xmlns:a="http://schemas.openxmlformats.org/drawingml/2006/main" xmlns:r="http://schemas.openxmlformats.org/officeDocument/2006/relationships" xmlns:mc="http://schemas.openxmlformats.org/markup-compatibility/2006" xmlns:mv="urn:schemas-microsoft-com:mac:vml" xmlns:p="http://schemas.openxmlformats.org/presentationml/2006/main" mc:Ignorable="mv" mc:PreserveAttributes="mv:*">
   <p:cSld>
     <p:spTree>
       <p:nvGrpSpPr>
@@ -10461,7 +11523,7 @@
           <a:effectLst/>
           <a:extLst>
             <a:ext uri="{91240B29-F687-4F45-9708-019B960494DF}">
-              <a14:hiddenLine xmlns:a14="http://schemas.microsoft.com/office/drawing/2010/main" w="9525">
+              <a14:hiddenLine xmlns:a14="http://schemas.microsoft.com/office/drawing/2010/main" xmlns:p="http://schemas.openxmlformats.org/presentationml/2006/main" xmlns:r="http://schemas.openxmlformats.org/officeDocument/2006/relationships" xmlns:a="http://schemas.openxmlformats.org/drawingml/2006/main" xmlns="" w="9525">
                 <a:solidFill>
                   <a:schemeClr val="tx1"/>
                 </a:solidFill>
@@ -10471,7 +11533,7 @@
               </a14:hiddenLine>
             </a:ext>
             <a:ext uri="{AF507438-7753-43E0-B8FC-AC1667EBCBE1}">
-              <a14:hiddenEffects xmlns:a14="http://schemas.microsoft.com/office/drawing/2010/main">
+              <a14:hiddenEffects xmlns:a14="http://schemas.microsoft.com/office/drawing/2010/main" xmlns:p="http://schemas.openxmlformats.org/presentationml/2006/main" xmlns:r="http://schemas.openxmlformats.org/officeDocument/2006/relationships" xmlns:a="http://schemas.openxmlformats.org/drawingml/2006/main" xmlns="">
                 <a:effectLst>
                   <a:outerShdw dist="35921" dir="2700000" algn="ctr" rotWithShape="0">
                     <a:schemeClr val="bg2"/>
@@ -11462,7 +12524,7 @@
     </p:spTree>
     <p:extLst>
       <p:ext uri="{BB962C8B-B14F-4D97-AF65-F5344CB8AC3E}">
-        <p14:creationId xmlns:p14="http://schemas.microsoft.com/office/powerpoint/2010/main" val="4082042008"/>
+        <p14:creationId xmlns:p14="http://schemas.microsoft.com/office/powerpoint/2010/main" xmlns:p="http://schemas.openxmlformats.org/presentationml/2006/main" xmlns:r="http://schemas.openxmlformats.org/officeDocument/2006/relationships" xmlns:a="http://schemas.openxmlformats.org/drawingml/2006/main" xmlns="" val="4082042008"/>
       </p:ext>
     </p:extLst>
   </p:cSld>
@@ -11473,7 +12535,7 @@
 </file>
 
 <file path=ppt/slides/slide4.xml><?xml version="1.0" encoding="utf-8"?>
-<p:sld xmlns:a="http://schemas.openxmlformats.org/drawingml/2006/main" xmlns:r="http://schemas.openxmlformats.org/officeDocument/2006/relationships" xmlns:p="http://schemas.openxmlformats.org/presentationml/2006/main">
+<p:sld xmlns:a="http://schemas.openxmlformats.org/drawingml/2006/main" xmlns:r="http://schemas.openxmlformats.org/officeDocument/2006/relationships" xmlns:mc="http://schemas.openxmlformats.org/markup-compatibility/2006" xmlns:mv="urn:schemas-microsoft-com:mac:vml" xmlns:p="http://schemas.openxmlformats.org/presentationml/2006/main" mc:Ignorable="mv" mc:PreserveAttributes="mv:*">
   <p:cSld>
     <p:spTree>
       <p:nvGrpSpPr>
@@ -11544,7 +12606,7 @@
           <a:effectLst/>
           <a:extLst>
             <a:ext uri="{91240B29-F687-4F45-9708-019B960494DF}">
-              <a14:hiddenLine xmlns:a14="http://schemas.microsoft.com/office/drawing/2010/main" w="9525">
+              <a14:hiddenLine xmlns:a14="http://schemas.microsoft.com/office/drawing/2010/main" xmlns:p="http://schemas.openxmlformats.org/presentationml/2006/main" xmlns:r="http://schemas.openxmlformats.org/officeDocument/2006/relationships" xmlns:a="http://schemas.openxmlformats.org/drawingml/2006/main" xmlns="" w="9525">
                 <a:solidFill>
                   <a:schemeClr val="tx1"/>
                 </a:solidFill>
@@ -11554,7 +12616,7 @@
               </a14:hiddenLine>
             </a:ext>
             <a:ext uri="{AF507438-7753-43E0-B8FC-AC1667EBCBE1}">
-              <a14:hiddenEffects xmlns:a14="http://schemas.microsoft.com/office/drawing/2010/main">
+              <a14:hiddenEffects xmlns:a14="http://schemas.microsoft.com/office/drawing/2010/main" xmlns:p="http://schemas.openxmlformats.org/presentationml/2006/main" xmlns:r="http://schemas.openxmlformats.org/officeDocument/2006/relationships" xmlns:a="http://schemas.openxmlformats.org/drawingml/2006/main" xmlns="">
                 <a:effectLst>
                   <a:outerShdw dist="35921" dir="2700000" algn="ctr" rotWithShape="0">
                     <a:schemeClr val="bg2"/>
@@ -12472,7 +13534,7 @@
     </p:spTree>
     <p:extLst>
       <p:ext uri="{BB962C8B-B14F-4D97-AF65-F5344CB8AC3E}">
-        <p14:creationId xmlns:p14="http://schemas.microsoft.com/office/powerpoint/2010/main" val="2137940131"/>
+        <p14:creationId xmlns:p14="http://schemas.microsoft.com/office/powerpoint/2010/main" xmlns:p="http://schemas.openxmlformats.org/presentationml/2006/main" xmlns:r="http://schemas.openxmlformats.org/officeDocument/2006/relationships" xmlns:a="http://schemas.openxmlformats.org/drawingml/2006/main" xmlns="" val="2137940131"/>
       </p:ext>
     </p:extLst>
   </p:cSld>
@@ -12483,7 +13545,7 @@
 </file>
 
 <file path=ppt/slides/slide5.xml><?xml version="1.0" encoding="utf-8"?>
-<p:sld xmlns:a="http://schemas.openxmlformats.org/drawingml/2006/main" xmlns:r="http://schemas.openxmlformats.org/officeDocument/2006/relationships" xmlns:p="http://schemas.openxmlformats.org/presentationml/2006/main">
+<p:sld xmlns:a="http://schemas.openxmlformats.org/drawingml/2006/main" xmlns:r="http://schemas.openxmlformats.org/officeDocument/2006/relationships" xmlns:mc="http://schemas.openxmlformats.org/markup-compatibility/2006" xmlns:mv="urn:schemas-microsoft-com:mac:vml" xmlns:p="http://schemas.openxmlformats.org/presentationml/2006/main" mc:Ignorable="mv" mc:PreserveAttributes="mv:*">
   <p:cSld>
     <p:spTree>
       <p:nvGrpSpPr>
@@ -12554,7 +13616,7 @@
     </p:spTree>
     <p:extLst>
       <p:ext uri="{BB962C8B-B14F-4D97-AF65-F5344CB8AC3E}">
-        <p14:creationId xmlns:p14="http://schemas.microsoft.com/office/powerpoint/2010/main" val="1392206460"/>
+        <p14:creationId xmlns:p14="http://schemas.microsoft.com/office/powerpoint/2010/main" xmlns:p="http://schemas.openxmlformats.org/presentationml/2006/main" xmlns:r="http://schemas.openxmlformats.org/officeDocument/2006/relationships" xmlns:a="http://schemas.openxmlformats.org/drawingml/2006/main" xmlns="" val="1392206460"/>
       </p:ext>
     </p:extLst>
   </p:cSld>
@@ -12565,7 +13627,7 @@
 </file>
 
 <file path=ppt/slides/slide6.xml><?xml version="1.0" encoding="utf-8"?>
-<p:sld xmlns:a="http://schemas.openxmlformats.org/drawingml/2006/main" xmlns:r="http://schemas.openxmlformats.org/officeDocument/2006/relationships" xmlns:p="http://schemas.openxmlformats.org/presentationml/2006/main">
+<p:sld xmlns:a="http://schemas.openxmlformats.org/drawingml/2006/main" xmlns:r="http://schemas.openxmlformats.org/officeDocument/2006/relationships" xmlns:mc="http://schemas.openxmlformats.org/markup-compatibility/2006" xmlns:mv="urn:schemas-microsoft-com:mac:vml" xmlns:p="http://schemas.openxmlformats.org/presentationml/2006/main" mc:Ignorable="mv" mc:PreserveAttributes="mv:*">
   <p:cSld>
     <p:spTree>
       <p:nvGrpSpPr>
@@ -12637,7 +13699,7 @@
           <a:effectLst/>
           <a:extLst>
             <a:ext uri="{91240B29-F687-4F45-9708-019B960494DF}">
-              <a14:hiddenLine xmlns:a14="http://schemas.microsoft.com/office/drawing/2010/main" w="9525">
+              <a14:hiddenLine xmlns:a14="http://schemas.microsoft.com/office/drawing/2010/main" xmlns:p="http://schemas.openxmlformats.org/presentationml/2006/main" xmlns:r="http://schemas.openxmlformats.org/officeDocument/2006/relationships" xmlns:a="http://schemas.openxmlformats.org/drawingml/2006/main" xmlns="" w="9525">
                 <a:solidFill>
                   <a:schemeClr val="tx1"/>
                 </a:solidFill>
@@ -12647,7 +13709,7 @@
               </a14:hiddenLine>
             </a:ext>
             <a:ext uri="{AF507438-7753-43E0-B8FC-AC1667EBCBE1}">
-              <a14:hiddenEffects xmlns:a14="http://schemas.microsoft.com/office/drawing/2010/main">
+              <a14:hiddenEffects xmlns:a14="http://schemas.microsoft.com/office/drawing/2010/main" xmlns:p="http://schemas.openxmlformats.org/presentationml/2006/main" xmlns:r="http://schemas.openxmlformats.org/officeDocument/2006/relationships" xmlns:a="http://schemas.openxmlformats.org/drawingml/2006/main" xmlns="">
                 <a:effectLst>
                   <a:outerShdw dist="35921" dir="2700000" algn="ctr" rotWithShape="0">
                     <a:schemeClr val="bg2"/>
@@ -13066,7 +14128,7 @@
     </p:spTree>
     <p:extLst>
       <p:ext uri="{BB962C8B-B14F-4D97-AF65-F5344CB8AC3E}">
-        <p14:creationId xmlns:p14="http://schemas.microsoft.com/office/powerpoint/2010/main" val="831135114"/>
+        <p14:creationId xmlns:p14="http://schemas.microsoft.com/office/powerpoint/2010/main" xmlns:p="http://schemas.openxmlformats.org/presentationml/2006/main" xmlns:r="http://schemas.openxmlformats.org/officeDocument/2006/relationships" xmlns:a="http://schemas.openxmlformats.org/drawingml/2006/main" xmlns="" val="831135114"/>
       </p:ext>
     </p:extLst>
   </p:cSld>
@@ -13077,7 +14139,7 @@
 </file>
 
 <file path=ppt/slides/slide7.xml><?xml version="1.0" encoding="utf-8"?>
-<p:sld xmlns:a="http://schemas.openxmlformats.org/drawingml/2006/main" xmlns:r="http://schemas.openxmlformats.org/officeDocument/2006/relationships" xmlns:p="http://schemas.openxmlformats.org/presentationml/2006/main">
+<p:sld xmlns:a="http://schemas.openxmlformats.org/drawingml/2006/main" xmlns:r="http://schemas.openxmlformats.org/officeDocument/2006/relationships" xmlns:mc="http://schemas.openxmlformats.org/markup-compatibility/2006" xmlns:mv="urn:schemas-microsoft-com:mac:vml" xmlns:p="http://schemas.openxmlformats.org/presentationml/2006/main" mc:Ignorable="mv" mc:PreserveAttributes="mv:*">
   <p:cSld>
     <p:spTree>
       <p:nvGrpSpPr>
@@ -13118,11 +14180,7 @@
             </a:pPr>
             <a:r>
               <a:rPr lang="en-US" b="1" dirty="0" err="1" smtClean="0"/>
-              <a:t>makeObject</a:t>
-            </a:r>
-            <a:r>
-              <a:rPr lang="en-US" b="1" dirty="0" err="1" smtClean="0"/>
-              <a:t>.java</a:t>
+              <a:t>makeObject.java</a:t>
             </a:r>
             <a:endParaRPr lang="en-US" b="1" dirty="0"/>
           </a:p>
@@ -13153,7 +14211,7 @@
           <a:effectLst/>
           <a:extLst>
             <a:ext uri="{91240B29-F687-4F45-9708-019B960494DF}">
-              <a14:hiddenLine xmlns:a14="http://schemas.microsoft.com/office/drawing/2010/main" w="9525">
+              <a14:hiddenLine xmlns:a14="http://schemas.microsoft.com/office/drawing/2010/main" xmlns:p="http://schemas.openxmlformats.org/presentationml/2006/main" xmlns:r="http://schemas.openxmlformats.org/officeDocument/2006/relationships" xmlns:a="http://schemas.openxmlformats.org/drawingml/2006/main" xmlns="" w="9525">
                 <a:solidFill>
                   <a:schemeClr val="tx1"/>
                 </a:solidFill>
@@ -13163,7 +14221,7 @@
               </a14:hiddenLine>
             </a:ext>
             <a:ext uri="{AF507438-7753-43E0-B8FC-AC1667EBCBE1}">
-              <a14:hiddenEffects xmlns:a14="http://schemas.microsoft.com/office/drawing/2010/main">
+              <a14:hiddenEffects xmlns:a14="http://schemas.microsoft.com/office/drawing/2010/main" xmlns:p="http://schemas.openxmlformats.org/presentationml/2006/main" xmlns:r="http://schemas.openxmlformats.org/officeDocument/2006/relationships" xmlns:a="http://schemas.openxmlformats.org/drawingml/2006/main" xmlns="">
                 <a:effectLst>
                   <a:outerShdw dist="35921" dir="2700000" algn="ctr" rotWithShape="0">
                     <a:schemeClr val="bg2"/>
@@ -13505,18 +14563,25 @@
     </p:spTree>
     <p:extLst>
       <p:ext uri="{BB962C8B-B14F-4D97-AF65-F5344CB8AC3E}">
-        <p14:creationId xmlns:p14="http://schemas.microsoft.com/office/powerpoint/2010/main" val="1654220910"/>
+        <p14:creationId xmlns:p14="http://schemas.microsoft.com/office/powerpoint/2010/main" xmlns:p="http://schemas.openxmlformats.org/presentationml/2006/main" xmlns:r="http://schemas.openxmlformats.org/officeDocument/2006/relationships" xmlns:a="http://schemas.openxmlformats.org/drawingml/2006/main" xmlns="" val="1654220910"/>
       </p:ext>
     </p:extLst>
   </p:cSld>
   <p:clrMapOvr>
     <a:masterClrMapping/>
   </p:clrMapOvr>
+  <p:timing>
+    <p:tnLst>
+      <p:par>
+        <p:cTn id="1" dur="indefinite" restart="never" nodeType="tmRoot"/>
+      </p:par>
+    </p:tnLst>
+  </p:timing>
 </p:sld>
 </file>
 
 <file path=ppt/slides/slide8.xml><?xml version="1.0" encoding="utf-8"?>
-<p:sld xmlns:a="http://schemas.openxmlformats.org/drawingml/2006/main" xmlns:r="http://schemas.openxmlformats.org/officeDocument/2006/relationships" xmlns:p="http://schemas.openxmlformats.org/presentationml/2006/main">
+<p:sld xmlns:a="http://schemas.openxmlformats.org/drawingml/2006/main" xmlns:r="http://schemas.openxmlformats.org/officeDocument/2006/relationships" xmlns:mc="http://schemas.openxmlformats.org/markup-compatibility/2006" xmlns:mv="urn:schemas-microsoft-com:mac:vml" xmlns:p="http://schemas.openxmlformats.org/presentationml/2006/main" mc:Ignorable="mv" mc:PreserveAttributes="mv:*">
   <p:cSld>
     <p:spTree>
       <p:nvGrpSpPr>
@@ -13588,7 +14653,7 @@
           <a:effectLst/>
           <a:extLst>
             <a:ext uri="{91240B29-F687-4F45-9708-019B960494DF}">
-              <a14:hiddenLine xmlns:a14="http://schemas.microsoft.com/office/drawing/2010/main" w="9525">
+              <a14:hiddenLine xmlns:a14="http://schemas.microsoft.com/office/drawing/2010/main" xmlns:p="http://schemas.openxmlformats.org/presentationml/2006/main" xmlns:r="http://schemas.openxmlformats.org/officeDocument/2006/relationships" xmlns:a="http://schemas.openxmlformats.org/drawingml/2006/main" xmlns="" w="9525">
                 <a:solidFill>
                   <a:schemeClr val="tx1"/>
                 </a:solidFill>
@@ -13598,7 +14663,7 @@
               </a14:hiddenLine>
             </a:ext>
             <a:ext uri="{AF507438-7753-43E0-B8FC-AC1667EBCBE1}">
-              <a14:hiddenEffects xmlns:a14="http://schemas.microsoft.com/office/drawing/2010/main">
+              <a14:hiddenEffects xmlns:a14="http://schemas.microsoft.com/office/drawing/2010/main" xmlns:p="http://schemas.openxmlformats.org/presentationml/2006/main" xmlns:r="http://schemas.openxmlformats.org/officeDocument/2006/relationships" xmlns:a="http://schemas.openxmlformats.org/drawingml/2006/main" xmlns="">
                 <a:effectLst>
                   <a:outerShdw dist="35921" dir="2700000" algn="ctr" rotWithShape="0">
                     <a:schemeClr val="bg2"/>
@@ -13945,18 +15010,25 @@
     </p:spTree>
     <p:extLst>
       <p:ext uri="{BB962C8B-B14F-4D97-AF65-F5344CB8AC3E}">
-        <p14:creationId xmlns:p14="http://schemas.microsoft.com/office/powerpoint/2010/main" val="1513552757"/>
+        <p14:creationId xmlns:p14="http://schemas.microsoft.com/office/powerpoint/2010/main" xmlns:p="http://schemas.openxmlformats.org/presentationml/2006/main" xmlns:r="http://schemas.openxmlformats.org/officeDocument/2006/relationships" xmlns:a="http://schemas.openxmlformats.org/drawingml/2006/main" xmlns="" val="1513552757"/>
       </p:ext>
     </p:extLst>
   </p:cSld>
   <p:clrMapOvr>
     <a:masterClrMapping/>
   </p:clrMapOvr>
+  <p:timing>
+    <p:tnLst>
+      <p:par>
+        <p:cTn id="1" dur="indefinite" restart="never" nodeType="tmRoot"/>
+      </p:par>
+    </p:tnLst>
+  </p:timing>
 </p:sld>
 </file>
 
 <file path=ppt/slides/slide9.xml><?xml version="1.0" encoding="utf-8"?>
-<p:sld xmlns:a="http://schemas.openxmlformats.org/drawingml/2006/main" xmlns:r="http://schemas.openxmlformats.org/officeDocument/2006/relationships" xmlns:p="http://schemas.openxmlformats.org/presentationml/2006/main">
+<p:sld xmlns:a="http://schemas.openxmlformats.org/drawingml/2006/main" xmlns:r="http://schemas.openxmlformats.org/officeDocument/2006/relationships" xmlns:mc="http://schemas.openxmlformats.org/markup-compatibility/2006" xmlns:mv="urn:schemas-microsoft-com:mac:vml" xmlns:p="http://schemas.openxmlformats.org/presentationml/2006/main" mc:Ignorable="mv" mc:PreserveAttributes="mv:*">
   <p:cSld>
     <p:spTree>
       <p:nvGrpSpPr>
@@ -14028,7 +15100,7 @@
           <a:effectLst/>
           <a:extLst>
             <a:ext uri="{91240B29-F687-4F45-9708-019B960494DF}">
-              <a14:hiddenLine xmlns:a14="http://schemas.microsoft.com/office/drawing/2010/main" w="9525">
+              <a14:hiddenLine xmlns:a14="http://schemas.microsoft.com/office/drawing/2010/main" xmlns:p="http://schemas.openxmlformats.org/presentationml/2006/main" xmlns:r="http://schemas.openxmlformats.org/officeDocument/2006/relationships" xmlns:a="http://schemas.openxmlformats.org/drawingml/2006/main" xmlns="" w="9525">
                 <a:solidFill>
                   <a:schemeClr val="tx1"/>
                 </a:solidFill>
@@ -14038,7 +15110,7 @@
               </a14:hiddenLine>
             </a:ext>
             <a:ext uri="{AF507438-7753-43E0-B8FC-AC1667EBCBE1}">
-              <a14:hiddenEffects xmlns:a14="http://schemas.microsoft.com/office/drawing/2010/main">
+              <a14:hiddenEffects xmlns:a14="http://schemas.microsoft.com/office/drawing/2010/main" xmlns:p="http://schemas.openxmlformats.org/presentationml/2006/main" xmlns:r="http://schemas.openxmlformats.org/officeDocument/2006/relationships" xmlns:a="http://schemas.openxmlformats.org/drawingml/2006/main" xmlns="">
                 <a:effectLst>
                   <a:outerShdw dist="35921" dir="2700000" algn="ctr" rotWithShape="0">
                     <a:schemeClr val="bg2"/>
@@ -14449,13 +15521,20 @@
     </p:spTree>
     <p:extLst>
       <p:ext uri="{BB962C8B-B14F-4D97-AF65-F5344CB8AC3E}">
-        <p14:creationId xmlns:p14="http://schemas.microsoft.com/office/powerpoint/2010/main" val="1314616115"/>
+        <p14:creationId xmlns:p14="http://schemas.microsoft.com/office/powerpoint/2010/main" xmlns:p="http://schemas.openxmlformats.org/presentationml/2006/main" xmlns:r="http://schemas.openxmlformats.org/officeDocument/2006/relationships" xmlns:a="http://schemas.openxmlformats.org/drawingml/2006/main" xmlns="" val="1314616115"/>
       </p:ext>
     </p:extLst>
   </p:cSld>
   <p:clrMapOvr>
     <a:masterClrMapping/>
   </p:clrMapOvr>
+  <p:timing>
+    <p:tnLst>
+      <p:par>
+        <p:cTn id="1" dur="indefinite" restart="never" nodeType="tmRoot"/>
+      </p:par>
+    </p:tnLst>
+  </p:timing>
 </p:sld>
 </file>
 

</xml_diff>

<commit_message>
added bug fix to pptx
</commit_message>
<xml_diff>
--- a/PLFinal.pptx
+++ b/PLFinal.pptx
@@ -1,12 +1,12 @@
 
 <file path=ppt/presentation.xml><?xml version="1.0" encoding="utf-8"?>
-<p:presentation xmlns:a="http://schemas.openxmlformats.org/drawingml/2006/main" xmlns:r="http://schemas.openxmlformats.org/officeDocument/2006/relationships" xmlns:mc="http://schemas.openxmlformats.org/markup-compatibility/2006" xmlns:mv="urn:schemas-microsoft-com:mac:vml" xmlns:p="http://schemas.openxmlformats.org/presentationml/2006/main" mc:Ignorable="mv" mc:PreserveAttributes="mv:*" strictFirstAndLastChars="0" saveSubsetFonts="1">
+<p:presentation xmlns:a="http://schemas.openxmlformats.org/drawingml/2006/main" xmlns:r="http://schemas.openxmlformats.org/officeDocument/2006/relationships" xmlns:p="http://schemas.openxmlformats.org/presentationml/2006/main" strictFirstAndLastChars="0" saveSubsetFonts="1">
   <p:sldMasterIdLst>
     <p:sldMasterId id="2147483659" r:id="rId1"/>
     <p:sldMasterId id="2147483669" r:id="rId2"/>
   </p:sldMasterIdLst>
   <p:notesMasterIdLst>
-    <p:notesMasterId r:id="rId22"/>
+    <p:notesMasterId r:id="rId24"/>
   </p:notesMasterIdLst>
   <p:sldIdLst>
     <p:sldId id="709" r:id="rId3"/>
@@ -22,12 +22,14 @@
     <p:sldId id="714" r:id="rId13"/>
     <p:sldId id="715" r:id="rId14"/>
     <p:sldId id="716" r:id="rId15"/>
-    <p:sldId id="731" r:id="rId16"/>
-    <p:sldId id="732" r:id="rId17"/>
-    <p:sldId id="733" r:id="rId18"/>
-    <p:sldId id="734" r:id="rId19"/>
-    <p:sldId id="735" r:id="rId20"/>
-    <p:sldId id="736" r:id="rId21"/>
+    <p:sldId id="737" r:id="rId16"/>
+    <p:sldId id="738" r:id="rId17"/>
+    <p:sldId id="731" r:id="rId18"/>
+    <p:sldId id="732" r:id="rId19"/>
+    <p:sldId id="733" r:id="rId20"/>
+    <p:sldId id="734" r:id="rId21"/>
+    <p:sldId id="735" r:id="rId22"/>
+    <p:sldId id="736" r:id="rId23"/>
   </p:sldIdLst>
   <p:sldSz cx="9144000" cy="6858000" type="screen4x3"/>
   <p:notesSz cx="6858000" cy="9313863"/>
@@ -158,7 +160,7 @@
   </p:defaultTextStyle>
   <p:extLst>
     <p:ext uri="{EFAFB233-063F-42B5-8137-9DF3F51BA10A}">
-      <p15:sldGuideLst xmlns:p15="http://schemas.microsoft.com/office/powerpoint/2012/main" xmlns:p="http://schemas.openxmlformats.org/presentationml/2006/main" xmlns:r="http://schemas.openxmlformats.org/officeDocument/2006/relationships" xmlns:a="http://schemas.openxmlformats.org/drawingml/2006/main" xmlns="">
+      <p15:sldGuideLst xmlns:p15="http://schemas.microsoft.com/office/powerpoint/2012/main">
         <p15:guide id="1" orient="horz" pos="2160">
           <p15:clr>
             <a:srgbClr val="A4A3A4"/>
@@ -176,7 +178,7 @@
 </file>
 
 <file path=ppt/notesMasters/notesMaster1.xml><?xml version="1.0" encoding="utf-8"?>
-<p:notesMaster xmlns:a="http://schemas.openxmlformats.org/drawingml/2006/main" xmlns:r="http://schemas.openxmlformats.org/officeDocument/2006/relationships" xmlns:mc="http://schemas.openxmlformats.org/markup-compatibility/2006" xmlns:mv="urn:schemas-microsoft-com:mac:vml" xmlns:p="http://schemas.openxmlformats.org/presentationml/2006/main" mc:Ignorable="mv" mc:PreserveAttributes="mv:*">
+<p:notesMaster xmlns:a="http://schemas.openxmlformats.org/drawingml/2006/main" xmlns:r="http://schemas.openxmlformats.org/officeDocument/2006/relationships" xmlns:p="http://schemas.openxmlformats.org/presentationml/2006/main">
   <p:cSld>
     <p:bg>
       <p:bgPr>
@@ -509,7 +511,7 @@
     </p:spTree>
     <p:extLst>
       <p:ext uri="{BB962C8B-B14F-4D97-AF65-F5344CB8AC3E}">
-        <p14:creationId xmlns:p14="http://schemas.microsoft.com/office/powerpoint/2010/main" xmlns:p="http://schemas.openxmlformats.org/presentationml/2006/main" xmlns:r="http://schemas.openxmlformats.org/officeDocument/2006/relationships" xmlns:a="http://schemas.openxmlformats.org/drawingml/2006/main" xmlns="" val="1509097956"/>
+        <p14:creationId xmlns:p14="http://schemas.microsoft.com/office/powerpoint/2010/main" val="1509097956"/>
       </p:ext>
     </p:extLst>
   </p:cSld>
@@ -640,7 +642,7 @@
 </file>
 
 <file path=ppt/slideLayouts/slideLayout1.xml><?xml version="1.0" encoding="utf-8"?>
-<p:sldLayout xmlns:a="http://schemas.openxmlformats.org/drawingml/2006/main" xmlns:r="http://schemas.openxmlformats.org/officeDocument/2006/relationships" xmlns:mc="http://schemas.openxmlformats.org/markup-compatibility/2006" xmlns:mv="urn:schemas-microsoft-com:mac:vml" xmlns:p="http://schemas.openxmlformats.org/presentationml/2006/main" mc:Ignorable="mv" mc:PreserveAttributes="mv:*" type="title" preserve="1">
+<p:sldLayout xmlns:a="http://schemas.openxmlformats.org/drawingml/2006/main" xmlns:r="http://schemas.openxmlformats.org/officeDocument/2006/relationships" xmlns:p="http://schemas.openxmlformats.org/presentationml/2006/main" type="title" preserve="1">
   <p:cSld name="Title Slide">
     <p:spTree>
       <p:nvGrpSpPr>
@@ -817,7 +819,7 @@
     </p:spTree>
     <p:extLst>
       <p:ext uri="{BB962C8B-B14F-4D97-AF65-F5344CB8AC3E}">
-        <p14:creationId xmlns:p14="http://schemas.microsoft.com/office/powerpoint/2010/main" xmlns:p="http://schemas.openxmlformats.org/presentationml/2006/main" xmlns:r="http://schemas.openxmlformats.org/officeDocument/2006/relationships" xmlns:a="http://schemas.openxmlformats.org/drawingml/2006/main" xmlns="" val="1561331072"/>
+        <p14:creationId xmlns:p14="http://schemas.microsoft.com/office/powerpoint/2010/main" val="1561331072"/>
       </p:ext>
     </p:extLst>
   </p:cSld>
@@ -828,7 +830,7 @@
 </file>
 
 <file path=ppt/slideLayouts/slideLayout10.xml><?xml version="1.0" encoding="utf-8"?>
-<p:sldLayout xmlns:a="http://schemas.openxmlformats.org/drawingml/2006/main" xmlns:r="http://schemas.openxmlformats.org/officeDocument/2006/relationships" xmlns:mc="http://schemas.openxmlformats.org/markup-compatibility/2006" xmlns:mv="urn:schemas-microsoft-com:mac:vml" xmlns:p="http://schemas.openxmlformats.org/presentationml/2006/main" mc:Ignorable="mv" mc:PreserveAttributes="mv:*" type="twoObj" preserve="1">
+<p:sldLayout xmlns:a="http://schemas.openxmlformats.org/drawingml/2006/main" xmlns:r="http://schemas.openxmlformats.org/officeDocument/2006/relationships" xmlns:p="http://schemas.openxmlformats.org/presentationml/2006/main" type="twoObj" preserve="1">
   <p:cSld name="Two Content">
     <p:spTree>
       <p:nvGrpSpPr>
@@ -1037,7 +1039,7 @@
     </p:spTree>
     <p:extLst>
       <p:ext uri="{BB962C8B-B14F-4D97-AF65-F5344CB8AC3E}">
-        <p14:creationId xmlns:p14="http://schemas.microsoft.com/office/powerpoint/2010/main" xmlns:p="http://schemas.openxmlformats.org/presentationml/2006/main" xmlns:r="http://schemas.openxmlformats.org/officeDocument/2006/relationships" xmlns:a="http://schemas.openxmlformats.org/drawingml/2006/main" xmlns="" val="354043779"/>
+        <p14:creationId xmlns:p14="http://schemas.microsoft.com/office/powerpoint/2010/main" val="354043779"/>
       </p:ext>
     </p:extLst>
   </p:cSld>
@@ -1048,7 +1050,7 @@
 </file>
 
 <file path=ppt/slideLayouts/slideLayout11.xml><?xml version="1.0" encoding="utf-8"?>
-<p:sldLayout xmlns:a="http://schemas.openxmlformats.org/drawingml/2006/main" xmlns:r="http://schemas.openxmlformats.org/officeDocument/2006/relationships" xmlns:mc="http://schemas.openxmlformats.org/markup-compatibility/2006" xmlns:mv="urn:schemas-microsoft-com:mac:vml" xmlns:p="http://schemas.openxmlformats.org/presentationml/2006/main" mc:Ignorable="mv" mc:PreserveAttributes="mv:*" preserve="1" userDrawn="1">
+<p:sldLayout xmlns:a="http://schemas.openxmlformats.org/drawingml/2006/main" xmlns:r="http://schemas.openxmlformats.org/officeDocument/2006/relationships" xmlns:p="http://schemas.openxmlformats.org/presentationml/2006/main" preserve="1" userDrawn="1">
   <p:cSld name="Content with Caption">
     <p:spTree>
       <p:nvGrpSpPr>
@@ -1247,7 +1249,7 @@
     </p:spTree>
     <p:extLst>
       <p:ext uri="{BB962C8B-B14F-4D97-AF65-F5344CB8AC3E}">
-        <p14:creationId xmlns:p14="http://schemas.microsoft.com/office/powerpoint/2010/main" xmlns:p="http://schemas.openxmlformats.org/presentationml/2006/main" xmlns:r="http://schemas.openxmlformats.org/officeDocument/2006/relationships" xmlns:a="http://schemas.openxmlformats.org/drawingml/2006/main" xmlns="" val="2349021776"/>
+        <p14:creationId xmlns:p14="http://schemas.microsoft.com/office/powerpoint/2010/main" val="2349021776"/>
       </p:ext>
     </p:extLst>
   </p:cSld>
@@ -1258,7 +1260,7 @@
 </file>
 
 <file path=ppt/slideLayouts/slideLayout12.xml><?xml version="1.0" encoding="utf-8"?>
-<p:sldLayout xmlns:a="http://schemas.openxmlformats.org/drawingml/2006/main" xmlns:r="http://schemas.openxmlformats.org/officeDocument/2006/relationships" xmlns:mc="http://schemas.openxmlformats.org/markup-compatibility/2006" xmlns:mv="urn:schemas-microsoft-com:mac:vml" xmlns:p="http://schemas.openxmlformats.org/presentationml/2006/main" mc:Ignorable="mv" mc:PreserveAttributes="mv:*" preserve="1" userDrawn="1">
+<p:sldLayout xmlns:a="http://schemas.openxmlformats.org/drawingml/2006/main" xmlns:r="http://schemas.openxmlformats.org/officeDocument/2006/relationships" xmlns:p="http://schemas.openxmlformats.org/presentationml/2006/main" preserve="1" userDrawn="1">
   <p:cSld name="Picture with Caption">
     <p:spTree>
       <p:nvGrpSpPr>
@@ -1434,7 +1436,7 @@
     </p:spTree>
     <p:extLst>
       <p:ext uri="{BB962C8B-B14F-4D97-AF65-F5344CB8AC3E}">
-        <p14:creationId xmlns:p14="http://schemas.microsoft.com/office/powerpoint/2010/main" xmlns:p="http://schemas.openxmlformats.org/presentationml/2006/main" xmlns:r="http://schemas.openxmlformats.org/officeDocument/2006/relationships" xmlns:a="http://schemas.openxmlformats.org/drawingml/2006/main" xmlns="" val="4026708166"/>
+        <p14:creationId xmlns:p14="http://schemas.microsoft.com/office/powerpoint/2010/main" val="4026708166"/>
       </p:ext>
     </p:extLst>
   </p:cSld>
@@ -1445,7 +1447,7 @@
 </file>
 
 <file path=ppt/slideLayouts/slideLayout2.xml><?xml version="1.0" encoding="utf-8"?>
-<p:sldLayout xmlns:a="http://schemas.openxmlformats.org/drawingml/2006/main" xmlns:r="http://schemas.openxmlformats.org/officeDocument/2006/relationships" xmlns:mc="http://schemas.openxmlformats.org/markup-compatibility/2006" xmlns:mv="urn:schemas-microsoft-com:mac:vml" xmlns:p="http://schemas.openxmlformats.org/presentationml/2006/main" mc:Ignorable="mv" mc:PreserveAttributes="mv:*" type="obj" preserve="1">
+<p:sldLayout xmlns:a="http://schemas.openxmlformats.org/drawingml/2006/main" xmlns:r="http://schemas.openxmlformats.org/officeDocument/2006/relationships" xmlns:p="http://schemas.openxmlformats.org/presentationml/2006/main" type="obj" preserve="1">
   <p:cSld name="Title and Content">
     <p:spTree>
       <p:nvGrpSpPr>
@@ -1547,7 +1549,7 @@
     </p:spTree>
     <p:extLst>
       <p:ext uri="{BB962C8B-B14F-4D97-AF65-F5344CB8AC3E}">
-        <p14:creationId xmlns:p14="http://schemas.microsoft.com/office/powerpoint/2010/main" xmlns:p="http://schemas.openxmlformats.org/presentationml/2006/main" xmlns:r="http://schemas.openxmlformats.org/officeDocument/2006/relationships" xmlns:a="http://schemas.openxmlformats.org/drawingml/2006/main" xmlns="" val="3930783467"/>
+        <p14:creationId xmlns:p14="http://schemas.microsoft.com/office/powerpoint/2010/main" val="3930783467"/>
       </p:ext>
     </p:extLst>
   </p:cSld>
@@ -1558,7 +1560,7 @@
 </file>
 
 <file path=ppt/slideLayouts/slideLayout3.xml><?xml version="1.0" encoding="utf-8"?>
-<p:sldLayout xmlns:a="http://schemas.openxmlformats.org/drawingml/2006/main" xmlns:r="http://schemas.openxmlformats.org/officeDocument/2006/relationships" xmlns:mc="http://schemas.openxmlformats.org/markup-compatibility/2006" xmlns:mv="urn:schemas-microsoft-com:mac:vml" xmlns:p="http://schemas.openxmlformats.org/presentationml/2006/main" mc:Ignorable="mv" mc:PreserveAttributes="mv:*" preserve="1" userDrawn="1">
+<p:sldLayout xmlns:a="http://schemas.openxmlformats.org/drawingml/2006/main" xmlns:r="http://schemas.openxmlformats.org/officeDocument/2006/relationships" xmlns:p="http://schemas.openxmlformats.org/presentationml/2006/main" preserve="1" userDrawn="1">
   <p:cSld name="Section Header">
     <p:spTree>
       <p:nvGrpSpPr>
@@ -1731,7 +1733,7 @@
     </p:spTree>
     <p:extLst>
       <p:ext uri="{BB962C8B-B14F-4D97-AF65-F5344CB8AC3E}">
-        <p14:creationId xmlns:p14="http://schemas.microsoft.com/office/powerpoint/2010/main" xmlns:p="http://schemas.openxmlformats.org/presentationml/2006/main" xmlns:r="http://schemas.openxmlformats.org/officeDocument/2006/relationships" xmlns:a="http://schemas.openxmlformats.org/drawingml/2006/main" xmlns="" val="1685988487"/>
+        <p14:creationId xmlns:p14="http://schemas.microsoft.com/office/powerpoint/2010/main" val="1685988487"/>
       </p:ext>
     </p:extLst>
   </p:cSld>
@@ -1742,7 +1744,7 @@
 </file>
 
 <file path=ppt/slideLayouts/slideLayout4.xml><?xml version="1.0" encoding="utf-8"?>
-<p:sldLayout xmlns:a="http://schemas.openxmlformats.org/drawingml/2006/main" xmlns:r="http://schemas.openxmlformats.org/officeDocument/2006/relationships" xmlns:mc="http://schemas.openxmlformats.org/markup-compatibility/2006" xmlns:mv="urn:schemas-microsoft-com:mac:vml" xmlns:p="http://schemas.openxmlformats.org/presentationml/2006/main" mc:Ignorable="mv" mc:PreserveAttributes="mv:*" type="twoObj" preserve="1">
+<p:sldLayout xmlns:a="http://schemas.openxmlformats.org/drawingml/2006/main" xmlns:r="http://schemas.openxmlformats.org/officeDocument/2006/relationships" xmlns:p="http://schemas.openxmlformats.org/presentationml/2006/main" type="twoObj" preserve="1">
   <p:cSld name="Two Content">
     <p:spTree>
       <p:nvGrpSpPr>
@@ -1951,7 +1953,7 @@
     </p:spTree>
     <p:extLst>
       <p:ext uri="{BB962C8B-B14F-4D97-AF65-F5344CB8AC3E}">
-        <p14:creationId xmlns:p14="http://schemas.microsoft.com/office/powerpoint/2010/main" xmlns:p="http://schemas.openxmlformats.org/presentationml/2006/main" xmlns:r="http://schemas.openxmlformats.org/officeDocument/2006/relationships" xmlns:a="http://schemas.openxmlformats.org/drawingml/2006/main" xmlns="" val="1606750907"/>
+        <p14:creationId xmlns:p14="http://schemas.microsoft.com/office/powerpoint/2010/main" val="1606750907"/>
       </p:ext>
     </p:extLst>
   </p:cSld>
@@ -1962,7 +1964,7 @@
 </file>
 
 <file path=ppt/slideLayouts/slideLayout5.xml><?xml version="1.0" encoding="utf-8"?>
-<p:sldLayout xmlns:a="http://schemas.openxmlformats.org/drawingml/2006/main" xmlns:r="http://schemas.openxmlformats.org/officeDocument/2006/relationships" xmlns:mc="http://schemas.openxmlformats.org/markup-compatibility/2006" xmlns:mv="urn:schemas-microsoft-com:mac:vml" xmlns:p="http://schemas.openxmlformats.org/presentationml/2006/main" mc:Ignorable="mv" mc:PreserveAttributes="mv:*" type="objTx" preserve="1">
+<p:sldLayout xmlns:a="http://schemas.openxmlformats.org/drawingml/2006/main" xmlns:r="http://schemas.openxmlformats.org/officeDocument/2006/relationships" xmlns:p="http://schemas.openxmlformats.org/presentationml/2006/main" type="objTx" preserve="1">
   <p:cSld name="Content with Caption">
     <p:spTree>
       <p:nvGrpSpPr>
@@ -2161,7 +2163,7 @@
     </p:spTree>
     <p:extLst>
       <p:ext uri="{BB962C8B-B14F-4D97-AF65-F5344CB8AC3E}">
-        <p14:creationId xmlns:p14="http://schemas.microsoft.com/office/powerpoint/2010/main" xmlns:p="http://schemas.openxmlformats.org/presentationml/2006/main" xmlns:r="http://schemas.openxmlformats.org/officeDocument/2006/relationships" xmlns:a="http://schemas.openxmlformats.org/drawingml/2006/main" xmlns="" val="2436964475"/>
+        <p14:creationId xmlns:p14="http://schemas.microsoft.com/office/powerpoint/2010/main" val="2436964475"/>
       </p:ext>
     </p:extLst>
   </p:cSld>
@@ -2172,7 +2174,7 @@
 </file>
 
 <file path=ppt/slideLayouts/slideLayout6.xml><?xml version="1.0" encoding="utf-8"?>
-<p:sldLayout xmlns:a="http://schemas.openxmlformats.org/drawingml/2006/main" xmlns:r="http://schemas.openxmlformats.org/officeDocument/2006/relationships" xmlns:mc="http://schemas.openxmlformats.org/markup-compatibility/2006" xmlns:mv="urn:schemas-microsoft-com:mac:vml" xmlns:p="http://schemas.openxmlformats.org/presentationml/2006/main" mc:Ignorable="mv" mc:PreserveAttributes="mv:*" type="picTx" preserve="1">
+<p:sldLayout xmlns:a="http://schemas.openxmlformats.org/drawingml/2006/main" xmlns:r="http://schemas.openxmlformats.org/officeDocument/2006/relationships" xmlns:p="http://schemas.openxmlformats.org/presentationml/2006/main" type="picTx" preserve="1">
   <p:cSld name="Picture with Caption">
     <p:spTree>
       <p:nvGrpSpPr>
@@ -2348,7 +2350,7 @@
     </p:spTree>
     <p:extLst>
       <p:ext uri="{BB962C8B-B14F-4D97-AF65-F5344CB8AC3E}">
-        <p14:creationId xmlns:p14="http://schemas.microsoft.com/office/powerpoint/2010/main" xmlns:p="http://schemas.openxmlformats.org/presentationml/2006/main" xmlns:r="http://schemas.openxmlformats.org/officeDocument/2006/relationships" xmlns:a="http://schemas.openxmlformats.org/drawingml/2006/main" xmlns="" val="436138400"/>
+        <p14:creationId xmlns:p14="http://schemas.microsoft.com/office/powerpoint/2010/main" val="436138400"/>
       </p:ext>
     </p:extLst>
   </p:cSld>
@@ -2359,7 +2361,7 @@
 </file>
 
 <file path=ppt/slideLayouts/slideLayout7.xml><?xml version="1.0" encoding="utf-8"?>
-<p:sldLayout xmlns:a="http://schemas.openxmlformats.org/drawingml/2006/main" xmlns:r="http://schemas.openxmlformats.org/officeDocument/2006/relationships" xmlns:mc="http://schemas.openxmlformats.org/markup-compatibility/2006" xmlns:mv="urn:schemas-microsoft-com:mac:vml" xmlns:p="http://schemas.openxmlformats.org/presentationml/2006/main" mc:Ignorable="mv" mc:PreserveAttributes="mv:*" type="title" preserve="1">
+<p:sldLayout xmlns:a="http://schemas.openxmlformats.org/drawingml/2006/main" xmlns:r="http://schemas.openxmlformats.org/officeDocument/2006/relationships" xmlns:p="http://schemas.openxmlformats.org/presentationml/2006/main" type="title" preserve="1">
   <p:cSld name="Title Slide">
     <p:spTree>
       <p:nvGrpSpPr>
@@ -2523,7 +2525,7 @@
     </p:spTree>
     <p:extLst>
       <p:ext uri="{BB962C8B-B14F-4D97-AF65-F5344CB8AC3E}">
-        <p14:creationId xmlns:p14="http://schemas.microsoft.com/office/powerpoint/2010/main" xmlns:p="http://schemas.openxmlformats.org/presentationml/2006/main" xmlns:r="http://schemas.openxmlformats.org/officeDocument/2006/relationships" xmlns:a="http://schemas.openxmlformats.org/drawingml/2006/main" xmlns="" val="1969085806"/>
+        <p14:creationId xmlns:p14="http://schemas.microsoft.com/office/powerpoint/2010/main" val="1969085806"/>
       </p:ext>
     </p:extLst>
   </p:cSld>
@@ -2534,7 +2536,7 @@
 </file>
 
 <file path=ppt/slideLayouts/slideLayout8.xml><?xml version="1.0" encoding="utf-8"?>
-<p:sldLayout xmlns:a="http://schemas.openxmlformats.org/drawingml/2006/main" xmlns:r="http://schemas.openxmlformats.org/officeDocument/2006/relationships" xmlns:mc="http://schemas.openxmlformats.org/markup-compatibility/2006" xmlns:mv="urn:schemas-microsoft-com:mac:vml" xmlns:p="http://schemas.openxmlformats.org/presentationml/2006/main" mc:Ignorable="mv" mc:PreserveAttributes="mv:*" type="obj" preserve="1">
+<p:sldLayout xmlns:a="http://schemas.openxmlformats.org/drawingml/2006/main" xmlns:r="http://schemas.openxmlformats.org/officeDocument/2006/relationships" xmlns:p="http://schemas.openxmlformats.org/presentationml/2006/main" type="obj" preserve="1">
   <p:cSld name="Title and Content">
     <p:spTree>
       <p:nvGrpSpPr>
@@ -2636,7 +2638,7 @@
     </p:spTree>
     <p:extLst>
       <p:ext uri="{BB962C8B-B14F-4D97-AF65-F5344CB8AC3E}">
-        <p14:creationId xmlns:p14="http://schemas.microsoft.com/office/powerpoint/2010/main" xmlns:p="http://schemas.openxmlformats.org/presentationml/2006/main" xmlns:r="http://schemas.openxmlformats.org/officeDocument/2006/relationships" xmlns:a="http://schemas.openxmlformats.org/drawingml/2006/main" xmlns="" val="3577501537"/>
+        <p14:creationId xmlns:p14="http://schemas.microsoft.com/office/powerpoint/2010/main" val="3577501537"/>
       </p:ext>
     </p:extLst>
   </p:cSld>
@@ -2647,7 +2649,7 @@
 </file>
 
 <file path=ppt/slideLayouts/slideLayout9.xml><?xml version="1.0" encoding="utf-8"?>
-<p:sldLayout xmlns:a="http://schemas.openxmlformats.org/drawingml/2006/main" xmlns:r="http://schemas.openxmlformats.org/officeDocument/2006/relationships" xmlns:mc="http://schemas.openxmlformats.org/markup-compatibility/2006" xmlns:mv="urn:schemas-microsoft-com:mac:vml" xmlns:p="http://schemas.openxmlformats.org/presentationml/2006/main" mc:Ignorable="mv" mc:PreserveAttributes="mv:*" type="secHead" preserve="1">
+<p:sldLayout xmlns:a="http://schemas.openxmlformats.org/drawingml/2006/main" xmlns:r="http://schemas.openxmlformats.org/officeDocument/2006/relationships" xmlns:p="http://schemas.openxmlformats.org/presentationml/2006/main" type="secHead" preserve="1">
   <p:cSld name="Section Header">
     <p:spTree>
       <p:nvGrpSpPr>
@@ -2819,7 +2821,7 @@
     </p:spTree>
     <p:extLst>
       <p:ext uri="{BB962C8B-B14F-4D97-AF65-F5344CB8AC3E}">
-        <p14:creationId xmlns:p14="http://schemas.microsoft.com/office/powerpoint/2010/main" xmlns:p="http://schemas.openxmlformats.org/presentationml/2006/main" xmlns:r="http://schemas.openxmlformats.org/officeDocument/2006/relationships" xmlns:a="http://schemas.openxmlformats.org/drawingml/2006/main" xmlns="" val="1679158844"/>
+        <p14:creationId xmlns:p14="http://schemas.microsoft.com/office/powerpoint/2010/main" val="1679158844"/>
       </p:ext>
     </p:extLst>
   </p:cSld>
@@ -2830,7 +2832,7 @@
 </file>
 
 <file path=ppt/slideMasters/slideMaster1.xml><?xml version="1.0" encoding="utf-8"?>
-<p:sldMaster xmlns:a="http://schemas.openxmlformats.org/drawingml/2006/main" xmlns:r="http://schemas.openxmlformats.org/officeDocument/2006/relationships" xmlns:mc="http://schemas.openxmlformats.org/markup-compatibility/2006" xmlns:mv="urn:schemas-microsoft-com:mac:vml" xmlns:p="http://schemas.openxmlformats.org/presentationml/2006/main" mc:Ignorable="mv" mc:PreserveAttributes="mv:*" preserve="1">
+<p:sldMaster xmlns:a="http://schemas.openxmlformats.org/drawingml/2006/main" xmlns:r="http://schemas.openxmlformats.org/officeDocument/2006/relationships" xmlns:p="http://schemas.openxmlformats.org/presentationml/2006/main" preserve="1">
   <p:cSld>
     <p:bg>
       <p:bgPr>
@@ -2953,7 +2955,7 @@
     </p:spTree>
     <p:extLst>
       <p:ext uri="{BB962C8B-B14F-4D97-AF65-F5344CB8AC3E}">
-        <p14:creationId xmlns:p14="http://schemas.microsoft.com/office/powerpoint/2010/main" xmlns:p="http://schemas.openxmlformats.org/presentationml/2006/main" xmlns:r="http://schemas.openxmlformats.org/officeDocument/2006/relationships" xmlns:a="http://schemas.openxmlformats.org/drawingml/2006/main" xmlns="" val="781823911"/>
+        <p14:creationId xmlns:p14="http://schemas.microsoft.com/office/powerpoint/2010/main" val="781823911"/>
       </p:ext>
     </p:extLst>
   </p:cSld>
@@ -3238,7 +3240,7 @@
 </file>
 
 <file path=ppt/slideMasters/slideMaster2.xml><?xml version="1.0" encoding="utf-8"?>
-<p:sldMaster xmlns:a="http://schemas.openxmlformats.org/drawingml/2006/main" xmlns:r="http://schemas.openxmlformats.org/officeDocument/2006/relationships" xmlns:mc="http://schemas.openxmlformats.org/markup-compatibility/2006" xmlns:mv="urn:schemas-microsoft-com:mac:vml" xmlns:p="http://schemas.openxmlformats.org/presentationml/2006/main" mc:Ignorable="mv" mc:PreserveAttributes="mv:*" preserve="1">
+<p:sldMaster xmlns:a="http://schemas.openxmlformats.org/drawingml/2006/main" xmlns:r="http://schemas.openxmlformats.org/officeDocument/2006/relationships" xmlns:p="http://schemas.openxmlformats.org/presentationml/2006/main" preserve="1">
   <p:cSld>
     <p:bg>
       <p:bgPr>
@@ -3361,7 +3363,7 @@
     </p:spTree>
     <p:extLst>
       <p:ext uri="{BB962C8B-B14F-4D97-AF65-F5344CB8AC3E}">
-        <p14:creationId xmlns:p14="http://schemas.microsoft.com/office/powerpoint/2010/main" xmlns:p="http://schemas.openxmlformats.org/presentationml/2006/main" xmlns:r="http://schemas.openxmlformats.org/officeDocument/2006/relationships" xmlns:a="http://schemas.openxmlformats.org/drawingml/2006/main" xmlns="" val="3791638655"/>
+        <p14:creationId xmlns:p14="http://schemas.microsoft.com/office/powerpoint/2010/main" val="3791638655"/>
       </p:ext>
     </p:extLst>
   </p:cSld>
@@ -3646,7 +3648,7 @@
 </file>
 
 <file path=ppt/slides/slide1.xml><?xml version="1.0" encoding="utf-8"?>
-<p:sld xmlns:a="http://schemas.openxmlformats.org/drawingml/2006/main" xmlns:r="http://schemas.openxmlformats.org/officeDocument/2006/relationships" xmlns:mc="http://schemas.openxmlformats.org/markup-compatibility/2006" xmlns:mv="urn:schemas-microsoft-com:mac:vml" xmlns:p="http://schemas.openxmlformats.org/presentationml/2006/main" mc:Ignorable="mv" mc:PreserveAttributes="mv:*">
+<p:sld xmlns:a="http://schemas.openxmlformats.org/drawingml/2006/main" xmlns:r="http://schemas.openxmlformats.org/officeDocument/2006/relationships" xmlns:p="http://schemas.openxmlformats.org/presentationml/2006/main">
   <p:cSld>
     <p:spTree>
       <p:nvGrpSpPr>
@@ -3713,18 +3715,25 @@
     </p:spTree>
     <p:extLst>
       <p:ext uri="{BB962C8B-B14F-4D97-AF65-F5344CB8AC3E}">
-        <p14:creationId xmlns:p14="http://schemas.microsoft.com/office/powerpoint/2010/main" xmlns:p="http://schemas.openxmlformats.org/presentationml/2006/main" xmlns:r="http://schemas.openxmlformats.org/officeDocument/2006/relationships" xmlns:a="http://schemas.openxmlformats.org/drawingml/2006/main" xmlns="" val="86700209"/>
+        <p14:creationId xmlns:p14="http://schemas.microsoft.com/office/powerpoint/2010/main" val="86700209"/>
       </p:ext>
     </p:extLst>
   </p:cSld>
   <p:clrMapOvr>
     <a:masterClrMapping/>
   </p:clrMapOvr>
+  <p:timing>
+    <p:tnLst>
+      <p:par>
+        <p:cTn id="1" dur="indefinite" restart="never" nodeType="tmRoot"/>
+      </p:par>
+    </p:tnLst>
+  </p:timing>
 </p:sld>
 </file>
 
 <file path=ppt/slides/slide10.xml><?xml version="1.0" encoding="utf-8"?>
-<p:sld xmlns:a="http://schemas.openxmlformats.org/drawingml/2006/main" xmlns:r="http://schemas.openxmlformats.org/officeDocument/2006/relationships" xmlns:mc="http://schemas.openxmlformats.org/markup-compatibility/2006" xmlns:mv="urn:schemas-microsoft-com:mac:vml" xmlns:p="http://schemas.openxmlformats.org/presentationml/2006/main" mc:Ignorable="mv" mc:PreserveAttributes="mv:*">
+<p:sld xmlns:a="http://schemas.openxmlformats.org/drawingml/2006/main" xmlns:r="http://schemas.openxmlformats.org/officeDocument/2006/relationships" xmlns:p="http://schemas.openxmlformats.org/presentationml/2006/main">
   <p:cSld>
     <p:spTree>
       <p:nvGrpSpPr>
@@ -3812,7 +3821,7 @@
     </p:spTree>
     <p:extLst>
       <p:ext uri="{BB962C8B-B14F-4D97-AF65-F5344CB8AC3E}">
-        <p14:creationId xmlns:p14="http://schemas.microsoft.com/office/powerpoint/2010/main" xmlns:p="http://schemas.openxmlformats.org/presentationml/2006/main" xmlns:r="http://schemas.openxmlformats.org/officeDocument/2006/relationships" xmlns:a="http://schemas.openxmlformats.org/drawingml/2006/main" xmlns="" val="1430956557"/>
+        <p14:creationId xmlns:p14="http://schemas.microsoft.com/office/powerpoint/2010/main" val="1430956557"/>
       </p:ext>
     </p:extLst>
   </p:cSld>
@@ -3830,7 +3839,7 @@
 </file>
 
 <file path=ppt/slides/slide11.xml><?xml version="1.0" encoding="utf-8"?>
-<p:sld xmlns:a="http://schemas.openxmlformats.org/drawingml/2006/main" xmlns:r="http://schemas.openxmlformats.org/officeDocument/2006/relationships" xmlns:mc="http://schemas.openxmlformats.org/markup-compatibility/2006" xmlns:mv="urn:schemas-microsoft-com:mac:vml" xmlns:p="http://schemas.openxmlformats.org/presentationml/2006/main" mc:Ignorable="mv" mc:PreserveAttributes="mv:*">
+<p:sld xmlns:a="http://schemas.openxmlformats.org/drawingml/2006/main" xmlns:r="http://schemas.openxmlformats.org/officeDocument/2006/relationships" xmlns:p="http://schemas.openxmlformats.org/presentationml/2006/main">
   <p:cSld>
     <p:spTree>
       <p:nvGrpSpPr>
@@ -3901,7 +3910,7 @@
           <a:effectLst/>
           <a:extLst>
             <a:ext uri="{91240B29-F687-4F45-9708-019B960494DF}">
-              <a14:hiddenLine xmlns:a14="http://schemas.microsoft.com/office/drawing/2010/main" xmlns:p="http://schemas.openxmlformats.org/presentationml/2006/main" xmlns:r="http://schemas.openxmlformats.org/officeDocument/2006/relationships" xmlns:a="http://schemas.openxmlformats.org/drawingml/2006/main" xmlns="" w="9525">
+              <a14:hiddenLine xmlns:a14="http://schemas.microsoft.com/office/drawing/2010/main" w="9525">
                 <a:solidFill>
                   <a:schemeClr val="tx1"/>
                 </a:solidFill>
@@ -3911,7 +3920,7 @@
               </a14:hiddenLine>
             </a:ext>
             <a:ext uri="{AF507438-7753-43E0-B8FC-AC1667EBCBE1}">
-              <a14:hiddenEffects xmlns:a14="http://schemas.microsoft.com/office/drawing/2010/main" xmlns:p="http://schemas.openxmlformats.org/presentationml/2006/main" xmlns:r="http://schemas.openxmlformats.org/officeDocument/2006/relationships" xmlns:a="http://schemas.openxmlformats.org/drawingml/2006/main" xmlns="">
+              <a14:hiddenEffects xmlns:a14="http://schemas.microsoft.com/office/drawing/2010/main">
                 <a:effectLst>
                   <a:outerShdw dist="35921" dir="2700000" algn="ctr" rotWithShape="0">
                     <a:schemeClr val="bg2"/>
@@ -7284,7 +7293,7 @@
           <a:blip r:embed="rId2">
             <a:extLst>
               <a:ext uri="{28A0092B-C50C-407E-A947-70E740481C1C}">
-                <a14:useLocalDpi xmlns:a14="http://schemas.microsoft.com/office/drawing/2010/main" xmlns:p="http://schemas.openxmlformats.org/presentationml/2006/main" xmlns:r="http://schemas.openxmlformats.org/officeDocument/2006/relationships" xmlns:a="http://schemas.openxmlformats.org/drawingml/2006/main" xmlns="" val="0"/>
+                <a14:useLocalDpi xmlns:a14="http://schemas.microsoft.com/office/drawing/2010/main" val="0"/>
               </a:ext>
             </a:extLst>
           </a:blip>
@@ -7304,7 +7313,7 @@
           <a:noFill/>
           <a:extLst>
             <a:ext uri="{909E8E84-426E-40DD-AFC4-6F175D3DCCD1}">
-              <a14:hiddenFill xmlns:a14="http://schemas.microsoft.com/office/drawing/2010/main" xmlns:p="http://schemas.openxmlformats.org/presentationml/2006/main" xmlns:r="http://schemas.openxmlformats.org/officeDocument/2006/relationships" xmlns:a="http://schemas.openxmlformats.org/drawingml/2006/main" xmlns="">
+              <a14:hiddenFill xmlns:a14="http://schemas.microsoft.com/office/drawing/2010/main">
                 <a:solidFill>
                   <a:srgbClr val="FFFFFF"/>
                 </a:solidFill>
@@ -7325,7 +7334,7 @@
           <a:blip r:embed="rId3">
             <a:extLst>
               <a:ext uri="{28A0092B-C50C-407E-A947-70E740481C1C}">
-                <a14:useLocalDpi xmlns:a14="http://schemas.microsoft.com/office/drawing/2010/main" xmlns:p="http://schemas.openxmlformats.org/presentationml/2006/main" xmlns:r="http://schemas.openxmlformats.org/officeDocument/2006/relationships" xmlns:a="http://schemas.openxmlformats.org/drawingml/2006/main" xmlns="" val="0"/>
+                <a14:useLocalDpi xmlns:a14="http://schemas.microsoft.com/office/drawing/2010/main" val="0"/>
               </a:ext>
             </a:extLst>
           </a:blip>
@@ -7345,7 +7354,7 @@
           <a:noFill/>
           <a:extLst>
             <a:ext uri="{909E8E84-426E-40DD-AFC4-6F175D3DCCD1}">
-              <a14:hiddenFill xmlns:a14="http://schemas.microsoft.com/office/drawing/2010/main" xmlns:p="http://schemas.openxmlformats.org/presentationml/2006/main" xmlns:r="http://schemas.openxmlformats.org/officeDocument/2006/relationships" xmlns:a="http://schemas.openxmlformats.org/drawingml/2006/main" xmlns="">
+              <a14:hiddenFill xmlns:a14="http://schemas.microsoft.com/office/drawing/2010/main">
                 <a:solidFill>
                   <a:srgbClr val="FFFFFF"/>
                 </a:solidFill>
@@ -7357,7 +7366,7 @@
     </p:spTree>
     <p:extLst>
       <p:ext uri="{BB962C8B-B14F-4D97-AF65-F5344CB8AC3E}">
-        <p14:creationId xmlns:p14="http://schemas.microsoft.com/office/powerpoint/2010/main" xmlns:p="http://schemas.openxmlformats.org/presentationml/2006/main" xmlns:r="http://schemas.openxmlformats.org/officeDocument/2006/relationships" xmlns:a="http://schemas.openxmlformats.org/drawingml/2006/main" xmlns="" val="402163908"/>
+        <p14:creationId xmlns:p14="http://schemas.microsoft.com/office/powerpoint/2010/main" val="402163908"/>
       </p:ext>
     </p:extLst>
   </p:cSld>
@@ -7375,7 +7384,7 @@
 </file>
 
 <file path=ppt/slides/slide12.xml><?xml version="1.0" encoding="utf-8"?>
-<p:sld xmlns:a="http://schemas.openxmlformats.org/drawingml/2006/main" xmlns:r="http://schemas.openxmlformats.org/officeDocument/2006/relationships" xmlns:mc="http://schemas.openxmlformats.org/markup-compatibility/2006" xmlns:mv="urn:schemas-microsoft-com:mac:vml" xmlns:p="http://schemas.openxmlformats.org/presentationml/2006/main" mc:Ignorable="mv" mc:PreserveAttributes="mv:*">
+<p:sld xmlns:a="http://schemas.openxmlformats.org/drawingml/2006/main" xmlns:r="http://schemas.openxmlformats.org/officeDocument/2006/relationships" xmlns:p="http://schemas.openxmlformats.org/presentationml/2006/main">
   <p:cSld>
     <p:spTree>
       <p:nvGrpSpPr>
@@ -7448,7 +7457,7 @@
           <a:effectLst/>
           <a:extLst>
             <a:ext uri="{91240B29-F687-4F45-9708-019B960494DF}">
-              <a14:hiddenLine xmlns:a14="http://schemas.microsoft.com/office/drawing/2010/main" xmlns:p="http://schemas.openxmlformats.org/presentationml/2006/main" xmlns:r="http://schemas.openxmlformats.org/officeDocument/2006/relationships" xmlns:a="http://schemas.openxmlformats.org/drawingml/2006/main" xmlns="" w="9525">
+              <a14:hiddenLine xmlns:a14="http://schemas.microsoft.com/office/drawing/2010/main" w="9525">
                 <a:solidFill>
                   <a:schemeClr val="tx1"/>
                 </a:solidFill>
@@ -7458,7 +7467,7 @@
               </a14:hiddenLine>
             </a:ext>
             <a:ext uri="{AF507438-7753-43E0-B8FC-AC1667EBCBE1}">
-              <a14:hiddenEffects xmlns:a14="http://schemas.microsoft.com/office/drawing/2010/main" xmlns:p="http://schemas.openxmlformats.org/presentationml/2006/main" xmlns:r="http://schemas.openxmlformats.org/officeDocument/2006/relationships" xmlns:a="http://schemas.openxmlformats.org/drawingml/2006/main" xmlns="">
+              <a14:hiddenEffects xmlns:a14="http://schemas.microsoft.com/office/drawing/2010/main">
                 <a:effectLst>
                   <a:outerShdw dist="35921" dir="2700000" algn="ctr" rotWithShape="0">
                     <a:schemeClr val="bg2"/>
@@ -8079,7 +8088,7 @@
     </p:spTree>
     <p:extLst>
       <p:ext uri="{BB962C8B-B14F-4D97-AF65-F5344CB8AC3E}">
-        <p14:creationId xmlns:p14="http://schemas.microsoft.com/office/powerpoint/2010/main" xmlns:p="http://schemas.openxmlformats.org/presentationml/2006/main" xmlns:r="http://schemas.openxmlformats.org/officeDocument/2006/relationships" xmlns:a="http://schemas.openxmlformats.org/drawingml/2006/main" xmlns="" val="490096587"/>
+        <p14:creationId xmlns:p14="http://schemas.microsoft.com/office/powerpoint/2010/main" val="490096587"/>
       </p:ext>
     </p:extLst>
   </p:cSld>
@@ -8097,7 +8106,7 @@
 </file>
 
 <file path=ppt/slides/slide13.xml><?xml version="1.0" encoding="utf-8"?>
-<p:sld xmlns:a="http://schemas.openxmlformats.org/drawingml/2006/main" xmlns:r="http://schemas.openxmlformats.org/officeDocument/2006/relationships" xmlns:mc="http://schemas.openxmlformats.org/markup-compatibility/2006" xmlns:mv="urn:schemas-microsoft-com:mac:vml" xmlns:p="http://schemas.openxmlformats.org/presentationml/2006/main" mc:Ignorable="mv" mc:PreserveAttributes="mv:*">
+<p:sld xmlns:a="http://schemas.openxmlformats.org/drawingml/2006/main" xmlns:r="http://schemas.openxmlformats.org/officeDocument/2006/relationships" xmlns:p="http://schemas.openxmlformats.org/presentationml/2006/main">
   <p:cSld>
     <p:spTree>
       <p:nvGrpSpPr>
@@ -8170,7 +8179,7 @@
           <a:effectLst/>
           <a:extLst>
             <a:ext uri="{91240B29-F687-4F45-9708-019B960494DF}">
-              <a14:hiddenLine xmlns:a14="http://schemas.microsoft.com/office/drawing/2010/main" xmlns:p="http://schemas.openxmlformats.org/presentationml/2006/main" xmlns:r="http://schemas.openxmlformats.org/officeDocument/2006/relationships" xmlns:a="http://schemas.openxmlformats.org/drawingml/2006/main" xmlns="" w="9525">
+              <a14:hiddenLine xmlns:a14="http://schemas.microsoft.com/office/drawing/2010/main" w="9525">
                 <a:solidFill>
                   <a:schemeClr val="tx1"/>
                 </a:solidFill>
@@ -8180,7 +8189,7 @@
               </a14:hiddenLine>
             </a:ext>
             <a:ext uri="{AF507438-7753-43E0-B8FC-AC1667EBCBE1}">
-              <a14:hiddenEffects xmlns:a14="http://schemas.microsoft.com/office/drawing/2010/main" xmlns:p="http://schemas.openxmlformats.org/presentationml/2006/main" xmlns:r="http://schemas.openxmlformats.org/officeDocument/2006/relationships" xmlns:a="http://schemas.openxmlformats.org/drawingml/2006/main" xmlns="">
+              <a14:hiddenEffects xmlns:a14="http://schemas.microsoft.com/office/drawing/2010/main">
                 <a:effectLst>
                   <a:outerShdw dist="35921" dir="2700000" algn="ctr" rotWithShape="0">
                     <a:schemeClr val="bg2"/>
@@ -8422,7 +8431,7 @@
     </p:spTree>
     <p:extLst>
       <p:ext uri="{BB962C8B-B14F-4D97-AF65-F5344CB8AC3E}">
-        <p14:creationId xmlns:p14="http://schemas.microsoft.com/office/powerpoint/2010/main" xmlns:p="http://schemas.openxmlformats.org/presentationml/2006/main" xmlns:r="http://schemas.openxmlformats.org/officeDocument/2006/relationships" xmlns:a="http://schemas.openxmlformats.org/drawingml/2006/main" xmlns="" val="3603926503"/>
+        <p14:creationId xmlns:p14="http://schemas.microsoft.com/office/powerpoint/2010/main" val="3603926503"/>
       </p:ext>
     </p:extLst>
   </p:cSld>
@@ -8440,7 +8449,7 @@
 </file>
 
 <file path=ppt/slides/slide14.xml><?xml version="1.0" encoding="utf-8"?>
-<p:sld xmlns:a="http://schemas.openxmlformats.org/drawingml/2006/main" xmlns:r="http://schemas.openxmlformats.org/officeDocument/2006/relationships" xmlns:mc="http://schemas.openxmlformats.org/markup-compatibility/2006" xmlns:mv="urn:schemas-microsoft-com:mac:vml" xmlns:p="http://schemas.openxmlformats.org/presentationml/2006/main" mc:Ignorable="mv" mc:PreserveAttributes="mv:*">
+<p:sld xmlns:a="http://schemas.openxmlformats.org/drawingml/2006/main" xmlns:r="http://schemas.openxmlformats.org/officeDocument/2006/relationships" xmlns:p="http://schemas.openxmlformats.org/presentationml/2006/main">
   <p:cSld>
     <p:spTree>
       <p:nvGrpSpPr>
@@ -8477,7 +8486,7 @@
               <a:rPr lang="en-US" sz="6600" b="1" dirty="0" smtClean="0">
                 <a:latin typeface="Agency FB" panose="020B0503020202020204" pitchFamily="34" charset="0"/>
               </a:rPr>
-              <a:t>Willow Programming Language</a:t>
+              <a:t>Java Stream Ops Demo</a:t>
             </a:r>
             <a:endParaRPr lang="en-US" sz="6600" b="1" dirty="0">
               <a:latin typeface="Agency FB" panose="020B0503020202020204" pitchFamily="34" charset="0"/>
@@ -8502,7 +8511,7 @@
           <a:p>
             <a:r>
               <a:rPr lang="en-US" dirty="0" smtClean="0"/>
-              <a:t>Ryan Wechter</a:t>
+              <a:t>James Thorpe</a:t>
             </a:r>
             <a:endParaRPr lang="en-US" dirty="0"/>
           </a:p>
@@ -8511,7 +8520,7 @@
     </p:spTree>
     <p:extLst>
       <p:ext uri="{BB962C8B-B14F-4D97-AF65-F5344CB8AC3E}">
-        <p14:creationId xmlns:p14="http://schemas.microsoft.com/office/powerpoint/2010/main" xmlns:p="http://schemas.openxmlformats.org/presentationml/2006/main" xmlns:r="http://schemas.openxmlformats.org/officeDocument/2006/relationships" xmlns:a="http://schemas.openxmlformats.org/drawingml/2006/main" xmlns="" val="1392206460"/>
+        <p14:creationId xmlns:p14="http://schemas.microsoft.com/office/powerpoint/2010/main" val="939727344"/>
       </p:ext>
     </p:extLst>
   </p:cSld>
@@ -8529,7 +8538,392 @@
 </file>
 
 <file path=ppt/slides/slide15.xml><?xml version="1.0" encoding="utf-8"?>
-<p:sld xmlns:a="http://schemas.openxmlformats.org/drawingml/2006/main" xmlns:r="http://schemas.openxmlformats.org/officeDocument/2006/relationships" xmlns:mc="http://schemas.openxmlformats.org/markup-compatibility/2006" xmlns:mv="urn:schemas-microsoft-com:mac:vml" xmlns:p="http://schemas.openxmlformats.org/presentationml/2006/main" mc:Ignorable="mv" mc:PreserveAttributes="mv:*">
+<p:sld xmlns:a="http://schemas.openxmlformats.org/drawingml/2006/main" xmlns:r="http://schemas.openxmlformats.org/officeDocument/2006/relationships" xmlns:p="http://schemas.openxmlformats.org/presentationml/2006/main">
+  <p:cSld>
+    <p:spTree>
+      <p:nvGrpSpPr>
+        <p:cNvPr id="1" name=""/>
+        <p:cNvGrpSpPr/>
+        <p:nvPr/>
+      </p:nvGrpSpPr>
+      <p:grpSpPr>
+        <a:xfrm>
+          <a:off x="0" y="0"/>
+          <a:ext cx="0" cy="0"/>
+          <a:chOff x="0" y="0"/>
+          <a:chExt cx="0" cy="0"/>
+        </a:xfrm>
+      </p:grpSpPr>
+      <p:sp>
+        <p:nvSpPr>
+          <p:cNvPr id="3" name="Content Placeholder 2"/>
+          <p:cNvSpPr>
+            <a:spLocks noGrp="1"/>
+          </p:cNvSpPr>
+          <p:nvPr>
+            <p:ph idx="1"/>
+          </p:nvPr>
+        </p:nvSpPr>
+        <p:spPr>
+          <a:xfrm>
+            <a:off x="457200" y="762000"/>
+            <a:ext cx="8229600" cy="609600"/>
+          </a:xfrm>
+        </p:spPr>
+        <p:txBody>
+          <a:bodyPr/>
+          <a:lstStyle/>
+          <a:p>
+            <a:pPr marL="0" indent="0">
+              <a:buNone/>
+            </a:pPr>
+            <a:r>
+              <a:rPr lang="en-US" b="1" dirty="0" smtClean="0"/>
+              <a:t>Bugs Fixed</a:t>
+            </a:r>
+            <a:endParaRPr lang="en-US" b="1" dirty="0"/>
+          </a:p>
+        </p:txBody>
+      </p:sp>
+      <p:sp>
+        <p:nvSpPr>
+          <p:cNvPr id="2" name="Rectangle 1"/>
+          <p:cNvSpPr>
+            <a:spLocks noChangeArrowheads="1"/>
+          </p:cNvSpPr>
+          <p:nvPr/>
+        </p:nvSpPr>
+        <p:spPr bwMode="auto">
+          <a:xfrm>
+            <a:off x="914400" y="2184231"/>
+            <a:ext cx="5788764" cy="2862322"/>
+          </a:xfrm>
+          <a:prstGeom prst="rect">
+            <a:avLst/>
+          </a:prstGeom>
+          <a:solidFill>
+            <a:srgbClr val="FFFFFF"/>
+          </a:solidFill>
+          <a:ln>
+            <a:noFill/>
+          </a:ln>
+          <a:effectLst/>
+          <a:extLst>
+            <a:ext uri="{91240B29-F687-4F45-9708-019B960494DF}">
+              <a14:hiddenLine xmlns:a14="http://schemas.microsoft.com/office/drawing/2010/main" w="9525">
+                <a:solidFill>
+                  <a:schemeClr val="tx1"/>
+                </a:solidFill>
+                <a:miter lim="800000"/>
+                <a:headEnd/>
+                <a:tailEnd/>
+              </a14:hiddenLine>
+            </a:ext>
+            <a:ext uri="{AF507438-7753-43E0-B8FC-AC1667EBCBE1}">
+              <a14:hiddenEffects xmlns:a14="http://schemas.microsoft.com/office/drawing/2010/main">
+                <a:effectLst>
+                  <a:outerShdw dist="35921" dir="2700000" algn="ctr" rotWithShape="0">
+                    <a:schemeClr val="bg2"/>
+                  </a:outerShdw>
+                </a:effectLst>
+              </a14:hiddenEffects>
+            </a:ext>
+          </a:extLst>
+        </p:spPr>
+        <p:txBody>
+          <a:bodyPr vert="horz" wrap="none" lIns="91440" tIns="45720" rIns="91440" bIns="45720" numCol="1" anchor="ctr" anchorCtr="0" compatLnSpc="1">
+            <a:prstTxWarp prst="textNoShape">
+              <a:avLst/>
+            </a:prstTxWarp>
+            <a:spAutoFit/>
+          </a:bodyPr>
+          <a:lstStyle/>
+          <a:p>
+            <a:pPr lvl="0" eaLnBrk="0" hangingPunct="0"/>
+            <a:r>
+              <a:rPr lang="en-US" sz="2000" dirty="0"/>
+              <a:t>1) fixed some of ? operations</a:t>
+            </a:r>
+            <a:br>
+              <a:rPr lang="en-US" sz="2000" dirty="0"/>
+            </a:br>
+            <a:r>
+              <a:rPr lang="en-US" sz="2000" dirty="0"/>
+              <a:t>        '</a:t>
+            </a:r>
+            <a:r>
+              <a:rPr lang="en-US" sz="2000" dirty="0" err="1"/>
+              <a:t>iseq</a:t>
+            </a:r>
+            <a:r>
+              <a:rPr lang="en-US" sz="2000" dirty="0"/>
+              <a:t>':     </a:t>
+            </a:r>
+            <a:r>
+              <a:rPr lang="en-US" sz="2000" dirty="0" err="1"/>
+              <a:t>op.is</a:t>
+            </a:r>
+            <a:r>
+              <a:rPr lang="en-US" sz="2000" dirty="0" smtClean="0"/>
+              <a:t>_,</a:t>
+            </a:r>
+            <a:r>
+              <a:rPr lang="en-US" sz="2000" dirty="0"/>
+              <a:t/>
+            </a:r>
+            <a:br>
+              <a:rPr lang="en-US" sz="2000" dirty="0"/>
+            </a:br>
+            <a:r>
+              <a:rPr lang="en-US" sz="2000" dirty="0"/>
+              <a:t>        '</a:t>
+            </a:r>
+            <a:r>
+              <a:rPr lang="en-US" sz="2000" dirty="0" err="1"/>
+              <a:t>isequal</a:t>
+            </a:r>
+            <a:r>
+              <a:rPr lang="en-US" sz="2000" dirty="0"/>
+              <a:t>':  </a:t>
+            </a:r>
+            <a:r>
+              <a:rPr lang="en-US" sz="2000" dirty="0" err="1"/>
+              <a:t>op.eq</a:t>
+            </a:r>
+            <a:r>
+              <a:rPr lang="en-US" sz="2000" dirty="0" smtClean="0"/>
+              <a:t>,</a:t>
+            </a:r>
+            <a:r>
+              <a:rPr lang="en-US" sz="2000" dirty="0"/>
+              <a:t/>
+            </a:r>
+            <a:br>
+              <a:rPr lang="en-US" sz="2000" dirty="0"/>
+            </a:br>
+            <a:r>
+              <a:rPr lang="en-US" sz="2000" dirty="0"/>
+              <a:t>        '</a:t>
+            </a:r>
+            <a:r>
+              <a:rPr lang="en-US" sz="2000" dirty="0" err="1"/>
+              <a:t>islist</a:t>
+            </a:r>
+            <a:r>
+              <a:rPr lang="en-US" sz="2000" dirty="0"/>
+              <a:t>':   lambda x: </a:t>
+            </a:r>
+            <a:r>
+              <a:rPr lang="en-US" sz="2000" dirty="0" err="1"/>
+              <a:t>isinstance</a:t>
+            </a:r>
+            <a:r>
+              <a:rPr lang="en-US" sz="2000" dirty="0"/>
+              <a:t>(</a:t>
+            </a:r>
+            <a:r>
+              <a:rPr lang="en-US" sz="2000" dirty="0" err="1"/>
+              <a:t>x,list</a:t>
+            </a:r>
+            <a:r>
+              <a:rPr lang="en-US" sz="2000" dirty="0" smtClean="0"/>
+              <a:t>),</a:t>
+            </a:r>
+            <a:r>
+              <a:rPr lang="en-US" sz="2000" dirty="0"/>
+              <a:t/>
+            </a:r>
+            <a:br>
+              <a:rPr lang="en-US" sz="2000" dirty="0"/>
+            </a:br>
+            <a:r>
+              <a:rPr lang="en-US" sz="2000" dirty="0"/>
+              <a:t>        '</a:t>
+            </a:r>
+            <a:r>
+              <a:rPr lang="en-US" sz="2000" dirty="0" err="1"/>
+              <a:t>isnumber</a:t>
+            </a:r>
+            <a:r>
+              <a:rPr lang="en-US" sz="2000" dirty="0"/>
+              <a:t>': lambda x: </a:t>
+            </a:r>
+            <a:r>
+              <a:rPr lang="en-US" sz="2000" dirty="0" err="1"/>
+              <a:t>isinstance</a:t>
+            </a:r>
+            <a:r>
+              <a:rPr lang="en-US" sz="2000" dirty="0"/>
+              <a:t>(x, Number</a:t>
+            </a:r>
+            <a:r>
+              <a:rPr lang="en-US" sz="2000" dirty="0" smtClean="0"/>
+              <a:t>),</a:t>
+            </a:r>
+            <a:r>
+              <a:rPr lang="en-US" sz="2000" dirty="0"/>
+              <a:t/>
+            </a:r>
+            <a:br>
+              <a:rPr lang="en-US" sz="2000" dirty="0"/>
+            </a:br>
+            <a:r>
+              <a:rPr lang="en-US" sz="2000" dirty="0"/>
+              <a:t/>
+            </a:r>
+            <a:br>
+              <a:rPr lang="en-US" sz="2000" dirty="0"/>
+            </a:br>
+            <a:r>
+              <a:rPr lang="en-US" sz="2000" dirty="0"/>
+              <a:t>2) added negative operator</a:t>
+            </a:r>
+            <a:br>
+              <a:rPr lang="en-US" sz="2000" dirty="0"/>
+            </a:br>
+            <a:r>
+              <a:rPr lang="en-US" sz="2000" dirty="0"/>
+              <a:t>        '</a:t>
+            </a:r>
+            <a:r>
+              <a:rPr lang="en-US" sz="2000" dirty="0" err="1"/>
+              <a:t>neg</a:t>
+            </a:r>
+            <a:r>
+              <a:rPr lang="en-US" sz="2000" dirty="0"/>
+              <a:t>': lambda x: -1 * x,</a:t>
+            </a:r>
+            <a:r>
+              <a:rPr lang="en-US" sz="2000"/>
+              <a:t/>
+            </a:r>
+            <a:br>
+              <a:rPr lang="en-US" sz="2000"/>
+            </a:br>
+            <a:endParaRPr kumimoji="0" lang="en-US" altLang="en-US" sz="2000" b="0" i="0" u="none" strike="noStrike" cap="none" normalizeH="0" baseline="0" dirty="0">
+              <a:ln>
+                <a:noFill/>
+              </a:ln>
+              <a:solidFill>
+                <a:schemeClr val="tx1"/>
+              </a:solidFill>
+              <a:effectLst/>
+              <a:latin typeface="Arial" panose="020B0604020202020204" pitchFamily="34" charset="0"/>
+            </a:endParaRPr>
+          </a:p>
+        </p:txBody>
+      </p:sp>
+    </p:spTree>
+    <p:extLst>
+      <p:ext uri="{BB962C8B-B14F-4D97-AF65-F5344CB8AC3E}">
+        <p14:creationId xmlns:p14="http://schemas.microsoft.com/office/powerpoint/2010/main" val="1402730570"/>
+      </p:ext>
+    </p:extLst>
+  </p:cSld>
+  <p:clrMapOvr>
+    <a:masterClrMapping/>
+  </p:clrMapOvr>
+  <p:timing>
+    <p:tnLst>
+      <p:par>
+        <p:cTn id="1" dur="indefinite" restart="never" nodeType="tmRoot"/>
+      </p:par>
+    </p:tnLst>
+  </p:timing>
+</p:sld>
+</file>
+
+<file path=ppt/slides/slide16.xml><?xml version="1.0" encoding="utf-8"?>
+<p:sld xmlns:a="http://schemas.openxmlformats.org/drawingml/2006/main" xmlns:r="http://schemas.openxmlformats.org/officeDocument/2006/relationships" xmlns:p="http://schemas.openxmlformats.org/presentationml/2006/main">
+  <p:cSld>
+    <p:spTree>
+      <p:nvGrpSpPr>
+        <p:cNvPr id="1" name=""/>
+        <p:cNvGrpSpPr/>
+        <p:nvPr/>
+      </p:nvGrpSpPr>
+      <p:grpSpPr>
+        <a:xfrm>
+          <a:off x="0" y="0"/>
+          <a:ext cx="0" cy="0"/>
+          <a:chOff x="0" y="0"/>
+          <a:chExt cx="0" cy="0"/>
+        </a:xfrm>
+      </p:grpSpPr>
+      <p:sp>
+        <p:nvSpPr>
+          <p:cNvPr id="4" name="Title 3"/>
+          <p:cNvSpPr>
+            <a:spLocks noGrp="1"/>
+          </p:cNvSpPr>
+          <p:nvPr>
+            <p:ph type="ctrTitle"/>
+          </p:nvPr>
+        </p:nvSpPr>
+        <p:spPr/>
+        <p:txBody>
+          <a:bodyPr>
+            <a:normAutofit fontScale="90000"/>
+          </a:bodyPr>
+          <a:lstStyle/>
+          <a:p>
+            <a:r>
+              <a:rPr lang="en-US" sz="6600" b="1" dirty="0" smtClean="0">
+                <a:latin typeface="Agency FB" panose="020B0503020202020204" pitchFamily="34" charset="0"/>
+              </a:rPr>
+              <a:t>Willow Programming Language</a:t>
+            </a:r>
+            <a:endParaRPr lang="en-US" sz="6600" b="1" dirty="0">
+              <a:latin typeface="Agency FB" panose="020B0503020202020204" pitchFamily="34" charset="0"/>
+            </a:endParaRPr>
+          </a:p>
+        </p:txBody>
+      </p:sp>
+      <p:sp>
+        <p:nvSpPr>
+          <p:cNvPr id="5" name="Subtitle 4"/>
+          <p:cNvSpPr>
+            <a:spLocks noGrp="1"/>
+          </p:cNvSpPr>
+          <p:nvPr>
+            <p:ph type="subTitle" idx="1"/>
+          </p:nvPr>
+        </p:nvSpPr>
+        <p:spPr/>
+        <p:txBody>
+          <a:bodyPr/>
+          <a:lstStyle/>
+          <a:p>
+            <a:r>
+              <a:rPr lang="en-US" dirty="0" smtClean="0"/>
+              <a:t>Ryan Wechter</a:t>
+            </a:r>
+            <a:endParaRPr lang="en-US" dirty="0"/>
+          </a:p>
+        </p:txBody>
+      </p:sp>
+    </p:spTree>
+    <p:extLst>
+      <p:ext uri="{BB962C8B-B14F-4D97-AF65-F5344CB8AC3E}">
+        <p14:creationId xmlns:p14="http://schemas.microsoft.com/office/powerpoint/2010/main" val="1392206460"/>
+      </p:ext>
+    </p:extLst>
+  </p:cSld>
+  <p:clrMapOvr>
+    <a:masterClrMapping/>
+  </p:clrMapOvr>
+  <p:timing>
+    <p:tnLst>
+      <p:par>
+        <p:cTn id="1" dur="indefinite" restart="never" nodeType="tmRoot"/>
+      </p:par>
+    </p:tnLst>
+  </p:timing>
+</p:sld>
+</file>
+
+<file path=ppt/slides/slide17.xml><?xml version="1.0" encoding="utf-8"?>
+<p:sld xmlns:a="http://schemas.openxmlformats.org/drawingml/2006/main" xmlns:r="http://schemas.openxmlformats.org/officeDocument/2006/relationships" xmlns:p="http://schemas.openxmlformats.org/presentationml/2006/main">
   <p:cSld>
     <p:spTree>
       <p:nvGrpSpPr>
@@ -8643,8 +9037,8 @@
 </p:sld>
 </file>
 
-<file path=ppt/slides/slide16.xml><?xml version="1.0" encoding="utf-8"?>
-<p:sld xmlns:a="http://schemas.openxmlformats.org/drawingml/2006/main" xmlns:r="http://schemas.openxmlformats.org/officeDocument/2006/relationships" xmlns:mc="http://schemas.openxmlformats.org/markup-compatibility/2006" xmlns:mv="urn:schemas-microsoft-com:mac:vml" xmlns:p="http://schemas.openxmlformats.org/presentationml/2006/main" mc:Ignorable="mv" mc:PreserveAttributes="mv:*">
+<file path=ppt/slides/slide18.xml><?xml version="1.0" encoding="utf-8"?>
+<p:sld xmlns:a="http://schemas.openxmlformats.org/drawingml/2006/main" xmlns:r="http://schemas.openxmlformats.org/officeDocument/2006/relationships" xmlns:p="http://schemas.openxmlformats.org/presentationml/2006/main">
   <p:cSld>
     <p:spTree>
       <p:nvGrpSpPr>
@@ -8714,11 +9108,7 @@
           <a:p>
             <a:r>
               <a:rPr lang="en-US" sz="2800" dirty="0" smtClean="0"/>
-              <a:t>Variable Instantiation, Assignment and </a:t>
-            </a:r>
-            <a:r>
-              <a:rPr lang="en-US" sz="2800" dirty="0" smtClean="0"/>
-              <a:t>Access</a:t>
+              <a:t>Variable Instantiation, Assignment and Access</a:t>
             </a:r>
           </a:p>
           <a:p>
@@ -8771,8 +9161,8 @@
 </p:sld>
 </file>
 
-<file path=ppt/slides/slide17.xml><?xml version="1.0" encoding="utf-8"?>
-<p:sld xmlns:a="http://schemas.openxmlformats.org/drawingml/2006/main" xmlns:r="http://schemas.openxmlformats.org/officeDocument/2006/relationships" xmlns:mc="http://schemas.openxmlformats.org/markup-compatibility/2006" xmlns:mv="urn:schemas-microsoft-com:mac:vml" xmlns:p="http://schemas.openxmlformats.org/presentationml/2006/main" mc:Ignorable="mv" mc:PreserveAttributes="mv:*">
+<file path=ppt/slides/slide19.xml><?xml version="1.0" encoding="utf-8"?>
+<p:sld xmlns:a="http://schemas.openxmlformats.org/drawingml/2006/main" xmlns:r="http://schemas.openxmlformats.org/officeDocument/2006/relationships" xmlns:p="http://schemas.openxmlformats.org/presentationml/2006/main">
   <p:cSld>
     <p:spTree>
       <p:nvGrpSpPr>
@@ -8850,620 +9240,8 @@
 </p:sld>
 </file>
 
-<file path=ppt/slides/slide18.xml><?xml version="1.0" encoding="utf-8"?>
-<p:sld xmlns:a="http://schemas.openxmlformats.org/drawingml/2006/main" xmlns:r="http://schemas.openxmlformats.org/officeDocument/2006/relationships" xmlns:mc="http://schemas.openxmlformats.org/markup-compatibility/2006" xmlns:mv="urn:schemas-microsoft-com:mac:vml" xmlns:p="http://schemas.openxmlformats.org/presentationml/2006/main" mc:Ignorable="mv" mc:PreserveAttributes="mv:*">
-  <p:cSld>
-    <p:spTree>
-      <p:nvGrpSpPr>
-        <p:cNvPr id="1" name=""/>
-        <p:cNvGrpSpPr/>
-        <p:nvPr/>
-      </p:nvGrpSpPr>
-      <p:grpSpPr>
-        <a:xfrm>
-          <a:off x="0" y="0"/>
-          <a:ext cx="0" cy="0"/>
-          <a:chOff x="0" y="0"/>
-          <a:chExt cx="0" cy="0"/>
-        </a:xfrm>
-      </p:grpSpPr>
-      <p:sp>
-        <p:nvSpPr>
-          <p:cNvPr id="2" name="Title 1"/>
-          <p:cNvSpPr>
-            <a:spLocks noGrp="1"/>
-          </p:cNvSpPr>
-          <p:nvPr>
-            <p:ph type="title"/>
-          </p:nvPr>
-        </p:nvSpPr>
-        <p:spPr/>
-        <p:txBody>
-          <a:bodyPr>
-            <a:normAutofit/>
-          </a:bodyPr>
-          <a:lstStyle/>
-          <a:p>
-            <a:r>
-              <a:rPr lang="en-US" dirty="0" smtClean="0"/>
-              <a:t>Abstract Syntax Tree </a:t>
-            </a:r>
-            <a:endParaRPr lang="en-US" dirty="0"/>
-          </a:p>
-        </p:txBody>
-      </p:sp>
-      <p:sp>
-        <p:nvSpPr>
-          <p:cNvPr id="5" name="Content Placeholder 4"/>
-          <p:cNvSpPr>
-            <a:spLocks noGrp="1"/>
-          </p:cNvSpPr>
-          <p:nvPr>
-            <p:ph idx="1"/>
-          </p:nvPr>
-        </p:nvSpPr>
-        <p:spPr/>
-        <p:txBody>
-          <a:bodyPr>
-            <a:normAutofit/>
-          </a:bodyPr>
-          <a:lstStyle/>
-          <a:p>
-            <a:pPr>
-              <a:buNone/>
-            </a:pPr>
-            <a:r>
-              <a:rPr lang="en-US" sz="2000" dirty="0" smtClean="0"/>
-              <a:t>['Print', '</a:t>
-            </a:r>
-            <a:r>
-              <a:rPr lang="en-US" sz="2000" dirty="0" err="1" smtClean="0"/>
-              <a:t>HelloWorld</a:t>
-            </a:r>
-            <a:r>
-              <a:rPr lang="en-US" sz="2000" dirty="0" smtClean="0"/>
-              <a:t>', '</a:t>
-            </a:r>
-            <a:r>
-              <a:rPr lang="en-US" sz="2000" dirty="0" err="1" smtClean="0"/>
-              <a:t>VariableInst</a:t>
-            </a:r>
-            <a:r>
-              <a:rPr lang="en-US" sz="2000" dirty="0" smtClean="0"/>
-              <a:t>', 'a', 'Comment', '</a:t>
-            </a:r>
-            <a:r>
-              <a:rPr lang="en-US" sz="2000" dirty="0" smtClean="0"/>
-              <a:t>Print’, '</a:t>
-            </a:r>
-            <a:r>
-              <a:rPr lang="en-US" sz="2000" dirty="0" smtClean="0"/>
-              <a:t>a', 'Comment',</a:t>
-            </a:r>
-            <a:r>
-              <a:rPr lang="en-US" sz="2000" dirty="0" smtClean="0"/>
-              <a:t> </a:t>
-            </a:r>
-          </a:p>
-          <a:p>
-            <a:pPr>
-              <a:buNone/>
-            </a:pPr>
-            <a:r>
-              <a:rPr lang="en-US" sz="2000" dirty="0" smtClean="0"/>
-              <a:t>'</a:t>
-            </a:r>
-            <a:r>
-              <a:rPr lang="en-US" sz="2000" dirty="0" err="1" smtClean="0"/>
-              <a:t>VariableDeclaration</a:t>
-            </a:r>
-            <a:r>
-              <a:rPr lang="en-US" sz="2000" dirty="0" smtClean="0"/>
-              <a:t>', '</a:t>
-            </a:r>
-            <a:r>
-              <a:rPr lang="en-US" sz="2000" dirty="0" err="1" smtClean="0"/>
-              <a:t>c</a:t>
-            </a:r>
-            <a:r>
-              <a:rPr lang="en-US" sz="2000" dirty="0" smtClean="0"/>
-              <a:t>', 5, 'Comment',</a:t>
-            </a:r>
-            <a:r>
-              <a:rPr lang="en-US" sz="2000" dirty="0" smtClean="0"/>
-              <a:t> '</a:t>
-            </a:r>
-            <a:r>
-              <a:rPr lang="en-US" sz="2000" dirty="0" smtClean="0"/>
-              <a:t>Print', '</a:t>
-            </a:r>
-            <a:r>
-              <a:rPr lang="en-US" sz="2000" dirty="0" err="1" smtClean="0"/>
-              <a:t>c</a:t>
-            </a:r>
-            <a:r>
-              <a:rPr lang="en-US" sz="2000" dirty="0" smtClean="0"/>
-              <a:t>', 'Comment',</a:t>
-            </a:r>
-            <a:r>
-              <a:rPr lang="en-US" sz="2000" dirty="0" smtClean="0"/>
-              <a:t> </a:t>
-            </a:r>
-          </a:p>
-          <a:p>
-            <a:pPr>
-              <a:buNone/>
-            </a:pPr>
-            <a:r>
-              <a:rPr lang="en-US" sz="2000" dirty="0" smtClean="0"/>
-              <a:t>'</a:t>
-            </a:r>
-            <a:r>
-              <a:rPr lang="en-US" sz="2000" dirty="0" err="1" smtClean="0"/>
-              <a:t>IfElseStatement</a:t>
-            </a:r>
-            <a:r>
-              <a:rPr lang="en-US" sz="2000" dirty="0" smtClean="0"/>
-              <a:t>', False</a:t>
-            </a:r>
-            <a:r>
-              <a:rPr lang="en-US" sz="2000" dirty="0" smtClean="0"/>
-              <a:t>,</a:t>
-            </a:r>
-          </a:p>
-          <a:p>
-            <a:pPr>
-              <a:buNone/>
-            </a:pPr>
-            <a:r>
-              <a:rPr lang="en-US" sz="2000" dirty="0" smtClean="0"/>
-              <a:t>	</a:t>
-            </a:r>
-            <a:r>
-              <a:rPr lang="en-US" sz="2000" dirty="0" smtClean="0"/>
-              <a:t> [</a:t>
-            </a:r>
-            <a:r>
-              <a:rPr lang="en-US" sz="2000" dirty="0" smtClean="0"/>
-              <a:t>'</a:t>
-            </a:r>
-            <a:r>
-              <a:rPr lang="en-US" sz="2000" dirty="0" err="1" smtClean="0"/>
-              <a:t>MathAssExp</a:t>
-            </a:r>
-            <a:r>
-              <a:rPr lang="en-US" sz="2000" dirty="0" smtClean="0"/>
-              <a:t>', 5, 5, '*', 'a', 'Print', 'a'],</a:t>
-            </a:r>
-            <a:r>
-              <a:rPr lang="en-US" sz="2000" dirty="0" smtClean="0"/>
-              <a:t> </a:t>
-            </a:r>
-          </a:p>
-          <a:p>
-            <a:pPr>
-              <a:buNone/>
-            </a:pPr>
-            <a:r>
-              <a:rPr lang="en-US" sz="2000" dirty="0" smtClean="0"/>
-              <a:t>	</a:t>
-            </a:r>
-            <a:r>
-              <a:rPr lang="en-US" sz="2000" dirty="0" smtClean="0"/>
-              <a:t>[</a:t>
-            </a:r>
-            <a:r>
-              <a:rPr lang="en-US" sz="2000" dirty="0" smtClean="0"/>
-              <a:t>'</a:t>
-            </a:r>
-            <a:r>
-              <a:rPr lang="en-US" sz="2000" dirty="0" err="1" smtClean="0"/>
-              <a:t>MathAssExp</a:t>
-            </a:r>
-            <a:r>
-              <a:rPr lang="en-US" sz="2000" dirty="0" smtClean="0"/>
-              <a:t>', 5, 5,</a:t>
-            </a:r>
-            <a:r>
-              <a:rPr lang="en-US" sz="2000" dirty="0" smtClean="0"/>
-              <a:t> '</a:t>
-            </a:r>
-            <a:r>
-              <a:rPr lang="en-US" sz="2000" dirty="0" smtClean="0"/>
-              <a:t>+', 'a', 'Print', 'a'],</a:t>
-            </a:r>
-            <a:r>
-              <a:rPr lang="en-US" sz="2000" dirty="0" smtClean="0"/>
-              <a:t> </a:t>
-            </a:r>
-          </a:p>
-          <a:p>
-            <a:pPr>
-              <a:buNone/>
-            </a:pPr>
-            <a:r>
-              <a:rPr lang="en-US" sz="2000" dirty="0" smtClean="0"/>
-              <a:t>'</a:t>
-            </a:r>
-            <a:r>
-              <a:rPr lang="en-US" sz="2000" dirty="0" err="1" smtClean="0"/>
-              <a:t>MathExp</a:t>
-            </a:r>
-            <a:r>
-              <a:rPr lang="en-US" sz="2000" dirty="0" smtClean="0"/>
-              <a:t>', 5, 3, '-', 'Comment',</a:t>
-            </a:r>
-            <a:r>
-              <a:rPr lang="en-US" sz="2000" dirty="0" smtClean="0"/>
-              <a:t> </a:t>
-            </a:r>
-          </a:p>
-          <a:p>
-            <a:pPr>
-              <a:buNone/>
-            </a:pPr>
-            <a:r>
-              <a:rPr lang="en-US" sz="2000" dirty="0" smtClean="0"/>
-              <a:t>'</a:t>
-            </a:r>
-            <a:r>
-              <a:rPr lang="en-US" sz="2000" dirty="0" err="1" smtClean="0"/>
-              <a:t>DefineFunction</a:t>
-            </a:r>
-            <a:r>
-              <a:rPr lang="en-US" sz="2000" dirty="0" smtClean="0"/>
-              <a:t>', 'fun', ['Print', "'</a:t>
-            </a:r>
-            <a:r>
-              <a:rPr lang="en-US" sz="2000" dirty="0" err="1" smtClean="0"/>
-              <a:t>z</a:t>
-            </a:r>
-            <a:r>
-              <a:rPr lang="en-US" sz="2000" dirty="0" smtClean="0"/>
-              <a:t>'", '</a:t>
-            </a:r>
-            <a:r>
-              <a:rPr lang="en-US" sz="2000" dirty="0" err="1" smtClean="0"/>
-              <a:t>MathExp</a:t>
-            </a:r>
-            <a:r>
-              <a:rPr lang="en-US" sz="2000" dirty="0" smtClean="0"/>
-              <a:t>', 5, 5, '+'],</a:t>
-            </a:r>
-            <a:r>
-              <a:rPr lang="en-US" sz="2000" dirty="0" smtClean="0"/>
-              <a:t> </a:t>
-            </a:r>
-          </a:p>
-          <a:p>
-            <a:pPr>
-              <a:buNone/>
-            </a:pPr>
-            <a:r>
-              <a:rPr lang="en-US" sz="2000" dirty="0" smtClean="0"/>
-              <a:t>'</a:t>
-            </a:r>
-            <a:r>
-              <a:rPr lang="en-US" sz="2000" dirty="0" err="1" smtClean="0"/>
-              <a:t>FloatCast</a:t>
-            </a:r>
-            <a:r>
-              <a:rPr lang="en-US" sz="2000" dirty="0" smtClean="0"/>
-              <a:t>', '</a:t>
-            </a:r>
-            <a:r>
-              <a:rPr lang="en-US" sz="2000" dirty="0" err="1" smtClean="0"/>
-              <a:t>b</a:t>
-            </a:r>
-            <a:r>
-              <a:rPr lang="en-US" sz="2000" dirty="0" smtClean="0"/>
-              <a:t>', 'a', 'Print', '</a:t>
-            </a:r>
-            <a:r>
-              <a:rPr lang="en-US" sz="2000" dirty="0" err="1" smtClean="0"/>
-              <a:t>b</a:t>
-            </a:r>
-            <a:r>
-              <a:rPr lang="en-US" sz="2000" dirty="0" smtClean="0"/>
-              <a:t>', '</a:t>
-            </a:r>
-            <a:r>
-              <a:rPr lang="en-US" sz="2000" dirty="0" err="1" smtClean="0"/>
-              <a:t>FloatCast</a:t>
-            </a:r>
-            <a:r>
-              <a:rPr lang="en-US" sz="2000" dirty="0" smtClean="0"/>
-              <a:t>', '</a:t>
-            </a:r>
-            <a:r>
-              <a:rPr lang="en-US" sz="2000" dirty="0" err="1" smtClean="0"/>
-              <a:t>c</a:t>
-            </a:r>
-            <a:r>
-              <a:rPr lang="en-US" sz="2000" dirty="0" smtClean="0"/>
-              <a:t>', "'a'", 'Print', '</a:t>
-            </a:r>
-            <a:r>
-              <a:rPr lang="en-US" sz="2000" dirty="0" err="1" smtClean="0"/>
-              <a:t>c</a:t>
-            </a:r>
-            <a:r>
-              <a:rPr lang="en-US" sz="2000" dirty="0" smtClean="0"/>
-              <a:t>',</a:t>
-            </a:r>
-            <a:r>
-              <a:rPr lang="en-US" sz="2000" dirty="0" smtClean="0"/>
-              <a:t> </a:t>
-            </a:r>
-          </a:p>
-          <a:p>
-            <a:pPr>
-              <a:buNone/>
-            </a:pPr>
-            <a:r>
-              <a:rPr lang="en-US" sz="2000" dirty="0" smtClean="0"/>
-              <a:t>'</a:t>
-            </a:r>
-            <a:r>
-              <a:rPr lang="en-US" sz="2000" dirty="0" err="1" smtClean="0"/>
-              <a:t>FloatCast</a:t>
-            </a:r>
-            <a:r>
-              <a:rPr lang="en-US" sz="2000" dirty="0" smtClean="0"/>
-              <a:t>', '</a:t>
-            </a:r>
-            <a:r>
-              <a:rPr lang="en-US" sz="2000" dirty="0" err="1" smtClean="0"/>
-              <a:t>d</a:t>
-            </a:r>
-            <a:r>
-              <a:rPr lang="en-US" sz="2000" dirty="0" smtClean="0"/>
-              <a:t>', 5, 'Print', '</a:t>
-            </a:r>
-            <a:r>
-              <a:rPr lang="en-US" sz="2000" dirty="0" err="1" smtClean="0"/>
-              <a:t>d</a:t>
-            </a:r>
-            <a:r>
-              <a:rPr lang="en-US" sz="2000" dirty="0" smtClean="0"/>
-              <a:t>', '</a:t>
-            </a:r>
-            <a:r>
-              <a:rPr lang="en-US" sz="2000" dirty="0" err="1" smtClean="0"/>
-              <a:t>CallFunction</a:t>
-            </a:r>
-            <a:r>
-              <a:rPr lang="en-US" sz="2000" dirty="0" smtClean="0"/>
-              <a:t>', 'fun'</a:t>
-            </a:r>
-            <a:r>
-              <a:rPr lang="en-US" sz="2000" dirty="0" smtClean="0"/>
-              <a:t>]</a:t>
-            </a:r>
-          </a:p>
-          <a:p>
-            <a:pPr>
-              <a:buNone/>
-            </a:pPr>
-            <a:endParaRPr lang="en-US" sz="2595" dirty="0" smtClean="0"/>
-          </a:p>
-          <a:p>
-            <a:endParaRPr lang="en-US" dirty="0"/>
-          </a:p>
-        </p:txBody>
-      </p:sp>
-    </p:spTree>
-  </p:cSld>
-  <p:clrMapOvr>
-    <a:masterClrMapping/>
-  </p:clrMapOvr>
-  <p:timing>
-    <p:tnLst>
-      <p:par>
-        <p:cTn id="1" dur="indefinite" restart="never" nodeType="tmRoot"/>
-      </p:par>
-    </p:tnLst>
-  </p:timing>
-</p:sld>
-</file>
-
-<file path=ppt/slides/slide19.xml><?xml version="1.0" encoding="utf-8"?>
-<p:sld xmlns:a="http://schemas.openxmlformats.org/drawingml/2006/main" xmlns:r="http://schemas.openxmlformats.org/officeDocument/2006/relationships" xmlns:mc="http://schemas.openxmlformats.org/markup-compatibility/2006" xmlns:mv="urn:schemas-microsoft-com:mac:vml" xmlns:p="http://schemas.openxmlformats.org/presentationml/2006/main" mc:Ignorable="mv" mc:PreserveAttributes="mv:*">
-  <p:cSld>
-    <p:spTree>
-      <p:nvGrpSpPr>
-        <p:cNvPr id="1" name=""/>
-        <p:cNvGrpSpPr/>
-        <p:nvPr/>
-      </p:nvGrpSpPr>
-      <p:grpSpPr>
-        <a:xfrm>
-          <a:off x="0" y="0"/>
-          <a:ext cx="0" cy="0"/>
-          <a:chOff x="0" y="0"/>
-          <a:chExt cx="0" cy="0"/>
-        </a:xfrm>
-      </p:grpSpPr>
-      <p:sp>
-        <p:nvSpPr>
-          <p:cNvPr id="2" name="Title 1"/>
-          <p:cNvSpPr>
-            <a:spLocks noGrp="1"/>
-          </p:cNvSpPr>
-          <p:nvPr>
-            <p:ph type="title"/>
-          </p:nvPr>
-        </p:nvSpPr>
-        <p:spPr/>
-        <p:txBody>
-          <a:bodyPr/>
-          <a:lstStyle/>
-          <a:p>
-            <a:r>
-              <a:rPr lang="en-US" dirty="0" smtClean="0"/>
-              <a:t>Interpreter Output</a:t>
-            </a:r>
-            <a:endParaRPr lang="en-US" dirty="0"/>
-          </a:p>
-        </p:txBody>
-      </p:sp>
-      <p:sp>
-        <p:nvSpPr>
-          <p:cNvPr id="3" name="Content Placeholder 2"/>
-          <p:cNvSpPr>
-            <a:spLocks noGrp="1"/>
-          </p:cNvSpPr>
-          <p:nvPr>
-            <p:ph idx="1"/>
-          </p:nvPr>
-        </p:nvSpPr>
-        <p:spPr/>
-        <p:txBody>
-          <a:bodyPr>
-            <a:normAutofit fontScale="70000" lnSpcReduction="20000"/>
-          </a:bodyPr>
-          <a:lstStyle/>
-          <a:p>
-            <a:pPr>
-              <a:buNone/>
-            </a:pPr>
-            <a:r>
-              <a:rPr lang="en-US" dirty="0" err="1" smtClean="0"/>
-              <a:t>HelloWorld</a:t>
-            </a:r>
-            <a:endParaRPr lang="en-US" dirty="0" smtClean="0"/>
-          </a:p>
-          <a:p>
-            <a:pPr>
-              <a:buNone/>
-            </a:pPr>
-            <a:r>
-              <a:rPr lang="en-US" dirty="0" smtClean="0"/>
-              <a:t>0</a:t>
-            </a:r>
-          </a:p>
-          <a:p>
-            <a:pPr>
-              <a:buNone/>
-            </a:pPr>
-            <a:r>
-              <a:rPr lang="en-US" dirty="0" smtClean="0"/>
-              <a:t>5</a:t>
-            </a:r>
-          </a:p>
-          <a:p>
-            <a:pPr>
-              <a:buNone/>
-            </a:pPr>
-            <a:r>
-              <a:rPr lang="en-US" dirty="0" smtClean="0"/>
-              <a:t>10</a:t>
-            </a:r>
-          </a:p>
-          <a:p>
-            <a:pPr>
-              <a:buNone/>
-            </a:pPr>
-            <a:r>
-              <a:rPr lang="en-US" dirty="0" smtClean="0"/>
-              <a:t>2</a:t>
-            </a:r>
-          </a:p>
-          <a:p>
-            <a:pPr>
-              <a:buNone/>
-            </a:pPr>
-            <a:r>
-              <a:rPr lang="en-US" dirty="0" smtClean="0"/>
-              <a:t>10.0</a:t>
-            </a:r>
-          </a:p>
-          <a:p>
-            <a:pPr>
-              <a:buNone/>
-            </a:pPr>
-            <a:r>
-              <a:rPr lang="en-US" dirty="0" smtClean="0"/>
-              <a:t>cannot cast </a:t>
-            </a:r>
-            <a:r>
-              <a:rPr lang="en-US" dirty="0" err="1" smtClean="0"/>
-              <a:t>str</a:t>
-            </a:r>
-            <a:r>
-              <a:rPr lang="en-US" dirty="0" smtClean="0"/>
-              <a:t> to float</a:t>
-            </a:r>
-          </a:p>
-          <a:p>
-            <a:pPr>
-              <a:buNone/>
-            </a:pPr>
-            <a:r>
-              <a:rPr lang="en-US" dirty="0" smtClean="0"/>
-              <a:t>'a'</a:t>
-            </a:r>
-          </a:p>
-          <a:p>
-            <a:pPr>
-              <a:buNone/>
-            </a:pPr>
-            <a:r>
-              <a:rPr lang="en-US" dirty="0" smtClean="0"/>
-              <a:t>5.0</a:t>
-            </a:r>
-          </a:p>
-          <a:p>
-            <a:pPr>
-              <a:buNone/>
-            </a:pPr>
-            <a:r>
-              <a:rPr lang="en-US" dirty="0" smtClean="0"/>
-              <a:t>'</a:t>
-            </a:r>
-            <a:r>
-              <a:rPr lang="en-US" dirty="0" err="1" smtClean="0"/>
-              <a:t>z</a:t>
-            </a:r>
-            <a:r>
-              <a:rPr lang="en-US" dirty="0" smtClean="0"/>
-              <a:t>'</a:t>
-            </a:r>
-          </a:p>
-          <a:p>
-            <a:pPr>
-              <a:buNone/>
-            </a:pPr>
-            <a:r>
-              <a:rPr lang="en-US" dirty="0" smtClean="0"/>
-              <a:t>10</a:t>
-            </a:r>
-          </a:p>
-          <a:p>
-            <a:pPr>
-              <a:buNone/>
-            </a:pPr>
-            <a:endParaRPr lang="en-US" dirty="0"/>
-          </a:p>
-        </p:txBody>
-      </p:sp>
-    </p:spTree>
-  </p:cSld>
-  <p:clrMapOvr>
-    <a:masterClrMapping/>
-  </p:clrMapOvr>
-  <p:timing>
-    <p:tnLst>
-      <p:par>
-        <p:cTn id="1" dur="indefinite" restart="never" nodeType="tmRoot"/>
-      </p:par>
-    </p:tnLst>
-  </p:timing>
-</p:sld>
-</file>
-
 <file path=ppt/slides/slide2.xml><?xml version="1.0" encoding="utf-8"?>
-<p:sld xmlns:a="http://schemas.openxmlformats.org/drawingml/2006/main" xmlns:r="http://schemas.openxmlformats.org/officeDocument/2006/relationships" xmlns:mc="http://schemas.openxmlformats.org/markup-compatibility/2006" xmlns:mv="urn:schemas-microsoft-com:mac:vml" xmlns:p="http://schemas.openxmlformats.org/presentationml/2006/main" mc:Ignorable="mv" mc:PreserveAttributes="mv:*">
+<p:sld xmlns:a="http://schemas.openxmlformats.org/drawingml/2006/main" xmlns:r="http://schemas.openxmlformats.org/officeDocument/2006/relationships" xmlns:p="http://schemas.openxmlformats.org/presentationml/2006/main">
   <p:cSld>
     <p:spTree>
       <p:nvGrpSpPr>
@@ -9534,7 +9312,7 @@
           <a:effectLst/>
           <a:extLst>
             <a:ext uri="{91240B29-F687-4F45-9708-019B960494DF}">
-              <a14:hiddenLine xmlns:a14="http://schemas.microsoft.com/office/drawing/2010/main" xmlns:p="http://schemas.openxmlformats.org/presentationml/2006/main" xmlns:r="http://schemas.openxmlformats.org/officeDocument/2006/relationships" xmlns:a="http://schemas.openxmlformats.org/drawingml/2006/main" xmlns="" w="9525">
+              <a14:hiddenLine xmlns:a14="http://schemas.microsoft.com/office/drawing/2010/main" w="9525">
                 <a:solidFill>
                   <a:schemeClr val="tx1"/>
                 </a:solidFill>
@@ -9544,7 +9322,7 @@
               </a14:hiddenLine>
             </a:ext>
             <a:ext uri="{AF507438-7753-43E0-B8FC-AC1667EBCBE1}">
-              <a14:hiddenEffects xmlns:a14="http://schemas.microsoft.com/office/drawing/2010/main" xmlns:p="http://schemas.openxmlformats.org/presentationml/2006/main" xmlns:r="http://schemas.openxmlformats.org/officeDocument/2006/relationships" xmlns:a="http://schemas.openxmlformats.org/drawingml/2006/main" xmlns="">
+              <a14:hiddenEffects xmlns:a14="http://schemas.microsoft.com/office/drawing/2010/main">
                 <a:effectLst>
                   <a:outerShdw dist="35921" dir="2700000" algn="ctr" rotWithShape="0">
                     <a:schemeClr val="bg2"/>
@@ -11441,18 +11219,561 @@
     </p:spTree>
     <p:extLst>
       <p:ext uri="{BB962C8B-B14F-4D97-AF65-F5344CB8AC3E}">
-        <p14:creationId xmlns:p14="http://schemas.microsoft.com/office/powerpoint/2010/main" xmlns:p="http://schemas.openxmlformats.org/presentationml/2006/main" xmlns:r="http://schemas.openxmlformats.org/officeDocument/2006/relationships" xmlns:a="http://schemas.openxmlformats.org/drawingml/2006/main" xmlns="" val="4246246875"/>
+        <p14:creationId xmlns:p14="http://schemas.microsoft.com/office/powerpoint/2010/main" val="4246246875"/>
       </p:ext>
     </p:extLst>
   </p:cSld>
   <p:clrMapOvr>
     <a:masterClrMapping/>
   </p:clrMapOvr>
+  <p:timing>
+    <p:tnLst>
+      <p:par>
+        <p:cTn id="1" dur="indefinite" restart="never" nodeType="tmRoot"/>
+      </p:par>
+    </p:tnLst>
+  </p:timing>
+</p:sld>
+</file>
+
+<file path=ppt/slides/slide20.xml><?xml version="1.0" encoding="utf-8"?>
+<p:sld xmlns:a="http://schemas.openxmlformats.org/drawingml/2006/main" xmlns:r="http://schemas.openxmlformats.org/officeDocument/2006/relationships" xmlns:p="http://schemas.openxmlformats.org/presentationml/2006/main">
+  <p:cSld>
+    <p:spTree>
+      <p:nvGrpSpPr>
+        <p:cNvPr id="1" name=""/>
+        <p:cNvGrpSpPr/>
+        <p:nvPr/>
+      </p:nvGrpSpPr>
+      <p:grpSpPr>
+        <a:xfrm>
+          <a:off x="0" y="0"/>
+          <a:ext cx="0" cy="0"/>
+          <a:chOff x="0" y="0"/>
+          <a:chExt cx="0" cy="0"/>
+        </a:xfrm>
+      </p:grpSpPr>
+      <p:sp>
+        <p:nvSpPr>
+          <p:cNvPr id="2" name="Title 1"/>
+          <p:cNvSpPr>
+            <a:spLocks noGrp="1"/>
+          </p:cNvSpPr>
+          <p:nvPr>
+            <p:ph type="title"/>
+          </p:nvPr>
+        </p:nvSpPr>
+        <p:spPr/>
+        <p:txBody>
+          <a:bodyPr>
+            <a:normAutofit/>
+          </a:bodyPr>
+          <a:lstStyle/>
+          <a:p>
+            <a:r>
+              <a:rPr lang="en-US" dirty="0" smtClean="0"/>
+              <a:t>Abstract Syntax Tree </a:t>
+            </a:r>
+            <a:endParaRPr lang="en-US" dirty="0"/>
+          </a:p>
+        </p:txBody>
+      </p:sp>
+      <p:sp>
+        <p:nvSpPr>
+          <p:cNvPr id="5" name="Content Placeholder 4"/>
+          <p:cNvSpPr>
+            <a:spLocks noGrp="1"/>
+          </p:cNvSpPr>
+          <p:nvPr>
+            <p:ph idx="1"/>
+          </p:nvPr>
+        </p:nvSpPr>
+        <p:spPr/>
+        <p:txBody>
+          <a:bodyPr>
+            <a:normAutofit/>
+          </a:bodyPr>
+          <a:lstStyle/>
+          <a:p>
+            <a:pPr>
+              <a:buNone/>
+            </a:pPr>
+            <a:r>
+              <a:rPr lang="en-US" sz="2000" dirty="0" smtClean="0"/>
+              <a:t>['Print', '</a:t>
+            </a:r>
+            <a:r>
+              <a:rPr lang="en-US" sz="2000" dirty="0" err="1" smtClean="0"/>
+              <a:t>HelloWorld</a:t>
+            </a:r>
+            <a:r>
+              <a:rPr lang="en-US" sz="2000" dirty="0" smtClean="0"/>
+              <a:t>', '</a:t>
+            </a:r>
+            <a:r>
+              <a:rPr lang="en-US" sz="2000" dirty="0" err="1" smtClean="0"/>
+              <a:t>VariableInst</a:t>
+            </a:r>
+            <a:r>
+              <a:rPr lang="en-US" sz="2000" dirty="0" smtClean="0"/>
+              <a:t>', 'a', 'Comment', 'Print’, 'a', 'Comment', </a:t>
+            </a:r>
+          </a:p>
+          <a:p>
+            <a:pPr>
+              <a:buNone/>
+            </a:pPr>
+            <a:r>
+              <a:rPr lang="en-US" sz="2000" dirty="0" smtClean="0"/>
+              <a:t>'</a:t>
+            </a:r>
+            <a:r>
+              <a:rPr lang="en-US" sz="2000" dirty="0" err="1" smtClean="0"/>
+              <a:t>VariableDeclaration</a:t>
+            </a:r>
+            <a:r>
+              <a:rPr lang="en-US" sz="2000" dirty="0" smtClean="0"/>
+              <a:t>', '</a:t>
+            </a:r>
+            <a:r>
+              <a:rPr lang="en-US" sz="2000" dirty="0" err="1" smtClean="0"/>
+              <a:t>c</a:t>
+            </a:r>
+            <a:r>
+              <a:rPr lang="en-US" sz="2000" dirty="0" smtClean="0"/>
+              <a:t>', 5, 'Comment', 'Print', '</a:t>
+            </a:r>
+            <a:r>
+              <a:rPr lang="en-US" sz="2000" dirty="0" err="1" smtClean="0"/>
+              <a:t>c</a:t>
+            </a:r>
+            <a:r>
+              <a:rPr lang="en-US" sz="2000" dirty="0" smtClean="0"/>
+              <a:t>', 'Comment', </a:t>
+            </a:r>
+          </a:p>
+          <a:p>
+            <a:pPr>
+              <a:buNone/>
+            </a:pPr>
+            <a:r>
+              <a:rPr lang="en-US" sz="2000" dirty="0" smtClean="0"/>
+              <a:t>'</a:t>
+            </a:r>
+            <a:r>
+              <a:rPr lang="en-US" sz="2000" dirty="0" err="1" smtClean="0"/>
+              <a:t>IfElseStatement</a:t>
+            </a:r>
+            <a:r>
+              <a:rPr lang="en-US" sz="2000" dirty="0" smtClean="0"/>
+              <a:t>', False,</a:t>
+            </a:r>
+          </a:p>
+          <a:p>
+            <a:pPr>
+              <a:buNone/>
+            </a:pPr>
+            <a:r>
+              <a:rPr lang="en-US" sz="2000" dirty="0" smtClean="0"/>
+              <a:t>	 ['</a:t>
+            </a:r>
+            <a:r>
+              <a:rPr lang="en-US" sz="2000" dirty="0" err="1" smtClean="0"/>
+              <a:t>MathAssExp</a:t>
+            </a:r>
+            <a:r>
+              <a:rPr lang="en-US" sz="2000" dirty="0" smtClean="0"/>
+              <a:t>', 5, 5, '*', 'a', 'Print', 'a'], </a:t>
+            </a:r>
+          </a:p>
+          <a:p>
+            <a:pPr>
+              <a:buNone/>
+            </a:pPr>
+            <a:r>
+              <a:rPr lang="en-US" sz="2000" dirty="0" smtClean="0"/>
+              <a:t>	['</a:t>
+            </a:r>
+            <a:r>
+              <a:rPr lang="en-US" sz="2000" dirty="0" err="1" smtClean="0"/>
+              <a:t>MathAssExp</a:t>
+            </a:r>
+            <a:r>
+              <a:rPr lang="en-US" sz="2000" dirty="0" smtClean="0"/>
+              <a:t>', 5, 5, '+', 'a', 'Print', 'a'], </a:t>
+            </a:r>
+          </a:p>
+          <a:p>
+            <a:pPr>
+              <a:buNone/>
+            </a:pPr>
+            <a:r>
+              <a:rPr lang="en-US" sz="2000" dirty="0" smtClean="0"/>
+              <a:t>'</a:t>
+            </a:r>
+            <a:r>
+              <a:rPr lang="en-US" sz="2000" dirty="0" err="1" smtClean="0"/>
+              <a:t>MathExp</a:t>
+            </a:r>
+            <a:r>
+              <a:rPr lang="en-US" sz="2000" dirty="0" smtClean="0"/>
+              <a:t>', 5, 3, '-', 'Comment', </a:t>
+            </a:r>
+          </a:p>
+          <a:p>
+            <a:pPr>
+              <a:buNone/>
+            </a:pPr>
+            <a:r>
+              <a:rPr lang="en-US" sz="2000" dirty="0" smtClean="0"/>
+              <a:t>'</a:t>
+            </a:r>
+            <a:r>
+              <a:rPr lang="en-US" sz="2000" dirty="0" err="1" smtClean="0"/>
+              <a:t>DefineFunction</a:t>
+            </a:r>
+            <a:r>
+              <a:rPr lang="en-US" sz="2000" dirty="0" smtClean="0"/>
+              <a:t>', 'fun', ['Print', "'</a:t>
+            </a:r>
+            <a:r>
+              <a:rPr lang="en-US" sz="2000" dirty="0" err="1" smtClean="0"/>
+              <a:t>z</a:t>
+            </a:r>
+            <a:r>
+              <a:rPr lang="en-US" sz="2000" dirty="0" smtClean="0"/>
+              <a:t>'", '</a:t>
+            </a:r>
+            <a:r>
+              <a:rPr lang="en-US" sz="2000" dirty="0" err="1" smtClean="0"/>
+              <a:t>MathExp</a:t>
+            </a:r>
+            <a:r>
+              <a:rPr lang="en-US" sz="2000" dirty="0" smtClean="0"/>
+              <a:t>', 5, 5, '+'], </a:t>
+            </a:r>
+          </a:p>
+          <a:p>
+            <a:pPr>
+              <a:buNone/>
+            </a:pPr>
+            <a:r>
+              <a:rPr lang="en-US" sz="2000" dirty="0" smtClean="0"/>
+              <a:t>'</a:t>
+            </a:r>
+            <a:r>
+              <a:rPr lang="en-US" sz="2000" dirty="0" err="1" smtClean="0"/>
+              <a:t>FloatCast</a:t>
+            </a:r>
+            <a:r>
+              <a:rPr lang="en-US" sz="2000" dirty="0" smtClean="0"/>
+              <a:t>', '</a:t>
+            </a:r>
+            <a:r>
+              <a:rPr lang="en-US" sz="2000" dirty="0" err="1" smtClean="0"/>
+              <a:t>b</a:t>
+            </a:r>
+            <a:r>
+              <a:rPr lang="en-US" sz="2000" dirty="0" smtClean="0"/>
+              <a:t>', 'a', 'Print', '</a:t>
+            </a:r>
+            <a:r>
+              <a:rPr lang="en-US" sz="2000" dirty="0" err="1" smtClean="0"/>
+              <a:t>b</a:t>
+            </a:r>
+            <a:r>
+              <a:rPr lang="en-US" sz="2000" dirty="0" smtClean="0"/>
+              <a:t>', '</a:t>
+            </a:r>
+            <a:r>
+              <a:rPr lang="en-US" sz="2000" dirty="0" err="1" smtClean="0"/>
+              <a:t>FloatCast</a:t>
+            </a:r>
+            <a:r>
+              <a:rPr lang="en-US" sz="2000" dirty="0" smtClean="0"/>
+              <a:t>', '</a:t>
+            </a:r>
+            <a:r>
+              <a:rPr lang="en-US" sz="2000" dirty="0" err="1" smtClean="0"/>
+              <a:t>c</a:t>
+            </a:r>
+            <a:r>
+              <a:rPr lang="en-US" sz="2000" dirty="0" smtClean="0"/>
+              <a:t>', "'a'", 'Print', '</a:t>
+            </a:r>
+            <a:r>
+              <a:rPr lang="en-US" sz="2000" dirty="0" err="1" smtClean="0"/>
+              <a:t>c</a:t>
+            </a:r>
+            <a:r>
+              <a:rPr lang="en-US" sz="2000" dirty="0" smtClean="0"/>
+              <a:t>', </a:t>
+            </a:r>
+          </a:p>
+          <a:p>
+            <a:pPr>
+              <a:buNone/>
+            </a:pPr>
+            <a:r>
+              <a:rPr lang="en-US" sz="2000" dirty="0" smtClean="0"/>
+              <a:t>'</a:t>
+            </a:r>
+            <a:r>
+              <a:rPr lang="en-US" sz="2000" dirty="0" err="1" smtClean="0"/>
+              <a:t>FloatCast</a:t>
+            </a:r>
+            <a:r>
+              <a:rPr lang="en-US" sz="2000" dirty="0" smtClean="0"/>
+              <a:t>', '</a:t>
+            </a:r>
+            <a:r>
+              <a:rPr lang="en-US" sz="2000" dirty="0" err="1" smtClean="0"/>
+              <a:t>d</a:t>
+            </a:r>
+            <a:r>
+              <a:rPr lang="en-US" sz="2000" dirty="0" smtClean="0"/>
+              <a:t>', 5, 'Print', '</a:t>
+            </a:r>
+            <a:r>
+              <a:rPr lang="en-US" sz="2000" dirty="0" err="1" smtClean="0"/>
+              <a:t>d</a:t>
+            </a:r>
+            <a:r>
+              <a:rPr lang="en-US" sz="2000" dirty="0" smtClean="0"/>
+              <a:t>', '</a:t>
+            </a:r>
+            <a:r>
+              <a:rPr lang="en-US" sz="2000" dirty="0" err="1" smtClean="0"/>
+              <a:t>CallFunction</a:t>
+            </a:r>
+            <a:r>
+              <a:rPr lang="en-US" sz="2000" dirty="0" smtClean="0"/>
+              <a:t>', 'fun']</a:t>
+            </a:r>
+          </a:p>
+          <a:p>
+            <a:pPr>
+              <a:buNone/>
+            </a:pPr>
+            <a:endParaRPr lang="en-US" sz="2595" dirty="0" smtClean="0"/>
+          </a:p>
+          <a:p>
+            <a:endParaRPr lang="en-US" dirty="0"/>
+          </a:p>
+        </p:txBody>
+      </p:sp>
+    </p:spTree>
+  </p:cSld>
+  <p:clrMapOvr>
+    <a:masterClrMapping/>
+  </p:clrMapOvr>
+  <p:timing>
+    <p:tnLst>
+      <p:par>
+        <p:cTn id="1" dur="indefinite" restart="never" nodeType="tmRoot"/>
+      </p:par>
+    </p:tnLst>
+  </p:timing>
+</p:sld>
+</file>
+
+<file path=ppt/slides/slide21.xml><?xml version="1.0" encoding="utf-8"?>
+<p:sld xmlns:a="http://schemas.openxmlformats.org/drawingml/2006/main" xmlns:r="http://schemas.openxmlformats.org/officeDocument/2006/relationships" xmlns:p="http://schemas.openxmlformats.org/presentationml/2006/main">
+  <p:cSld>
+    <p:spTree>
+      <p:nvGrpSpPr>
+        <p:cNvPr id="1" name=""/>
+        <p:cNvGrpSpPr/>
+        <p:nvPr/>
+      </p:nvGrpSpPr>
+      <p:grpSpPr>
+        <a:xfrm>
+          <a:off x="0" y="0"/>
+          <a:ext cx="0" cy="0"/>
+          <a:chOff x="0" y="0"/>
+          <a:chExt cx="0" cy="0"/>
+        </a:xfrm>
+      </p:grpSpPr>
+      <p:sp>
+        <p:nvSpPr>
+          <p:cNvPr id="2" name="Title 1"/>
+          <p:cNvSpPr>
+            <a:spLocks noGrp="1"/>
+          </p:cNvSpPr>
+          <p:nvPr>
+            <p:ph type="title"/>
+          </p:nvPr>
+        </p:nvSpPr>
+        <p:spPr/>
+        <p:txBody>
+          <a:bodyPr/>
+          <a:lstStyle/>
+          <a:p>
+            <a:r>
+              <a:rPr lang="en-US" dirty="0" smtClean="0"/>
+              <a:t>Interpreter Output</a:t>
+            </a:r>
+            <a:endParaRPr lang="en-US" dirty="0"/>
+          </a:p>
+        </p:txBody>
+      </p:sp>
+      <p:sp>
+        <p:nvSpPr>
+          <p:cNvPr id="3" name="Content Placeholder 2"/>
+          <p:cNvSpPr>
+            <a:spLocks noGrp="1"/>
+          </p:cNvSpPr>
+          <p:nvPr>
+            <p:ph idx="1"/>
+          </p:nvPr>
+        </p:nvSpPr>
+        <p:spPr/>
+        <p:txBody>
+          <a:bodyPr>
+            <a:normAutofit fontScale="70000" lnSpcReduction="20000"/>
+          </a:bodyPr>
+          <a:lstStyle/>
+          <a:p>
+            <a:pPr>
+              <a:buNone/>
+            </a:pPr>
+            <a:r>
+              <a:rPr lang="en-US" dirty="0" err="1" smtClean="0"/>
+              <a:t>HelloWorld</a:t>
+            </a:r>
+            <a:endParaRPr lang="en-US" dirty="0" smtClean="0"/>
+          </a:p>
+          <a:p>
+            <a:pPr>
+              <a:buNone/>
+            </a:pPr>
+            <a:r>
+              <a:rPr lang="en-US" dirty="0" smtClean="0"/>
+              <a:t>0</a:t>
+            </a:r>
+          </a:p>
+          <a:p>
+            <a:pPr>
+              <a:buNone/>
+            </a:pPr>
+            <a:r>
+              <a:rPr lang="en-US" dirty="0" smtClean="0"/>
+              <a:t>5</a:t>
+            </a:r>
+          </a:p>
+          <a:p>
+            <a:pPr>
+              <a:buNone/>
+            </a:pPr>
+            <a:r>
+              <a:rPr lang="en-US" dirty="0" smtClean="0"/>
+              <a:t>10</a:t>
+            </a:r>
+          </a:p>
+          <a:p>
+            <a:pPr>
+              <a:buNone/>
+            </a:pPr>
+            <a:r>
+              <a:rPr lang="en-US" dirty="0" smtClean="0"/>
+              <a:t>2</a:t>
+            </a:r>
+          </a:p>
+          <a:p>
+            <a:pPr>
+              <a:buNone/>
+            </a:pPr>
+            <a:r>
+              <a:rPr lang="en-US" dirty="0" smtClean="0"/>
+              <a:t>10.0</a:t>
+            </a:r>
+          </a:p>
+          <a:p>
+            <a:pPr>
+              <a:buNone/>
+            </a:pPr>
+            <a:r>
+              <a:rPr lang="en-US" dirty="0" smtClean="0"/>
+              <a:t>cannot cast </a:t>
+            </a:r>
+            <a:r>
+              <a:rPr lang="en-US" dirty="0" err="1" smtClean="0"/>
+              <a:t>str</a:t>
+            </a:r>
+            <a:r>
+              <a:rPr lang="en-US" dirty="0" smtClean="0"/>
+              <a:t> to float</a:t>
+            </a:r>
+          </a:p>
+          <a:p>
+            <a:pPr>
+              <a:buNone/>
+            </a:pPr>
+            <a:r>
+              <a:rPr lang="en-US" dirty="0" smtClean="0"/>
+              <a:t>'a'</a:t>
+            </a:r>
+          </a:p>
+          <a:p>
+            <a:pPr>
+              <a:buNone/>
+            </a:pPr>
+            <a:r>
+              <a:rPr lang="en-US" dirty="0" smtClean="0"/>
+              <a:t>5.0</a:t>
+            </a:r>
+          </a:p>
+          <a:p>
+            <a:pPr>
+              <a:buNone/>
+            </a:pPr>
+            <a:r>
+              <a:rPr lang="en-US" dirty="0" smtClean="0"/>
+              <a:t>'</a:t>
+            </a:r>
+            <a:r>
+              <a:rPr lang="en-US" dirty="0" err="1" smtClean="0"/>
+              <a:t>z</a:t>
+            </a:r>
+            <a:r>
+              <a:rPr lang="en-US" dirty="0" smtClean="0"/>
+              <a:t>'</a:t>
+            </a:r>
+          </a:p>
+          <a:p>
+            <a:pPr>
+              <a:buNone/>
+            </a:pPr>
+            <a:r>
+              <a:rPr lang="en-US" dirty="0" smtClean="0"/>
+              <a:t>10</a:t>
+            </a:r>
+          </a:p>
+          <a:p>
+            <a:pPr>
+              <a:buNone/>
+            </a:pPr>
+            <a:endParaRPr lang="en-US" dirty="0"/>
+          </a:p>
+        </p:txBody>
+      </p:sp>
+    </p:spTree>
+  </p:cSld>
+  <p:clrMapOvr>
+    <a:masterClrMapping/>
+  </p:clrMapOvr>
+  <p:timing>
+    <p:tnLst>
+      <p:par>
+        <p:cTn id="1" dur="indefinite" restart="never" nodeType="tmRoot"/>
+      </p:par>
+    </p:tnLst>
+  </p:timing>
 </p:sld>
 </file>
 
 <file path=ppt/slides/slide3.xml><?xml version="1.0" encoding="utf-8"?>
-<p:sld xmlns:a="http://schemas.openxmlformats.org/drawingml/2006/main" xmlns:r="http://schemas.openxmlformats.org/officeDocument/2006/relationships" xmlns:mc="http://schemas.openxmlformats.org/markup-compatibility/2006" xmlns:mv="urn:schemas-microsoft-com:mac:vml" xmlns:p="http://schemas.openxmlformats.org/presentationml/2006/main" mc:Ignorable="mv" mc:PreserveAttributes="mv:*">
+<p:sld xmlns:a="http://schemas.openxmlformats.org/drawingml/2006/main" xmlns:r="http://schemas.openxmlformats.org/officeDocument/2006/relationships" xmlns:p="http://schemas.openxmlformats.org/presentationml/2006/main">
   <p:cSld>
     <p:spTree>
       <p:nvGrpSpPr>
@@ -11523,7 +11844,7 @@
           <a:effectLst/>
           <a:extLst>
             <a:ext uri="{91240B29-F687-4F45-9708-019B960494DF}">
-              <a14:hiddenLine xmlns:a14="http://schemas.microsoft.com/office/drawing/2010/main" xmlns:p="http://schemas.openxmlformats.org/presentationml/2006/main" xmlns:r="http://schemas.openxmlformats.org/officeDocument/2006/relationships" xmlns:a="http://schemas.openxmlformats.org/drawingml/2006/main" xmlns="" w="9525">
+              <a14:hiddenLine xmlns:a14="http://schemas.microsoft.com/office/drawing/2010/main" w="9525">
                 <a:solidFill>
                   <a:schemeClr val="tx1"/>
                 </a:solidFill>
@@ -11533,7 +11854,7 @@
               </a14:hiddenLine>
             </a:ext>
             <a:ext uri="{AF507438-7753-43E0-B8FC-AC1667EBCBE1}">
-              <a14:hiddenEffects xmlns:a14="http://schemas.microsoft.com/office/drawing/2010/main" xmlns:p="http://schemas.openxmlformats.org/presentationml/2006/main" xmlns:r="http://schemas.openxmlformats.org/officeDocument/2006/relationships" xmlns:a="http://schemas.openxmlformats.org/drawingml/2006/main" xmlns="">
+              <a14:hiddenEffects xmlns:a14="http://schemas.microsoft.com/office/drawing/2010/main">
                 <a:effectLst>
                   <a:outerShdw dist="35921" dir="2700000" algn="ctr" rotWithShape="0">
                     <a:schemeClr val="bg2"/>
@@ -12524,18 +12845,25 @@
     </p:spTree>
     <p:extLst>
       <p:ext uri="{BB962C8B-B14F-4D97-AF65-F5344CB8AC3E}">
-        <p14:creationId xmlns:p14="http://schemas.microsoft.com/office/powerpoint/2010/main" xmlns:p="http://schemas.openxmlformats.org/presentationml/2006/main" xmlns:r="http://schemas.openxmlformats.org/officeDocument/2006/relationships" xmlns:a="http://schemas.openxmlformats.org/drawingml/2006/main" xmlns="" val="4082042008"/>
+        <p14:creationId xmlns:p14="http://schemas.microsoft.com/office/powerpoint/2010/main" val="4082042008"/>
       </p:ext>
     </p:extLst>
   </p:cSld>
   <p:clrMapOvr>
     <a:masterClrMapping/>
   </p:clrMapOvr>
+  <p:timing>
+    <p:tnLst>
+      <p:par>
+        <p:cTn id="1" dur="indefinite" restart="never" nodeType="tmRoot"/>
+      </p:par>
+    </p:tnLst>
+  </p:timing>
 </p:sld>
 </file>
 
 <file path=ppt/slides/slide4.xml><?xml version="1.0" encoding="utf-8"?>
-<p:sld xmlns:a="http://schemas.openxmlformats.org/drawingml/2006/main" xmlns:r="http://schemas.openxmlformats.org/officeDocument/2006/relationships" xmlns:mc="http://schemas.openxmlformats.org/markup-compatibility/2006" xmlns:mv="urn:schemas-microsoft-com:mac:vml" xmlns:p="http://schemas.openxmlformats.org/presentationml/2006/main" mc:Ignorable="mv" mc:PreserveAttributes="mv:*">
+<p:sld xmlns:a="http://schemas.openxmlformats.org/drawingml/2006/main" xmlns:r="http://schemas.openxmlformats.org/officeDocument/2006/relationships" xmlns:p="http://schemas.openxmlformats.org/presentationml/2006/main">
   <p:cSld>
     <p:spTree>
       <p:nvGrpSpPr>
@@ -12606,7 +12934,7 @@
           <a:effectLst/>
           <a:extLst>
             <a:ext uri="{91240B29-F687-4F45-9708-019B960494DF}">
-              <a14:hiddenLine xmlns:a14="http://schemas.microsoft.com/office/drawing/2010/main" xmlns:p="http://schemas.openxmlformats.org/presentationml/2006/main" xmlns:r="http://schemas.openxmlformats.org/officeDocument/2006/relationships" xmlns:a="http://schemas.openxmlformats.org/drawingml/2006/main" xmlns="" w="9525">
+              <a14:hiddenLine xmlns:a14="http://schemas.microsoft.com/office/drawing/2010/main" w="9525">
                 <a:solidFill>
                   <a:schemeClr val="tx1"/>
                 </a:solidFill>
@@ -12616,7 +12944,7 @@
               </a14:hiddenLine>
             </a:ext>
             <a:ext uri="{AF507438-7753-43E0-B8FC-AC1667EBCBE1}">
-              <a14:hiddenEffects xmlns:a14="http://schemas.microsoft.com/office/drawing/2010/main" xmlns:p="http://schemas.openxmlformats.org/presentationml/2006/main" xmlns:r="http://schemas.openxmlformats.org/officeDocument/2006/relationships" xmlns:a="http://schemas.openxmlformats.org/drawingml/2006/main" xmlns="">
+              <a14:hiddenEffects xmlns:a14="http://schemas.microsoft.com/office/drawing/2010/main">
                 <a:effectLst>
                   <a:outerShdw dist="35921" dir="2700000" algn="ctr" rotWithShape="0">
                     <a:schemeClr val="bg2"/>
@@ -13534,18 +13862,25 @@
     </p:spTree>
     <p:extLst>
       <p:ext uri="{BB962C8B-B14F-4D97-AF65-F5344CB8AC3E}">
-        <p14:creationId xmlns:p14="http://schemas.microsoft.com/office/powerpoint/2010/main" xmlns:p="http://schemas.openxmlformats.org/presentationml/2006/main" xmlns:r="http://schemas.openxmlformats.org/officeDocument/2006/relationships" xmlns:a="http://schemas.openxmlformats.org/drawingml/2006/main" xmlns="" val="2137940131"/>
+        <p14:creationId xmlns:p14="http://schemas.microsoft.com/office/powerpoint/2010/main" val="2137940131"/>
       </p:ext>
     </p:extLst>
   </p:cSld>
   <p:clrMapOvr>
     <a:masterClrMapping/>
   </p:clrMapOvr>
+  <p:timing>
+    <p:tnLst>
+      <p:par>
+        <p:cTn id="1" dur="indefinite" restart="never" nodeType="tmRoot"/>
+      </p:par>
+    </p:tnLst>
+  </p:timing>
 </p:sld>
 </file>
 
 <file path=ppt/slides/slide5.xml><?xml version="1.0" encoding="utf-8"?>
-<p:sld xmlns:a="http://schemas.openxmlformats.org/drawingml/2006/main" xmlns:r="http://schemas.openxmlformats.org/officeDocument/2006/relationships" xmlns:mc="http://schemas.openxmlformats.org/markup-compatibility/2006" xmlns:mv="urn:schemas-microsoft-com:mac:vml" xmlns:p="http://schemas.openxmlformats.org/presentationml/2006/main" mc:Ignorable="mv" mc:PreserveAttributes="mv:*">
+<p:sld xmlns:a="http://schemas.openxmlformats.org/drawingml/2006/main" xmlns:r="http://schemas.openxmlformats.org/officeDocument/2006/relationships" xmlns:p="http://schemas.openxmlformats.org/presentationml/2006/main">
   <p:cSld>
     <p:spTree>
       <p:nvGrpSpPr>
@@ -13616,18 +13951,25 @@
     </p:spTree>
     <p:extLst>
       <p:ext uri="{BB962C8B-B14F-4D97-AF65-F5344CB8AC3E}">
-        <p14:creationId xmlns:p14="http://schemas.microsoft.com/office/powerpoint/2010/main" xmlns:p="http://schemas.openxmlformats.org/presentationml/2006/main" xmlns:r="http://schemas.openxmlformats.org/officeDocument/2006/relationships" xmlns:a="http://schemas.openxmlformats.org/drawingml/2006/main" xmlns="" val="1392206460"/>
+        <p14:creationId xmlns:p14="http://schemas.microsoft.com/office/powerpoint/2010/main" val="1392206460"/>
       </p:ext>
     </p:extLst>
   </p:cSld>
   <p:clrMapOvr>
     <a:masterClrMapping/>
   </p:clrMapOvr>
+  <p:timing>
+    <p:tnLst>
+      <p:par>
+        <p:cTn id="1" dur="indefinite" restart="never" nodeType="tmRoot"/>
+      </p:par>
+    </p:tnLst>
+  </p:timing>
 </p:sld>
 </file>
 
 <file path=ppt/slides/slide6.xml><?xml version="1.0" encoding="utf-8"?>
-<p:sld xmlns:a="http://schemas.openxmlformats.org/drawingml/2006/main" xmlns:r="http://schemas.openxmlformats.org/officeDocument/2006/relationships" xmlns:mc="http://schemas.openxmlformats.org/markup-compatibility/2006" xmlns:mv="urn:schemas-microsoft-com:mac:vml" xmlns:p="http://schemas.openxmlformats.org/presentationml/2006/main" mc:Ignorable="mv" mc:PreserveAttributes="mv:*">
+<p:sld xmlns:a="http://schemas.openxmlformats.org/drawingml/2006/main" xmlns:r="http://schemas.openxmlformats.org/officeDocument/2006/relationships" xmlns:p="http://schemas.openxmlformats.org/presentationml/2006/main">
   <p:cSld>
     <p:spTree>
       <p:nvGrpSpPr>
@@ -13699,7 +14041,7 @@
           <a:effectLst/>
           <a:extLst>
             <a:ext uri="{91240B29-F687-4F45-9708-019B960494DF}">
-              <a14:hiddenLine xmlns:a14="http://schemas.microsoft.com/office/drawing/2010/main" xmlns:p="http://schemas.openxmlformats.org/presentationml/2006/main" xmlns:r="http://schemas.openxmlformats.org/officeDocument/2006/relationships" xmlns:a="http://schemas.openxmlformats.org/drawingml/2006/main" xmlns="" w="9525">
+              <a14:hiddenLine xmlns:a14="http://schemas.microsoft.com/office/drawing/2010/main" w="9525">
                 <a:solidFill>
                   <a:schemeClr val="tx1"/>
                 </a:solidFill>
@@ -13709,7 +14051,7 @@
               </a14:hiddenLine>
             </a:ext>
             <a:ext uri="{AF507438-7753-43E0-B8FC-AC1667EBCBE1}">
-              <a14:hiddenEffects xmlns:a14="http://schemas.microsoft.com/office/drawing/2010/main" xmlns:p="http://schemas.openxmlformats.org/presentationml/2006/main" xmlns:r="http://schemas.openxmlformats.org/officeDocument/2006/relationships" xmlns:a="http://schemas.openxmlformats.org/drawingml/2006/main" xmlns="">
+              <a14:hiddenEffects xmlns:a14="http://schemas.microsoft.com/office/drawing/2010/main">
                 <a:effectLst>
                   <a:outerShdw dist="35921" dir="2700000" algn="ctr" rotWithShape="0">
                     <a:schemeClr val="bg2"/>
@@ -14128,18 +14470,25 @@
     </p:spTree>
     <p:extLst>
       <p:ext uri="{BB962C8B-B14F-4D97-AF65-F5344CB8AC3E}">
-        <p14:creationId xmlns:p14="http://schemas.microsoft.com/office/powerpoint/2010/main" xmlns:p="http://schemas.openxmlformats.org/presentationml/2006/main" xmlns:r="http://schemas.openxmlformats.org/officeDocument/2006/relationships" xmlns:a="http://schemas.openxmlformats.org/drawingml/2006/main" xmlns="" val="831135114"/>
+        <p14:creationId xmlns:p14="http://schemas.microsoft.com/office/powerpoint/2010/main" val="831135114"/>
       </p:ext>
     </p:extLst>
   </p:cSld>
   <p:clrMapOvr>
     <a:masterClrMapping/>
   </p:clrMapOvr>
+  <p:timing>
+    <p:tnLst>
+      <p:par>
+        <p:cTn id="1" dur="indefinite" restart="never" nodeType="tmRoot"/>
+      </p:par>
+    </p:tnLst>
+  </p:timing>
 </p:sld>
 </file>
 
 <file path=ppt/slides/slide7.xml><?xml version="1.0" encoding="utf-8"?>
-<p:sld xmlns:a="http://schemas.openxmlformats.org/drawingml/2006/main" xmlns:r="http://schemas.openxmlformats.org/officeDocument/2006/relationships" xmlns:mc="http://schemas.openxmlformats.org/markup-compatibility/2006" xmlns:mv="urn:schemas-microsoft-com:mac:vml" xmlns:p="http://schemas.openxmlformats.org/presentationml/2006/main" mc:Ignorable="mv" mc:PreserveAttributes="mv:*">
+<p:sld xmlns:a="http://schemas.openxmlformats.org/drawingml/2006/main" xmlns:r="http://schemas.openxmlformats.org/officeDocument/2006/relationships" xmlns:p="http://schemas.openxmlformats.org/presentationml/2006/main">
   <p:cSld>
     <p:spTree>
       <p:nvGrpSpPr>
@@ -14211,7 +14560,7 @@
           <a:effectLst/>
           <a:extLst>
             <a:ext uri="{91240B29-F687-4F45-9708-019B960494DF}">
-              <a14:hiddenLine xmlns:a14="http://schemas.microsoft.com/office/drawing/2010/main" xmlns:p="http://schemas.openxmlformats.org/presentationml/2006/main" xmlns:r="http://schemas.openxmlformats.org/officeDocument/2006/relationships" xmlns:a="http://schemas.openxmlformats.org/drawingml/2006/main" xmlns="" w="9525">
+              <a14:hiddenLine xmlns:a14="http://schemas.microsoft.com/office/drawing/2010/main" w="9525">
                 <a:solidFill>
                   <a:schemeClr val="tx1"/>
                 </a:solidFill>
@@ -14221,7 +14570,7 @@
               </a14:hiddenLine>
             </a:ext>
             <a:ext uri="{AF507438-7753-43E0-B8FC-AC1667EBCBE1}">
-              <a14:hiddenEffects xmlns:a14="http://schemas.microsoft.com/office/drawing/2010/main" xmlns:p="http://schemas.openxmlformats.org/presentationml/2006/main" xmlns:r="http://schemas.openxmlformats.org/officeDocument/2006/relationships" xmlns:a="http://schemas.openxmlformats.org/drawingml/2006/main" xmlns="">
+              <a14:hiddenEffects xmlns:a14="http://schemas.microsoft.com/office/drawing/2010/main">
                 <a:effectLst>
                   <a:outerShdw dist="35921" dir="2700000" algn="ctr" rotWithShape="0">
                     <a:schemeClr val="bg2"/>
@@ -14563,7 +14912,7 @@
     </p:spTree>
     <p:extLst>
       <p:ext uri="{BB962C8B-B14F-4D97-AF65-F5344CB8AC3E}">
-        <p14:creationId xmlns:p14="http://schemas.microsoft.com/office/powerpoint/2010/main" xmlns:p="http://schemas.openxmlformats.org/presentationml/2006/main" xmlns:r="http://schemas.openxmlformats.org/officeDocument/2006/relationships" xmlns:a="http://schemas.openxmlformats.org/drawingml/2006/main" xmlns="" val="1654220910"/>
+        <p14:creationId xmlns:p14="http://schemas.microsoft.com/office/powerpoint/2010/main" val="1654220910"/>
       </p:ext>
     </p:extLst>
   </p:cSld>
@@ -14581,7 +14930,7 @@
 </file>
 
 <file path=ppt/slides/slide8.xml><?xml version="1.0" encoding="utf-8"?>
-<p:sld xmlns:a="http://schemas.openxmlformats.org/drawingml/2006/main" xmlns:r="http://schemas.openxmlformats.org/officeDocument/2006/relationships" xmlns:mc="http://schemas.openxmlformats.org/markup-compatibility/2006" xmlns:mv="urn:schemas-microsoft-com:mac:vml" xmlns:p="http://schemas.openxmlformats.org/presentationml/2006/main" mc:Ignorable="mv" mc:PreserveAttributes="mv:*">
+<p:sld xmlns:a="http://schemas.openxmlformats.org/drawingml/2006/main" xmlns:r="http://schemas.openxmlformats.org/officeDocument/2006/relationships" xmlns:p="http://schemas.openxmlformats.org/presentationml/2006/main">
   <p:cSld>
     <p:spTree>
       <p:nvGrpSpPr>
@@ -14653,7 +15002,7 @@
           <a:effectLst/>
           <a:extLst>
             <a:ext uri="{91240B29-F687-4F45-9708-019B960494DF}">
-              <a14:hiddenLine xmlns:a14="http://schemas.microsoft.com/office/drawing/2010/main" xmlns:p="http://schemas.openxmlformats.org/presentationml/2006/main" xmlns:r="http://schemas.openxmlformats.org/officeDocument/2006/relationships" xmlns:a="http://schemas.openxmlformats.org/drawingml/2006/main" xmlns="" w="9525">
+              <a14:hiddenLine xmlns:a14="http://schemas.microsoft.com/office/drawing/2010/main" w="9525">
                 <a:solidFill>
                   <a:schemeClr val="tx1"/>
                 </a:solidFill>
@@ -14663,7 +15012,7 @@
               </a14:hiddenLine>
             </a:ext>
             <a:ext uri="{AF507438-7753-43E0-B8FC-AC1667EBCBE1}">
-              <a14:hiddenEffects xmlns:a14="http://schemas.microsoft.com/office/drawing/2010/main" xmlns:p="http://schemas.openxmlformats.org/presentationml/2006/main" xmlns:r="http://schemas.openxmlformats.org/officeDocument/2006/relationships" xmlns:a="http://schemas.openxmlformats.org/drawingml/2006/main" xmlns="">
+              <a14:hiddenEffects xmlns:a14="http://schemas.microsoft.com/office/drawing/2010/main">
                 <a:effectLst>
                   <a:outerShdw dist="35921" dir="2700000" algn="ctr" rotWithShape="0">
                     <a:schemeClr val="bg2"/>
@@ -15010,7 +15359,7 @@
     </p:spTree>
     <p:extLst>
       <p:ext uri="{BB962C8B-B14F-4D97-AF65-F5344CB8AC3E}">
-        <p14:creationId xmlns:p14="http://schemas.microsoft.com/office/powerpoint/2010/main" xmlns:p="http://schemas.openxmlformats.org/presentationml/2006/main" xmlns:r="http://schemas.openxmlformats.org/officeDocument/2006/relationships" xmlns:a="http://schemas.openxmlformats.org/drawingml/2006/main" xmlns="" val="1513552757"/>
+        <p14:creationId xmlns:p14="http://schemas.microsoft.com/office/powerpoint/2010/main" val="1513552757"/>
       </p:ext>
     </p:extLst>
   </p:cSld>
@@ -15028,7 +15377,7 @@
 </file>
 
 <file path=ppt/slides/slide9.xml><?xml version="1.0" encoding="utf-8"?>
-<p:sld xmlns:a="http://schemas.openxmlformats.org/drawingml/2006/main" xmlns:r="http://schemas.openxmlformats.org/officeDocument/2006/relationships" xmlns:mc="http://schemas.openxmlformats.org/markup-compatibility/2006" xmlns:mv="urn:schemas-microsoft-com:mac:vml" xmlns:p="http://schemas.openxmlformats.org/presentationml/2006/main" mc:Ignorable="mv" mc:PreserveAttributes="mv:*">
+<p:sld xmlns:a="http://schemas.openxmlformats.org/drawingml/2006/main" xmlns:r="http://schemas.openxmlformats.org/officeDocument/2006/relationships" xmlns:p="http://schemas.openxmlformats.org/presentationml/2006/main">
   <p:cSld>
     <p:spTree>
       <p:nvGrpSpPr>
@@ -15100,7 +15449,7 @@
           <a:effectLst/>
           <a:extLst>
             <a:ext uri="{91240B29-F687-4F45-9708-019B960494DF}">
-              <a14:hiddenLine xmlns:a14="http://schemas.microsoft.com/office/drawing/2010/main" xmlns:p="http://schemas.openxmlformats.org/presentationml/2006/main" xmlns:r="http://schemas.openxmlformats.org/officeDocument/2006/relationships" xmlns:a="http://schemas.openxmlformats.org/drawingml/2006/main" xmlns="" w="9525">
+              <a14:hiddenLine xmlns:a14="http://schemas.microsoft.com/office/drawing/2010/main" w="9525">
                 <a:solidFill>
                   <a:schemeClr val="tx1"/>
                 </a:solidFill>
@@ -15110,7 +15459,7 @@
               </a14:hiddenLine>
             </a:ext>
             <a:ext uri="{AF507438-7753-43E0-B8FC-AC1667EBCBE1}">
-              <a14:hiddenEffects xmlns:a14="http://schemas.microsoft.com/office/drawing/2010/main" xmlns:p="http://schemas.openxmlformats.org/presentationml/2006/main" xmlns:r="http://schemas.openxmlformats.org/officeDocument/2006/relationships" xmlns:a="http://schemas.openxmlformats.org/drawingml/2006/main" xmlns="">
+              <a14:hiddenEffects xmlns:a14="http://schemas.microsoft.com/office/drawing/2010/main">
                 <a:effectLst>
                   <a:outerShdw dist="35921" dir="2700000" algn="ctr" rotWithShape="0">
                     <a:schemeClr val="bg2"/>
@@ -15521,7 +15870,7 @@
     </p:spTree>
     <p:extLst>
       <p:ext uri="{BB962C8B-B14F-4D97-AF65-F5344CB8AC3E}">
-        <p14:creationId xmlns:p14="http://schemas.microsoft.com/office/powerpoint/2010/main" xmlns:p="http://schemas.openxmlformats.org/presentationml/2006/main" xmlns:r="http://schemas.openxmlformats.org/officeDocument/2006/relationships" xmlns:a="http://schemas.openxmlformats.org/drawingml/2006/main" xmlns="" val="1314616115"/>
+        <p14:creationId xmlns:p14="http://schemas.microsoft.com/office/powerpoint/2010/main" val="1314616115"/>
       </p:ext>
     </p:extLst>
   </p:cSld>

</xml_diff>